<commit_message>
desenho de solucao novo e ppt atualizado
</commit_message>
<xml_diff>
--- a/Documentação/Apresentação - Sprint 1 - 4 sem.pptx
+++ b/Documentação/Apresentação - Sprint 1 - 4 sem.pptx
@@ -15,7 +15,8 @@
     <p:sldId id="404" r:id="rId9"/>
     <p:sldId id="300" r:id="rId10"/>
     <p:sldId id="294" r:id="rId11"/>
-    <p:sldId id="287" r:id="rId12"/>
+    <p:sldId id="406" r:id="rId12"/>
+    <p:sldId id="287" r:id="rId13"/>
   </p:sldIdLst>
   <p:sldSz cx="12192000" cy="6858000"/>
   <p:notesSz cx="6858000" cy="9144000"/>
@@ -24667,7 +24668,7 @@
           <a:p>
             <a:fld id="{93AE73D3-A46B-4B9C-965A-78B4CFA46842}" type="datetimeFigureOut">
               <a:rPr lang="pt-BR" smtClean="0"/>
-              <a:t>15/09/2020</a:t>
+              <a:t>16/09/2020</a:t>
             </a:fld>
             <a:endParaRPr lang="pt-BR"/>
           </a:p>
@@ -24865,7 +24866,7 @@
           <a:p>
             <a:fld id="{93AE73D3-A46B-4B9C-965A-78B4CFA46842}" type="datetimeFigureOut">
               <a:rPr lang="pt-BR" smtClean="0"/>
-              <a:t>15/09/2020</a:t>
+              <a:t>16/09/2020</a:t>
             </a:fld>
             <a:endParaRPr lang="pt-BR"/>
           </a:p>
@@ -25073,7 +25074,7 @@
           <a:p>
             <a:fld id="{93AE73D3-A46B-4B9C-965A-78B4CFA46842}" type="datetimeFigureOut">
               <a:rPr lang="pt-BR" smtClean="0"/>
-              <a:t>15/09/2020</a:t>
+              <a:t>16/09/2020</a:t>
             </a:fld>
             <a:endParaRPr lang="pt-BR"/>
           </a:p>
@@ -25271,7 +25272,7 @@
           <a:p>
             <a:fld id="{93AE73D3-A46B-4B9C-965A-78B4CFA46842}" type="datetimeFigureOut">
               <a:rPr lang="pt-BR" smtClean="0"/>
-              <a:t>15/09/2020</a:t>
+              <a:t>16/09/2020</a:t>
             </a:fld>
             <a:endParaRPr lang="pt-BR"/>
           </a:p>
@@ -25546,7 +25547,7 @@
           <a:p>
             <a:fld id="{93AE73D3-A46B-4B9C-965A-78B4CFA46842}" type="datetimeFigureOut">
               <a:rPr lang="pt-BR" smtClean="0"/>
-              <a:t>15/09/2020</a:t>
+              <a:t>16/09/2020</a:t>
             </a:fld>
             <a:endParaRPr lang="pt-BR"/>
           </a:p>
@@ -25811,7 +25812,7 @@
           <a:p>
             <a:fld id="{93AE73D3-A46B-4B9C-965A-78B4CFA46842}" type="datetimeFigureOut">
               <a:rPr lang="pt-BR" smtClean="0"/>
-              <a:t>15/09/2020</a:t>
+              <a:t>16/09/2020</a:t>
             </a:fld>
             <a:endParaRPr lang="pt-BR"/>
           </a:p>
@@ -26223,7 +26224,7 @@
           <a:p>
             <a:fld id="{93AE73D3-A46B-4B9C-965A-78B4CFA46842}" type="datetimeFigureOut">
               <a:rPr lang="pt-BR" smtClean="0"/>
-              <a:t>15/09/2020</a:t>
+              <a:t>16/09/2020</a:t>
             </a:fld>
             <a:endParaRPr lang="pt-BR"/>
           </a:p>
@@ -26364,7 +26365,7 @@
           <a:p>
             <a:fld id="{93AE73D3-A46B-4B9C-965A-78B4CFA46842}" type="datetimeFigureOut">
               <a:rPr lang="pt-BR" smtClean="0"/>
-              <a:t>15/09/2020</a:t>
+              <a:t>16/09/2020</a:t>
             </a:fld>
             <a:endParaRPr lang="pt-BR"/>
           </a:p>
@@ -26477,7 +26478,7 @@
           <a:p>
             <a:fld id="{93AE73D3-A46B-4B9C-965A-78B4CFA46842}" type="datetimeFigureOut">
               <a:rPr lang="pt-BR" smtClean="0"/>
-              <a:t>15/09/2020</a:t>
+              <a:t>16/09/2020</a:t>
             </a:fld>
             <a:endParaRPr lang="pt-BR"/>
           </a:p>
@@ -26788,7 +26789,7 @@
           <a:p>
             <a:fld id="{93AE73D3-A46B-4B9C-965A-78B4CFA46842}" type="datetimeFigureOut">
               <a:rPr lang="pt-BR" smtClean="0"/>
-              <a:t>15/09/2020</a:t>
+              <a:t>16/09/2020</a:t>
             </a:fld>
             <a:endParaRPr lang="pt-BR"/>
           </a:p>
@@ -27076,7 +27077,7 @@
           <a:p>
             <a:fld id="{93AE73D3-A46B-4B9C-965A-78B4CFA46842}" type="datetimeFigureOut">
               <a:rPr lang="pt-BR" smtClean="0"/>
-              <a:t>15/09/2020</a:t>
+              <a:t>16/09/2020</a:t>
             </a:fld>
             <a:endParaRPr lang="pt-BR"/>
           </a:p>
@@ -27317,7 +27318,7 @@
           <a:p>
             <a:fld id="{93AE73D3-A46B-4B9C-965A-78B4CFA46842}" type="datetimeFigureOut">
               <a:rPr lang="pt-BR" smtClean="0"/>
-              <a:t>15/09/2020</a:t>
+              <a:t>16/09/2020</a:t>
             </a:fld>
             <a:endParaRPr lang="pt-BR"/>
           </a:p>
@@ -27843,7 +27844,7 @@
             </a:pPr>
             <a:r>
               <a:rPr lang="en-US" dirty="0"/>
-              <a:t>Lucas Pires - 01191097</a:t>
+              <a:t>Lucas Abreu – 01191097</a:t>
             </a:r>
           </a:p>
           <a:p>
@@ -28776,6 +28777,759 @@
 </file>
 
 <file path=ppt/slides/slide11.xml><?xml version="1.0" encoding="utf-8"?>
+<p:sld xmlns:a="http://schemas.openxmlformats.org/drawingml/2006/main" xmlns:r="http://schemas.openxmlformats.org/officeDocument/2006/relationships" xmlns:p="http://schemas.openxmlformats.org/presentationml/2006/main">
+  <p:cSld>
+    <p:spTree>
+      <p:nvGrpSpPr>
+        <p:cNvPr id="1" name=""/>
+        <p:cNvGrpSpPr/>
+        <p:nvPr/>
+      </p:nvGrpSpPr>
+      <p:grpSpPr>
+        <a:xfrm>
+          <a:off x="0" y="0"/>
+          <a:ext cx="0" cy="0"/>
+          <a:chOff x="0" y="0"/>
+          <a:chExt cx="0" cy="0"/>
+        </a:xfrm>
+      </p:grpSpPr>
+      <p:sp useBgFill="1">
+        <p:nvSpPr>
+          <p:cNvPr id="10" name="Rectangle 9"/>
+          <p:cNvSpPr>
+            <a:spLocks noGrp="1" noRot="1" noChangeAspect="1" noMove="1" noResize="1" noEditPoints="1" noAdjustHandles="1" noChangeArrowheads="1" noChangeShapeType="1" noTextEdit="1"/>
+          </p:cNvSpPr>
+          <p:nvPr/>
+        </p:nvSpPr>
+        <p:spPr>
+          <a:xfrm>
+            <a:off x="0" y="0"/>
+            <a:ext cx="12192000" cy="6858000"/>
+          </a:xfrm>
+          <a:prstGeom prst="rect">
+            <a:avLst/>
+          </a:prstGeom>
+          <a:ln>
+            <a:noFill/>
+          </a:ln>
+        </p:spPr>
+        <p:style>
+          <a:lnRef idx="2">
+            <a:schemeClr val="accent1">
+              <a:shade val="50000"/>
+            </a:schemeClr>
+          </a:lnRef>
+          <a:fillRef idx="1">
+            <a:schemeClr val="accent1"/>
+          </a:fillRef>
+          <a:effectRef idx="0">
+            <a:schemeClr val="accent1"/>
+          </a:effectRef>
+          <a:fontRef idx="minor">
+            <a:schemeClr val="lt1"/>
+          </a:fontRef>
+        </p:style>
+        <p:txBody>
+          <a:bodyPr rtlCol="0" anchor="ctr"/>
+          <a:lstStyle/>
+          <a:p>
+            <a:pPr algn="ctr"/>
+            <a:endParaRPr lang="en-US" dirty="0"/>
+          </a:p>
+        </p:txBody>
+      </p:sp>
+      <p:sp>
+        <p:nvSpPr>
+          <p:cNvPr id="20" name="CaixaDeTexto 19">
+            <a:extLst>
+              <a:ext uri="{FF2B5EF4-FFF2-40B4-BE49-F238E27FC236}">
+                <a16:creationId xmlns:a16="http://schemas.microsoft.com/office/drawing/2014/main" id="{5B526848-867A-48AA-8A3A-D54E0A419896}"/>
+              </a:ext>
+            </a:extLst>
+          </p:cNvPr>
+          <p:cNvSpPr txBox="1"/>
+          <p:nvPr/>
+        </p:nvSpPr>
+        <p:spPr>
+          <a:xfrm>
+            <a:off x="7709972" y="1320341"/>
+            <a:ext cx="2070837" cy="338554"/>
+          </a:xfrm>
+          <a:prstGeom prst="rect">
+            <a:avLst/>
+          </a:prstGeom>
+          <a:noFill/>
+        </p:spPr>
+        <p:txBody>
+          <a:bodyPr wrap="square" rtlCol="0">
+            <a:spAutoFit/>
+          </a:bodyPr>
+          <a:lstStyle/>
+          <a:p>
+            <a:r>
+              <a:rPr lang="pt-BR" sz="1600" dirty="0">
+                <a:solidFill>
+                  <a:schemeClr val="bg1"/>
+                </a:solidFill>
+              </a:rPr>
+              <a:t>Planilha de Software</a:t>
+            </a:r>
+          </a:p>
+        </p:txBody>
+      </p:sp>
+      <p:sp>
+        <p:nvSpPr>
+          <p:cNvPr id="21" name="CaixaDeTexto 20">
+            <a:extLst>
+              <a:ext uri="{FF2B5EF4-FFF2-40B4-BE49-F238E27FC236}">
+                <a16:creationId xmlns:a16="http://schemas.microsoft.com/office/drawing/2014/main" id="{66EB59FA-89AE-4F0D-A3A6-FCAD79115ED1}"/>
+              </a:ext>
+            </a:extLst>
+          </p:cNvPr>
+          <p:cNvSpPr txBox="1"/>
+          <p:nvPr/>
+        </p:nvSpPr>
+        <p:spPr>
+          <a:xfrm>
+            <a:off x="9820309" y="1301938"/>
+            <a:ext cx="2277975" cy="369332"/>
+          </a:xfrm>
+          <a:prstGeom prst="rect">
+            <a:avLst/>
+          </a:prstGeom>
+          <a:noFill/>
+          <a:effectLst/>
+        </p:spPr>
+        <p:txBody>
+          <a:bodyPr wrap="square" rtlCol="0">
+            <a:spAutoFit/>
+          </a:bodyPr>
+          <a:lstStyle/>
+          <a:p>
+            <a:r>
+              <a:rPr lang="pt-BR" dirty="0">
+                <a:ln>
+                  <a:solidFill>
+                    <a:schemeClr val="bg1"/>
+                  </a:solidFill>
+                </a:ln>
+                <a:solidFill>
+                  <a:schemeClr val="bg1"/>
+                </a:solidFill>
+                <a:effectLst/>
+              </a:rPr>
+              <a:t>Desenho de Solução</a:t>
+            </a:r>
+          </a:p>
+        </p:txBody>
+      </p:sp>
+      <p:sp>
+        <p:nvSpPr>
+          <p:cNvPr id="2" name="Título 1"/>
+          <p:cNvSpPr>
+            <a:spLocks noGrp="1"/>
+          </p:cNvSpPr>
+          <p:nvPr>
+            <p:ph type="title"/>
+          </p:nvPr>
+        </p:nvSpPr>
+        <p:spPr>
+          <a:xfrm>
+            <a:off x="1812897" y="518649"/>
+            <a:ext cx="9882278" cy="1067634"/>
+          </a:xfrm>
+        </p:spPr>
+        <p:txBody>
+          <a:bodyPr anchor="ctr">
+            <a:normAutofit/>
+          </a:bodyPr>
+          <a:lstStyle/>
+          <a:p>
+            <a:r>
+              <a:rPr lang="pt-BR" dirty="0"/>
+              <a:t>Desenho de Solução</a:t>
+            </a:r>
+          </a:p>
+        </p:txBody>
+      </p:sp>
+      <p:grpSp>
+        <p:nvGrpSpPr>
+          <p:cNvPr id="12" name="Group 11"/>
+          <p:cNvGrpSpPr>
+            <a:grpSpLocks noGrp="1" noUngrp="1" noRot="1" noChangeAspect="1" noMove="1" noResize="1"/>
+          </p:cNvGrpSpPr>
+          <p:nvPr/>
+        </p:nvGrpSpPr>
+        <p:grpSpPr>
+          <a:xfrm>
+            <a:off x="472021" y="628863"/>
+            <a:ext cx="1128382" cy="847206"/>
+            <a:chOff x="8183879" y="1000124"/>
+            <a:chExt cx="1562267" cy="1172973"/>
+          </a:xfrm>
+        </p:grpSpPr>
+        <p:sp>
+          <p:nvSpPr>
+            <p:cNvPr id="13" name="Freeform 5"/>
+            <p:cNvSpPr/>
+            <p:nvPr/>
+          </p:nvSpPr>
+          <p:spPr bwMode="auto">
+            <a:xfrm>
+              <a:off x="8183879" y="1348782"/>
+              <a:ext cx="935037" cy="824315"/>
+            </a:xfrm>
+            <a:custGeom>
+              <a:avLst/>
+              <a:gdLst>
+                <a:gd name="T0" fmla="*/ 225 w 785"/>
+                <a:gd name="T1" fmla="*/ 692 h 692"/>
+                <a:gd name="T2" fmla="*/ 177 w 785"/>
+                <a:gd name="T3" fmla="*/ 665 h 692"/>
+                <a:gd name="T4" fmla="*/ 9 w 785"/>
+                <a:gd name="T5" fmla="*/ 374 h 692"/>
+                <a:gd name="T6" fmla="*/ 9 w 785"/>
+                <a:gd name="T7" fmla="*/ 318 h 692"/>
+                <a:gd name="T8" fmla="*/ 177 w 785"/>
+                <a:gd name="T9" fmla="*/ 27 h 692"/>
+                <a:gd name="T10" fmla="*/ 225 w 785"/>
+                <a:gd name="T11" fmla="*/ 0 h 692"/>
+                <a:gd name="T12" fmla="*/ 561 w 785"/>
+                <a:gd name="T13" fmla="*/ 0 h 692"/>
+                <a:gd name="T14" fmla="*/ 609 w 785"/>
+                <a:gd name="T15" fmla="*/ 27 h 692"/>
+                <a:gd name="T16" fmla="*/ 777 w 785"/>
+                <a:gd name="T17" fmla="*/ 318 h 692"/>
+                <a:gd name="T18" fmla="*/ 777 w 785"/>
+                <a:gd name="T19" fmla="*/ 374 h 692"/>
+                <a:gd name="T20" fmla="*/ 609 w 785"/>
+                <a:gd name="T21" fmla="*/ 665 h 692"/>
+                <a:gd name="T22" fmla="*/ 561 w 785"/>
+                <a:gd name="T23" fmla="*/ 692 h 692"/>
+                <a:gd name="T24" fmla="*/ 225 w 785"/>
+                <a:gd name="T25" fmla="*/ 692 h 692"/>
+              </a:gdLst>
+              <a:ahLst/>
+              <a:cxnLst>
+                <a:cxn ang="0">
+                  <a:pos x="T0" y="T1"/>
+                </a:cxn>
+                <a:cxn ang="0">
+                  <a:pos x="T2" y="T3"/>
+                </a:cxn>
+                <a:cxn ang="0">
+                  <a:pos x="T4" y="T5"/>
+                </a:cxn>
+                <a:cxn ang="0">
+                  <a:pos x="T6" y="T7"/>
+                </a:cxn>
+                <a:cxn ang="0">
+                  <a:pos x="T8" y="T9"/>
+                </a:cxn>
+                <a:cxn ang="0">
+                  <a:pos x="T10" y="T11"/>
+                </a:cxn>
+                <a:cxn ang="0">
+                  <a:pos x="T12" y="T13"/>
+                </a:cxn>
+                <a:cxn ang="0">
+                  <a:pos x="T14" y="T15"/>
+                </a:cxn>
+                <a:cxn ang="0">
+                  <a:pos x="T16" y="T17"/>
+                </a:cxn>
+                <a:cxn ang="0">
+                  <a:pos x="T18" y="T19"/>
+                </a:cxn>
+                <a:cxn ang="0">
+                  <a:pos x="T20" y="T21"/>
+                </a:cxn>
+                <a:cxn ang="0">
+                  <a:pos x="T22" y="T23"/>
+                </a:cxn>
+                <a:cxn ang="0">
+                  <a:pos x="T24" y="T25"/>
+                </a:cxn>
+              </a:cxnLst>
+              <a:rect l="0" t="0" r="r" b="b"/>
+              <a:pathLst>
+                <a:path w="785" h="692">
+                  <a:moveTo>
+                    <a:pt x="225" y="692"/>
+                  </a:moveTo>
+                  <a:cubicBezTo>
+                    <a:pt x="207" y="692"/>
+                    <a:pt x="185" y="680"/>
+                    <a:pt x="177" y="665"/>
+                  </a:cubicBezTo>
+                  <a:cubicBezTo>
+                    <a:pt x="9" y="374"/>
+                    <a:pt x="9" y="374"/>
+                    <a:pt x="9" y="374"/>
+                  </a:cubicBezTo>
+                  <a:cubicBezTo>
+                    <a:pt x="0" y="358"/>
+                    <a:pt x="0" y="334"/>
+                    <a:pt x="9" y="318"/>
+                  </a:cubicBezTo>
+                  <a:cubicBezTo>
+                    <a:pt x="177" y="27"/>
+                    <a:pt x="177" y="27"/>
+                    <a:pt x="177" y="27"/>
+                  </a:cubicBezTo>
+                  <a:cubicBezTo>
+                    <a:pt x="185" y="12"/>
+                    <a:pt x="207" y="0"/>
+                    <a:pt x="225" y="0"/>
+                  </a:cubicBezTo>
+                  <a:cubicBezTo>
+                    <a:pt x="561" y="0"/>
+                    <a:pt x="561" y="0"/>
+                    <a:pt x="561" y="0"/>
+                  </a:cubicBezTo>
+                  <a:cubicBezTo>
+                    <a:pt x="578" y="0"/>
+                    <a:pt x="600" y="12"/>
+                    <a:pt x="609" y="27"/>
+                  </a:cubicBezTo>
+                  <a:cubicBezTo>
+                    <a:pt x="777" y="318"/>
+                    <a:pt x="777" y="318"/>
+                    <a:pt x="777" y="318"/>
+                  </a:cubicBezTo>
+                  <a:cubicBezTo>
+                    <a:pt x="785" y="334"/>
+                    <a:pt x="785" y="358"/>
+                    <a:pt x="777" y="374"/>
+                  </a:cubicBezTo>
+                  <a:cubicBezTo>
+                    <a:pt x="609" y="665"/>
+                    <a:pt x="609" y="665"/>
+                    <a:pt x="609" y="665"/>
+                  </a:cubicBezTo>
+                  <a:cubicBezTo>
+                    <a:pt x="600" y="680"/>
+                    <a:pt x="578" y="692"/>
+                    <a:pt x="561" y="692"/>
+                  </a:cubicBezTo>
+                  <a:lnTo>
+                    <a:pt x="225" y="692"/>
+                  </a:lnTo>
+                  <a:close/>
+                </a:path>
+              </a:pathLst>
+            </a:custGeom>
+            <a:noFill/>
+            <a:ln w="28575" cmpd="sng">
+              <a:solidFill>
+                <a:schemeClr val="tx1"/>
+              </a:solidFill>
+            </a:ln>
+          </p:spPr>
+          <p:txBody>
+            <a:bodyPr vert="horz" wrap="square" lIns="91440" tIns="45720" rIns="91440" bIns="45720" numCol="1" anchor="t" anchorCtr="0" compatLnSpc="1"/>
+            <a:lstStyle/>
+            <a:p>
+              <a:endParaRPr lang="en-US"/>
+            </a:p>
+          </p:txBody>
+        </p:sp>
+        <p:sp>
+          <p:nvSpPr>
+            <p:cNvPr id="14" name="Freeform 5"/>
+            <p:cNvSpPr/>
+            <p:nvPr/>
+          </p:nvSpPr>
+          <p:spPr bwMode="auto">
+            <a:xfrm>
+              <a:off x="8983979" y="1000124"/>
+              <a:ext cx="762167" cy="671915"/>
+            </a:xfrm>
+            <a:custGeom>
+              <a:avLst/>
+              <a:gdLst>
+                <a:gd name="T0" fmla="*/ 225 w 785"/>
+                <a:gd name="T1" fmla="*/ 692 h 692"/>
+                <a:gd name="T2" fmla="*/ 177 w 785"/>
+                <a:gd name="T3" fmla="*/ 665 h 692"/>
+                <a:gd name="T4" fmla="*/ 9 w 785"/>
+                <a:gd name="T5" fmla="*/ 374 h 692"/>
+                <a:gd name="T6" fmla="*/ 9 w 785"/>
+                <a:gd name="T7" fmla="*/ 318 h 692"/>
+                <a:gd name="T8" fmla="*/ 177 w 785"/>
+                <a:gd name="T9" fmla="*/ 27 h 692"/>
+                <a:gd name="T10" fmla="*/ 225 w 785"/>
+                <a:gd name="T11" fmla="*/ 0 h 692"/>
+                <a:gd name="T12" fmla="*/ 561 w 785"/>
+                <a:gd name="T13" fmla="*/ 0 h 692"/>
+                <a:gd name="T14" fmla="*/ 609 w 785"/>
+                <a:gd name="T15" fmla="*/ 27 h 692"/>
+                <a:gd name="T16" fmla="*/ 777 w 785"/>
+                <a:gd name="T17" fmla="*/ 318 h 692"/>
+                <a:gd name="T18" fmla="*/ 777 w 785"/>
+                <a:gd name="T19" fmla="*/ 374 h 692"/>
+                <a:gd name="T20" fmla="*/ 609 w 785"/>
+                <a:gd name="T21" fmla="*/ 665 h 692"/>
+                <a:gd name="T22" fmla="*/ 561 w 785"/>
+                <a:gd name="T23" fmla="*/ 692 h 692"/>
+                <a:gd name="T24" fmla="*/ 225 w 785"/>
+                <a:gd name="T25" fmla="*/ 692 h 692"/>
+              </a:gdLst>
+              <a:ahLst/>
+              <a:cxnLst>
+                <a:cxn ang="0">
+                  <a:pos x="T0" y="T1"/>
+                </a:cxn>
+                <a:cxn ang="0">
+                  <a:pos x="T2" y="T3"/>
+                </a:cxn>
+                <a:cxn ang="0">
+                  <a:pos x="T4" y="T5"/>
+                </a:cxn>
+                <a:cxn ang="0">
+                  <a:pos x="T6" y="T7"/>
+                </a:cxn>
+                <a:cxn ang="0">
+                  <a:pos x="T8" y="T9"/>
+                </a:cxn>
+                <a:cxn ang="0">
+                  <a:pos x="T10" y="T11"/>
+                </a:cxn>
+                <a:cxn ang="0">
+                  <a:pos x="T12" y="T13"/>
+                </a:cxn>
+                <a:cxn ang="0">
+                  <a:pos x="T14" y="T15"/>
+                </a:cxn>
+                <a:cxn ang="0">
+                  <a:pos x="T16" y="T17"/>
+                </a:cxn>
+                <a:cxn ang="0">
+                  <a:pos x="T18" y="T19"/>
+                </a:cxn>
+                <a:cxn ang="0">
+                  <a:pos x="T20" y="T21"/>
+                </a:cxn>
+                <a:cxn ang="0">
+                  <a:pos x="T22" y="T23"/>
+                </a:cxn>
+                <a:cxn ang="0">
+                  <a:pos x="T24" y="T25"/>
+                </a:cxn>
+              </a:cxnLst>
+              <a:rect l="0" t="0" r="r" b="b"/>
+              <a:pathLst>
+                <a:path w="785" h="692">
+                  <a:moveTo>
+                    <a:pt x="225" y="692"/>
+                  </a:moveTo>
+                  <a:cubicBezTo>
+                    <a:pt x="207" y="692"/>
+                    <a:pt x="185" y="680"/>
+                    <a:pt x="177" y="665"/>
+                  </a:cubicBezTo>
+                  <a:cubicBezTo>
+                    <a:pt x="9" y="374"/>
+                    <a:pt x="9" y="374"/>
+                    <a:pt x="9" y="374"/>
+                  </a:cubicBezTo>
+                  <a:cubicBezTo>
+                    <a:pt x="0" y="358"/>
+                    <a:pt x="0" y="334"/>
+                    <a:pt x="9" y="318"/>
+                  </a:cubicBezTo>
+                  <a:cubicBezTo>
+                    <a:pt x="177" y="27"/>
+                    <a:pt x="177" y="27"/>
+                    <a:pt x="177" y="27"/>
+                  </a:cubicBezTo>
+                  <a:cubicBezTo>
+                    <a:pt x="185" y="12"/>
+                    <a:pt x="207" y="0"/>
+                    <a:pt x="225" y="0"/>
+                  </a:cubicBezTo>
+                  <a:cubicBezTo>
+                    <a:pt x="561" y="0"/>
+                    <a:pt x="561" y="0"/>
+                    <a:pt x="561" y="0"/>
+                  </a:cubicBezTo>
+                  <a:cubicBezTo>
+                    <a:pt x="578" y="0"/>
+                    <a:pt x="600" y="12"/>
+                    <a:pt x="609" y="27"/>
+                  </a:cubicBezTo>
+                  <a:cubicBezTo>
+                    <a:pt x="777" y="318"/>
+                    <a:pt x="777" y="318"/>
+                    <a:pt x="777" y="318"/>
+                  </a:cubicBezTo>
+                  <a:cubicBezTo>
+                    <a:pt x="785" y="334"/>
+                    <a:pt x="785" y="358"/>
+                    <a:pt x="777" y="374"/>
+                  </a:cubicBezTo>
+                  <a:cubicBezTo>
+                    <a:pt x="609" y="665"/>
+                    <a:pt x="609" y="665"/>
+                    <a:pt x="609" y="665"/>
+                  </a:cubicBezTo>
+                  <a:cubicBezTo>
+                    <a:pt x="600" y="680"/>
+                    <a:pt x="578" y="692"/>
+                    <a:pt x="561" y="692"/>
+                  </a:cubicBezTo>
+                  <a:lnTo>
+                    <a:pt x="225" y="692"/>
+                  </a:lnTo>
+                  <a:close/>
+                </a:path>
+              </a:pathLst>
+            </a:custGeom>
+            <a:noFill/>
+            <a:ln w="28575" cmpd="sng">
+              <a:solidFill>
+                <a:schemeClr val="tx1"/>
+              </a:solidFill>
+            </a:ln>
+          </p:spPr>
+          <p:txBody>
+            <a:bodyPr vert="horz" wrap="square" lIns="91440" tIns="45720" rIns="91440" bIns="45720" numCol="1" anchor="t" anchorCtr="0" compatLnSpc="1"/>
+            <a:lstStyle/>
+            <a:p>
+              <a:endParaRPr lang="en-US"/>
+            </a:p>
+          </p:txBody>
+        </p:sp>
+      </p:grpSp>
+      <p:sp>
+        <p:nvSpPr>
+          <p:cNvPr id="11" name="CaixaDeTexto 10">
+            <a:extLst>
+              <a:ext uri="{FF2B5EF4-FFF2-40B4-BE49-F238E27FC236}">
+                <a16:creationId xmlns:a16="http://schemas.microsoft.com/office/drawing/2014/main" id="{8EDF2009-2F02-48C7-BDA7-12762DFBACAD}"/>
+              </a:ext>
+            </a:extLst>
+          </p:cNvPr>
+          <p:cNvSpPr txBox="1"/>
+          <p:nvPr/>
+        </p:nvSpPr>
+        <p:spPr>
+          <a:xfrm>
+            <a:off x="2244588" y="1320341"/>
+            <a:ext cx="1597469" cy="338554"/>
+          </a:xfrm>
+          <a:prstGeom prst="rect">
+            <a:avLst/>
+          </a:prstGeom>
+          <a:noFill/>
+          <a:effectLst/>
+        </p:spPr>
+        <p:txBody>
+          <a:bodyPr wrap="square" rtlCol="0">
+            <a:spAutoFit/>
+          </a:bodyPr>
+          <a:lstStyle/>
+          <a:p>
+            <a:r>
+              <a:rPr lang="pt-BR" sz="1600" dirty="0">
+                <a:solidFill>
+                  <a:schemeClr val="bg1"/>
+                </a:solidFill>
+              </a:rPr>
+              <a:t>Proto-persona</a:t>
+            </a:r>
+            <a:endParaRPr lang="pt-BR" dirty="0">
+              <a:solidFill>
+                <a:schemeClr val="bg1"/>
+              </a:solidFill>
+            </a:endParaRPr>
+          </a:p>
+        </p:txBody>
+      </p:sp>
+      <p:sp>
+        <p:nvSpPr>
+          <p:cNvPr id="15" name="CaixaDeTexto 14">
+            <a:extLst>
+              <a:ext uri="{FF2B5EF4-FFF2-40B4-BE49-F238E27FC236}">
+                <a16:creationId xmlns:a16="http://schemas.microsoft.com/office/drawing/2014/main" id="{09C80A9F-46E9-4D57-BC1B-12B5ACE33AC8}"/>
+              </a:ext>
+            </a:extLst>
+          </p:cNvPr>
+          <p:cNvSpPr txBox="1"/>
+          <p:nvPr/>
+        </p:nvSpPr>
+        <p:spPr>
+          <a:xfrm>
+            <a:off x="3847413" y="1310816"/>
+            <a:ext cx="1321542" cy="338554"/>
+          </a:xfrm>
+          <a:prstGeom prst="rect">
+            <a:avLst/>
+          </a:prstGeom>
+          <a:noFill/>
+          <a:effectLst/>
+        </p:spPr>
+        <p:txBody>
+          <a:bodyPr wrap="square" rtlCol="0">
+            <a:spAutoFit/>
+          </a:bodyPr>
+          <a:lstStyle/>
+          <a:p>
+            <a:r>
+              <a:rPr lang="pt-BR" sz="1600" dirty="0">
+                <a:solidFill>
+                  <a:schemeClr val="bg1"/>
+                </a:solidFill>
+              </a:rPr>
+              <a:t>StoryBoard</a:t>
+            </a:r>
+            <a:endParaRPr lang="pt-BR" dirty="0">
+              <a:solidFill>
+                <a:schemeClr val="bg1"/>
+              </a:solidFill>
+            </a:endParaRPr>
+          </a:p>
+        </p:txBody>
+      </p:sp>
+      <p:sp>
+        <p:nvSpPr>
+          <p:cNvPr id="16" name="CaixaDeTexto 15">
+            <a:extLst>
+              <a:ext uri="{FF2B5EF4-FFF2-40B4-BE49-F238E27FC236}">
+                <a16:creationId xmlns:a16="http://schemas.microsoft.com/office/drawing/2014/main" id="{5A45E2C7-6875-4531-89AC-DFCCC35DF660}"/>
+              </a:ext>
+            </a:extLst>
+          </p:cNvPr>
+          <p:cNvSpPr txBox="1"/>
+          <p:nvPr/>
+        </p:nvSpPr>
+        <p:spPr>
+          <a:xfrm>
+            <a:off x="5285150" y="1320341"/>
+            <a:ext cx="1199701" cy="338554"/>
+          </a:xfrm>
+          <a:prstGeom prst="rect">
+            <a:avLst/>
+          </a:prstGeom>
+          <a:noFill/>
+          <a:effectLst/>
+        </p:spPr>
+        <p:txBody>
+          <a:bodyPr wrap="square" rtlCol="0">
+            <a:spAutoFit/>
+          </a:bodyPr>
+          <a:lstStyle/>
+          <a:p>
+            <a:r>
+              <a:rPr lang="pt-BR" sz="1600" dirty="0">
+                <a:solidFill>
+                  <a:schemeClr val="bg1"/>
+                </a:solidFill>
+              </a:rPr>
+              <a:t>Requisitos</a:t>
+            </a:r>
+            <a:endParaRPr lang="pt-BR" dirty="0">
+              <a:solidFill>
+                <a:schemeClr val="bg1"/>
+              </a:solidFill>
+            </a:endParaRPr>
+          </a:p>
+        </p:txBody>
+      </p:sp>
+      <p:sp>
+        <p:nvSpPr>
+          <p:cNvPr id="17" name="CaixaDeTexto 16">
+            <a:extLst>
+              <a:ext uri="{FF2B5EF4-FFF2-40B4-BE49-F238E27FC236}">
+                <a16:creationId xmlns:a16="http://schemas.microsoft.com/office/drawing/2014/main" id="{901B5BC6-D638-4BE0-B37B-1A203C864D2E}"/>
+              </a:ext>
+            </a:extLst>
+          </p:cNvPr>
+          <p:cNvSpPr txBox="1"/>
+          <p:nvPr/>
+        </p:nvSpPr>
+        <p:spPr>
+          <a:xfrm>
+            <a:off x="6661200" y="1320341"/>
+            <a:ext cx="898530" cy="338554"/>
+          </a:xfrm>
+          <a:prstGeom prst="rect">
+            <a:avLst/>
+          </a:prstGeom>
+          <a:noFill/>
+        </p:spPr>
+        <p:txBody>
+          <a:bodyPr wrap="square" rtlCol="0">
+            <a:spAutoFit/>
+          </a:bodyPr>
+          <a:lstStyle/>
+          <a:p>
+            <a:r>
+              <a:rPr lang="pt-BR" sz="1600" dirty="0">
+                <a:solidFill>
+                  <a:schemeClr val="bg1"/>
+                </a:solidFill>
+              </a:rPr>
+              <a:t>BPMN</a:t>
+            </a:r>
+            <a:endParaRPr lang="pt-BR" dirty="0">
+              <a:solidFill>
+                <a:schemeClr val="bg1"/>
+              </a:solidFill>
+            </a:endParaRPr>
+          </a:p>
+        </p:txBody>
+      </p:sp>
+      <p:pic>
+        <p:nvPicPr>
+          <p:cNvPr id="4" name="Imagem 3">
+            <a:extLst>
+              <a:ext uri="{FF2B5EF4-FFF2-40B4-BE49-F238E27FC236}">
+                <a16:creationId xmlns:a16="http://schemas.microsoft.com/office/drawing/2014/main" id="{FD1B6424-26DC-4D80-B77C-4C45E0907517}"/>
+              </a:ext>
+            </a:extLst>
+          </p:cNvPr>
+          <p:cNvPicPr>
+            <a:picLocks noChangeAspect="1"/>
+          </p:cNvPicPr>
+          <p:nvPr/>
+        </p:nvPicPr>
+        <p:blipFill>
+          <a:blip r:embed="rId2">
+            <a:extLst>
+              <a:ext uri="{28A0092B-C50C-407E-A947-70E740481C1C}">
+                <a14:useLocalDpi xmlns:a14="http://schemas.microsoft.com/office/drawing/2010/main" val="0"/>
+              </a:ext>
+            </a:extLst>
+          </a:blip>
+          <a:stretch>
+            <a:fillRect/>
+          </a:stretch>
+        </p:blipFill>
+        <p:spPr>
+          <a:xfrm>
+            <a:off x="1400243" y="1595808"/>
+            <a:ext cx="9391514" cy="4940753"/>
+          </a:xfrm>
+          <a:prstGeom prst="rect">
+            <a:avLst/>
+          </a:prstGeom>
+        </p:spPr>
+      </p:pic>
+    </p:spTree>
+    <p:extLst>
+      <p:ext uri="{BB962C8B-B14F-4D97-AF65-F5344CB8AC3E}">
+        <p14:creationId xmlns:p14="http://schemas.microsoft.com/office/powerpoint/2010/main" val="620166273"/>
+      </p:ext>
+    </p:extLst>
+  </p:cSld>
+  <p:clrMapOvr>
+    <a:masterClrMapping/>
+  </p:clrMapOvr>
+</p:sld>
+</file>
+
+<file path=ppt/slides/slide12.xml><?xml version="1.0" encoding="utf-8"?>
 <p:sld xmlns:a="http://schemas.openxmlformats.org/drawingml/2006/main" xmlns:r="http://schemas.openxmlformats.org/officeDocument/2006/relationships" xmlns:p="http://schemas.openxmlformats.org/presentationml/2006/main">
   <p:cSld>
     <p:spTree>
@@ -37374,7 +38128,7 @@
             <a:p>
               <a:r>
                 <a:rPr lang="pt-BR" sz="800" dirty="0"/>
-                <a:t>Vinicius Oliveira é um jovem adolescente apaixonado por games. Se tornou expert em jogos virtuais aos 14 anos, o que o fez levar esse hobby a se tornar uma possível profissão. </a:t>
+                <a:t>Vinicius Oliveira é um jovem adolescente apaixonado por games. Se tornou expert em jogos virtuais aos 16 anos, o que o fez levar esse hobby a se tornar uma possível profissão. </a:t>
               </a:r>
             </a:p>
             <a:p>

</xml_diff>

<commit_message>
NOME CERTO DO LUCAS OK
</commit_message>
<xml_diff>
--- a/Documentação/Apresentação - Sprint 1 - 4 sem.pptx
+++ b/Documentação/Apresentação - Sprint 1 - 4 sem.pptx
@@ -27844,7 +27844,15 @@
             </a:pPr>
             <a:r>
               <a:rPr lang="en-US" dirty="0"/>
-              <a:t>Lucas Abreu – 01191097</a:t>
+              <a:t>Lucas Pires </a:t>
+            </a:r>
+            <a:r>
+              <a:rPr lang="en-US" dirty="0" err="1"/>
+              <a:t>França</a:t>
+            </a:r>
+            <a:r>
+              <a:rPr lang="en-US" dirty="0"/>
+              <a:t> – 01191097</a:t>
             </a:r>
           </a:p>
           <a:p>
@@ -33426,7 +33434,7 @@
                 </a:solidFill>
                 <a:latin typeface="Calibri" panose="020F0502020204030204"/>
               </a:rPr>
-              <a:t>Criar uma grande comunidade</a:t>
+              <a:t>Grande comunidade</a:t>
             </a:r>
           </a:p>
           <a:p>
@@ -33442,7 +33450,7 @@
                 </a:solidFill>
                 <a:latin typeface="Calibri" panose="020F0502020204030204"/>
               </a:rPr>
-              <a:t>Não ter como principal negócio a organização de campeonatos</a:t>
+              <a:t>Diversos jogos</a:t>
             </a:r>
           </a:p>
           <a:p>
@@ -33458,7 +33466,39 @@
                 </a:solidFill>
                 <a:latin typeface="Calibri" panose="020F0502020204030204"/>
               </a:rPr>
-              <a:t>Foco em como o jogador vai se sentir utilizando a nossa aplicação</a:t>
+              <a:t>Foco não ser organização de campeonatos</a:t>
+            </a:r>
+          </a:p>
+          <a:p>
+            <a:r>
+              <a:rPr lang="pt-BR" sz="1600" dirty="0">
+                <a:solidFill>
+                  <a:prstClr val="black">
+                    <a:hueOff val="0"/>
+                    <a:satOff val="0"/>
+                    <a:lumOff val="0"/>
+                    <a:alphaOff val="0"/>
+                  </a:prstClr>
+                </a:solidFill>
+                <a:latin typeface="Calibri" panose="020F0502020204030204"/>
+              </a:rPr>
+              <a:t>Multiplataforma</a:t>
+            </a:r>
+          </a:p>
+          <a:p>
+            <a:r>
+              <a:rPr lang="pt-BR" sz="1600" dirty="0">
+                <a:solidFill>
+                  <a:prstClr val="black">
+                    <a:hueOff val="0"/>
+                    <a:satOff val="0"/>
+                    <a:lumOff val="0"/>
+                    <a:alphaOff val="0"/>
+                  </a:prstClr>
+                </a:solidFill>
+                <a:latin typeface="Calibri" panose="020F0502020204030204"/>
+              </a:rPr>
+              <a:t>UX</a:t>
             </a:r>
           </a:p>
         </p:txBody>

</xml_diff>

<commit_message>
PPT v.1 para segunda Sprint
</commit_message>
<xml_diff>
--- a/Documentação/Apresentação - Sprint 1 - 4 sem.pptx
+++ b/Documentação/Apresentação - Sprint 1 - 4 sem.pptx
@@ -13,10 +13,13 @@
     <p:sldId id="310" r:id="rId7"/>
     <p:sldId id="403" r:id="rId8"/>
     <p:sldId id="404" r:id="rId9"/>
-    <p:sldId id="300" r:id="rId10"/>
-    <p:sldId id="294" r:id="rId11"/>
-    <p:sldId id="406" r:id="rId12"/>
-    <p:sldId id="287" r:id="rId13"/>
+    <p:sldId id="408" r:id="rId10"/>
+    <p:sldId id="407" r:id="rId11"/>
+    <p:sldId id="409" r:id="rId12"/>
+    <p:sldId id="300" r:id="rId13"/>
+    <p:sldId id="294" r:id="rId14"/>
+    <p:sldId id="406" r:id="rId15"/>
+    <p:sldId id="287" r:id="rId16"/>
   </p:sldIdLst>
   <p:sldSz cx="12192000" cy="6858000"/>
   <p:notesSz cx="6858000" cy="9144000"/>
@@ -10202,7 +10205,7 @@
     <dgm:pt modelId="{08E7DCE9-8596-467F-8A72-49B9C12A5F46}" type="pres">
       <dgm:prSet presAssocID="{A0A795E9-37AF-4675-BB24-E3A58366F43C}" presName="iconRect" presStyleLbl="node1" presStyleIdx="0" presStyleCnt="1" custScaleX="106053" custScaleY="106053"/>
       <dgm:spPr>
-        <a:blipFill>
+        <a:blipFill rotWithShape="1">
           <a:blip xmlns:r="http://schemas.openxmlformats.org/officeDocument/2006/relationships" r:embed="rId1"/>
           <a:srcRect/>
           <a:stretch>
@@ -11743,7 +11746,7 @@
         <a:prstGeom prst="rect">
           <a:avLst/>
         </a:prstGeom>
-        <a:blipFill>
+        <a:blipFill rotWithShape="1">
           <a:blip xmlns:r="http://schemas.openxmlformats.org/officeDocument/2006/relationships" r:embed="rId1"/>
           <a:srcRect/>
           <a:stretch>
@@ -24668,7 +24671,7 @@
           <a:p>
             <a:fld id="{93AE73D3-A46B-4B9C-965A-78B4CFA46842}" type="datetimeFigureOut">
               <a:rPr lang="pt-BR" smtClean="0"/>
-              <a:t>16/09/2020</a:t>
+              <a:t>21/10/2020</a:t>
             </a:fld>
             <a:endParaRPr lang="pt-BR"/>
           </a:p>
@@ -24866,7 +24869,7 @@
           <a:p>
             <a:fld id="{93AE73D3-A46B-4B9C-965A-78B4CFA46842}" type="datetimeFigureOut">
               <a:rPr lang="pt-BR" smtClean="0"/>
-              <a:t>16/09/2020</a:t>
+              <a:t>21/10/2020</a:t>
             </a:fld>
             <a:endParaRPr lang="pt-BR"/>
           </a:p>
@@ -25074,7 +25077,7 @@
           <a:p>
             <a:fld id="{93AE73D3-A46B-4B9C-965A-78B4CFA46842}" type="datetimeFigureOut">
               <a:rPr lang="pt-BR" smtClean="0"/>
-              <a:t>16/09/2020</a:t>
+              <a:t>21/10/2020</a:t>
             </a:fld>
             <a:endParaRPr lang="pt-BR"/>
           </a:p>
@@ -25272,7 +25275,7 @@
           <a:p>
             <a:fld id="{93AE73D3-A46B-4B9C-965A-78B4CFA46842}" type="datetimeFigureOut">
               <a:rPr lang="pt-BR" smtClean="0"/>
-              <a:t>16/09/2020</a:t>
+              <a:t>21/10/2020</a:t>
             </a:fld>
             <a:endParaRPr lang="pt-BR"/>
           </a:p>
@@ -25547,7 +25550,7 @@
           <a:p>
             <a:fld id="{93AE73D3-A46B-4B9C-965A-78B4CFA46842}" type="datetimeFigureOut">
               <a:rPr lang="pt-BR" smtClean="0"/>
-              <a:t>16/09/2020</a:t>
+              <a:t>21/10/2020</a:t>
             </a:fld>
             <a:endParaRPr lang="pt-BR"/>
           </a:p>
@@ -25812,7 +25815,7 @@
           <a:p>
             <a:fld id="{93AE73D3-A46B-4B9C-965A-78B4CFA46842}" type="datetimeFigureOut">
               <a:rPr lang="pt-BR" smtClean="0"/>
-              <a:t>16/09/2020</a:t>
+              <a:t>21/10/2020</a:t>
             </a:fld>
             <a:endParaRPr lang="pt-BR"/>
           </a:p>
@@ -26224,7 +26227,7 @@
           <a:p>
             <a:fld id="{93AE73D3-A46B-4B9C-965A-78B4CFA46842}" type="datetimeFigureOut">
               <a:rPr lang="pt-BR" smtClean="0"/>
-              <a:t>16/09/2020</a:t>
+              <a:t>21/10/2020</a:t>
             </a:fld>
             <a:endParaRPr lang="pt-BR"/>
           </a:p>
@@ -26365,7 +26368,7 @@
           <a:p>
             <a:fld id="{93AE73D3-A46B-4B9C-965A-78B4CFA46842}" type="datetimeFigureOut">
               <a:rPr lang="pt-BR" smtClean="0"/>
-              <a:t>16/09/2020</a:t>
+              <a:t>21/10/2020</a:t>
             </a:fld>
             <a:endParaRPr lang="pt-BR"/>
           </a:p>
@@ -26478,7 +26481,7 @@
           <a:p>
             <a:fld id="{93AE73D3-A46B-4B9C-965A-78B4CFA46842}" type="datetimeFigureOut">
               <a:rPr lang="pt-BR" smtClean="0"/>
-              <a:t>16/09/2020</a:t>
+              <a:t>21/10/2020</a:t>
             </a:fld>
             <a:endParaRPr lang="pt-BR"/>
           </a:p>
@@ -26789,7 +26792,7 @@
           <a:p>
             <a:fld id="{93AE73D3-A46B-4B9C-965A-78B4CFA46842}" type="datetimeFigureOut">
               <a:rPr lang="pt-BR" smtClean="0"/>
-              <a:t>16/09/2020</a:t>
+              <a:t>21/10/2020</a:t>
             </a:fld>
             <a:endParaRPr lang="pt-BR"/>
           </a:p>
@@ -27077,7 +27080,7 @@
           <a:p>
             <a:fld id="{93AE73D3-A46B-4B9C-965A-78B4CFA46842}" type="datetimeFigureOut">
               <a:rPr lang="pt-BR" smtClean="0"/>
-              <a:t>16/09/2020</a:t>
+              <a:t>21/10/2020</a:t>
             </a:fld>
             <a:endParaRPr lang="pt-BR"/>
           </a:p>
@@ -27318,7 +27321,7 @@
           <a:p>
             <a:fld id="{93AE73D3-A46B-4B9C-965A-78B4CFA46842}" type="datetimeFigureOut">
               <a:rPr lang="pt-BR" smtClean="0"/>
-              <a:t>16/09/2020</a:t>
+              <a:t>21/10/2020</a:t>
             </a:fld>
             <a:endParaRPr lang="pt-BR"/>
           </a:p>
@@ -28032,6 +28035,3249 @@
 </file>
 
 <file path=ppt/slides/slide10.xml><?xml version="1.0" encoding="utf-8"?>
+<p:sld xmlns:a="http://schemas.openxmlformats.org/drawingml/2006/main" xmlns:r="http://schemas.openxmlformats.org/officeDocument/2006/relationships" xmlns:p="http://schemas.openxmlformats.org/presentationml/2006/main">
+  <p:cSld>
+    <p:spTree>
+      <p:nvGrpSpPr>
+        <p:cNvPr id="1" name=""/>
+        <p:cNvGrpSpPr/>
+        <p:nvPr/>
+      </p:nvGrpSpPr>
+      <p:grpSpPr>
+        <a:xfrm>
+          <a:off x="0" y="0"/>
+          <a:ext cx="0" cy="0"/>
+          <a:chOff x="0" y="0"/>
+          <a:chExt cx="0" cy="0"/>
+        </a:xfrm>
+      </p:grpSpPr>
+      <p:sp>
+        <p:nvSpPr>
+          <p:cNvPr id="2" name="Título 1"/>
+          <p:cNvSpPr>
+            <a:spLocks noGrp="1"/>
+          </p:cNvSpPr>
+          <p:nvPr>
+            <p:ph type="title"/>
+          </p:nvPr>
+        </p:nvSpPr>
+        <p:spPr>
+          <a:xfrm>
+            <a:off x="1876329" y="7247"/>
+            <a:ext cx="9882278" cy="1067634"/>
+          </a:xfrm>
+        </p:spPr>
+        <p:txBody>
+          <a:bodyPr anchor="ctr">
+            <a:normAutofit/>
+          </a:bodyPr>
+          <a:lstStyle/>
+          <a:p>
+            <a:r>
+              <a:rPr lang="pt-BR" dirty="0"/>
+              <a:t>Jornada do Usuário 1.1</a:t>
+            </a:r>
+          </a:p>
+        </p:txBody>
+      </p:sp>
+      <p:grpSp>
+        <p:nvGrpSpPr>
+          <p:cNvPr id="12" name="Group 11"/>
+          <p:cNvGrpSpPr>
+            <a:grpSpLocks noGrp="1" noUngrp="1" noRot="1" noChangeAspect="1" noMove="1" noResize="1"/>
+          </p:cNvGrpSpPr>
+          <p:nvPr/>
+        </p:nvGrpSpPr>
+        <p:grpSpPr>
+          <a:xfrm>
+            <a:off x="444125" y="66801"/>
+            <a:ext cx="1128378" cy="847206"/>
+            <a:chOff x="8145259" y="221938"/>
+            <a:chExt cx="1562262" cy="1172973"/>
+          </a:xfrm>
+        </p:grpSpPr>
+        <p:sp>
+          <p:nvSpPr>
+            <p:cNvPr id="13" name="Freeform 5"/>
+            <p:cNvSpPr/>
+            <p:nvPr/>
+          </p:nvSpPr>
+          <p:spPr bwMode="auto">
+            <a:xfrm>
+              <a:off x="8145259" y="570596"/>
+              <a:ext cx="935036" cy="824315"/>
+            </a:xfrm>
+            <a:custGeom>
+              <a:avLst/>
+              <a:gdLst>
+                <a:gd name="T0" fmla="*/ 225 w 785"/>
+                <a:gd name="T1" fmla="*/ 692 h 692"/>
+                <a:gd name="T2" fmla="*/ 177 w 785"/>
+                <a:gd name="T3" fmla="*/ 665 h 692"/>
+                <a:gd name="T4" fmla="*/ 9 w 785"/>
+                <a:gd name="T5" fmla="*/ 374 h 692"/>
+                <a:gd name="T6" fmla="*/ 9 w 785"/>
+                <a:gd name="T7" fmla="*/ 318 h 692"/>
+                <a:gd name="T8" fmla="*/ 177 w 785"/>
+                <a:gd name="T9" fmla="*/ 27 h 692"/>
+                <a:gd name="T10" fmla="*/ 225 w 785"/>
+                <a:gd name="T11" fmla="*/ 0 h 692"/>
+                <a:gd name="T12" fmla="*/ 561 w 785"/>
+                <a:gd name="T13" fmla="*/ 0 h 692"/>
+                <a:gd name="T14" fmla="*/ 609 w 785"/>
+                <a:gd name="T15" fmla="*/ 27 h 692"/>
+                <a:gd name="T16" fmla="*/ 777 w 785"/>
+                <a:gd name="T17" fmla="*/ 318 h 692"/>
+                <a:gd name="T18" fmla="*/ 777 w 785"/>
+                <a:gd name="T19" fmla="*/ 374 h 692"/>
+                <a:gd name="T20" fmla="*/ 609 w 785"/>
+                <a:gd name="T21" fmla="*/ 665 h 692"/>
+                <a:gd name="T22" fmla="*/ 561 w 785"/>
+                <a:gd name="T23" fmla="*/ 692 h 692"/>
+                <a:gd name="T24" fmla="*/ 225 w 785"/>
+                <a:gd name="T25" fmla="*/ 692 h 692"/>
+              </a:gdLst>
+              <a:ahLst/>
+              <a:cxnLst>
+                <a:cxn ang="0">
+                  <a:pos x="T0" y="T1"/>
+                </a:cxn>
+                <a:cxn ang="0">
+                  <a:pos x="T2" y="T3"/>
+                </a:cxn>
+                <a:cxn ang="0">
+                  <a:pos x="T4" y="T5"/>
+                </a:cxn>
+                <a:cxn ang="0">
+                  <a:pos x="T6" y="T7"/>
+                </a:cxn>
+                <a:cxn ang="0">
+                  <a:pos x="T8" y="T9"/>
+                </a:cxn>
+                <a:cxn ang="0">
+                  <a:pos x="T10" y="T11"/>
+                </a:cxn>
+                <a:cxn ang="0">
+                  <a:pos x="T12" y="T13"/>
+                </a:cxn>
+                <a:cxn ang="0">
+                  <a:pos x="T14" y="T15"/>
+                </a:cxn>
+                <a:cxn ang="0">
+                  <a:pos x="T16" y="T17"/>
+                </a:cxn>
+                <a:cxn ang="0">
+                  <a:pos x="T18" y="T19"/>
+                </a:cxn>
+                <a:cxn ang="0">
+                  <a:pos x="T20" y="T21"/>
+                </a:cxn>
+                <a:cxn ang="0">
+                  <a:pos x="T22" y="T23"/>
+                </a:cxn>
+                <a:cxn ang="0">
+                  <a:pos x="T24" y="T25"/>
+                </a:cxn>
+              </a:cxnLst>
+              <a:rect l="0" t="0" r="r" b="b"/>
+              <a:pathLst>
+                <a:path w="785" h="692">
+                  <a:moveTo>
+                    <a:pt x="225" y="692"/>
+                  </a:moveTo>
+                  <a:cubicBezTo>
+                    <a:pt x="207" y="692"/>
+                    <a:pt x="185" y="680"/>
+                    <a:pt x="177" y="665"/>
+                  </a:cubicBezTo>
+                  <a:cubicBezTo>
+                    <a:pt x="9" y="374"/>
+                    <a:pt x="9" y="374"/>
+                    <a:pt x="9" y="374"/>
+                  </a:cubicBezTo>
+                  <a:cubicBezTo>
+                    <a:pt x="0" y="358"/>
+                    <a:pt x="0" y="334"/>
+                    <a:pt x="9" y="318"/>
+                  </a:cubicBezTo>
+                  <a:cubicBezTo>
+                    <a:pt x="177" y="27"/>
+                    <a:pt x="177" y="27"/>
+                    <a:pt x="177" y="27"/>
+                  </a:cubicBezTo>
+                  <a:cubicBezTo>
+                    <a:pt x="185" y="12"/>
+                    <a:pt x="207" y="0"/>
+                    <a:pt x="225" y="0"/>
+                  </a:cubicBezTo>
+                  <a:cubicBezTo>
+                    <a:pt x="561" y="0"/>
+                    <a:pt x="561" y="0"/>
+                    <a:pt x="561" y="0"/>
+                  </a:cubicBezTo>
+                  <a:cubicBezTo>
+                    <a:pt x="578" y="0"/>
+                    <a:pt x="600" y="12"/>
+                    <a:pt x="609" y="27"/>
+                  </a:cubicBezTo>
+                  <a:cubicBezTo>
+                    <a:pt x="777" y="318"/>
+                    <a:pt x="777" y="318"/>
+                    <a:pt x="777" y="318"/>
+                  </a:cubicBezTo>
+                  <a:cubicBezTo>
+                    <a:pt x="785" y="334"/>
+                    <a:pt x="785" y="358"/>
+                    <a:pt x="777" y="374"/>
+                  </a:cubicBezTo>
+                  <a:cubicBezTo>
+                    <a:pt x="609" y="665"/>
+                    <a:pt x="609" y="665"/>
+                    <a:pt x="609" y="665"/>
+                  </a:cubicBezTo>
+                  <a:cubicBezTo>
+                    <a:pt x="600" y="680"/>
+                    <a:pt x="578" y="692"/>
+                    <a:pt x="561" y="692"/>
+                  </a:cubicBezTo>
+                  <a:lnTo>
+                    <a:pt x="225" y="692"/>
+                  </a:lnTo>
+                  <a:close/>
+                </a:path>
+              </a:pathLst>
+            </a:custGeom>
+            <a:noFill/>
+            <a:ln w="28575" cmpd="sng">
+              <a:solidFill>
+                <a:schemeClr val="tx1"/>
+              </a:solidFill>
+            </a:ln>
+          </p:spPr>
+          <p:txBody>
+            <a:bodyPr vert="horz" wrap="square" lIns="91440" tIns="45720" rIns="91440" bIns="45720" numCol="1" anchor="t" anchorCtr="0" compatLnSpc="1"/>
+            <a:lstStyle/>
+            <a:p>
+              <a:endParaRPr lang="en-US"/>
+            </a:p>
+          </p:txBody>
+        </p:sp>
+        <p:sp>
+          <p:nvSpPr>
+            <p:cNvPr id="14" name="Freeform 5"/>
+            <p:cNvSpPr/>
+            <p:nvPr/>
+          </p:nvSpPr>
+          <p:spPr bwMode="auto">
+            <a:xfrm>
+              <a:off x="8945354" y="221938"/>
+              <a:ext cx="762167" cy="671915"/>
+            </a:xfrm>
+            <a:custGeom>
+              <a:avLst/>
+              <a:gdLst>
+                <a:gd name="T0" fmla="*/ 225 w 785"/>
+                <a:gd name="T1" fmla="*/ 692 h 692"/>
+                <a:gd name="T2" fmla="*/ 177 w 785"/>
+                <a:gd name="T3" fmla="*/ 665 h 692"/>
+                <a:gd name="T4" fmla="*/ 9 w 785"/>
+                <a:gd name="T5" fmla="*/ 374 h 692"/>
+                <a:gd name="T6" fmla="*/ 9 w 785"/>
+                <a:gd name="T7" fmla="*/ 318 h 692"/>
+                <a:gd name="T8" fmla="*/ 177 w 785"/>
+                <a:gd name="T9" fmla="*/ 27 h 692"/>
+                <a:gd name="T10" fmla="*/ 225 w 785"/>
+                <a:gd name="T11" fmla="*/ 0 h 692"/>
+                <a:gd name="T12" fmla="*/ 561 w 785"/>
+                <a:gd name="T13" fmla="*/ 0 h 692"/>
+                <a:gd name="T14" fmla="*/ 609 w 785"/>
+                <a:gd name="T15" fmla="*/ 27 h 692"/>
+                <a:gd name="T16" fmla="*/ 777 w 785"/>
+                <a:gd name="T17" fmla="*/ 318 h 692"/>
+                <a:gd name="T18" fmla="*/ 777 w 785"/>
+                <a:gd name="T19" fmla="*/ 374 h 692"/>
+                <a:gd name="T20" fmla="*/ 609 w 785"/>
+                <a:gd name="T21" fmla="*/ 665 h 692"/>
+                <a:gd name="T22" fmla="*/ 561 w 785"/>
+                <a:gd name="T23" fmla="*/ 692 h 692"/>
+                <a:gd name="T24" fmla="*/ 225 w 785"/>
+                <a:gd name="T25" fmla="*/ 692 h 692"/>
+              </a:gdLst>
+              <a:ahLst/>
+              <a:cxnLst>
+                <a:cxn ang="0">
+                  <a:pos x="T0" y="T1"/>
+                </a:cxn>
+                <a:cxn ang="0">
+                  <a:pos x="T2" y="T3"/>
+                </a:cxn>
+                <a:cxn ang="0">
+                  <a:pos x="T4" y="T5"/>
+                </a:cxn>
+                <a:cxn ang="0">
+                  <a:pos x="T6" y="T7"/>
+                </a:cxn>
+                <a:cxn ang="0">
+                  <a:pos x="T8" y="T9"/>
+                </a:cxn>
+                <a:cxn ang="0">
+                  <a:pos x="T10" y="T11"/>
+                </a:cxn>
+                <a:cxn ang="0">
+                  <a:pos x="T12" y="T13"/>
+                </a:cxn>
+                <a:cxn ang="0">
+                  <a:pos x="T14" y="T15"/>
+                </a:cxn>
+                <a:cxn ang="0">
+                  <a:pos x="T16" y="T17"/>
+                </a:cxn>
+                <a:cxn ang="0">
+                  <a:pos x="T18" y="T19"/>
+                </a:cxn>
+                <a:cxn ang="0">
+                  <a:pos x="T20" y="T21"/>
+                </a:cxn>
+                <a:cxn ang="0">
+                  <a:pos x="T22" y="T23"/>
+                </a:cxn>
+                <a:cxn ang="0">
+                  <a:pos x="T24" y="T25"/>
+                </a:cxn>
+              </a:cxnLst>
+              <a:rect l="0" t="0" r="r" b="b"/>
+              <a:pathLst>
+                <a:path w="785" h="692">
+                  <a:moveTo>
+                    <a:pt x="225" y="692"/>
+                  </a:moveTo>
+                  <a:cubicBezTo>
+                    <a:pt x="207" y="692"/>
+                    <a:pt x="185" y="680"/>
+                    <a:pt x="177" y="665"/>
+                  </a:cubicBezTo>
+                  <a:cubicBezTo>
+                    <a:pt x="9" y="374"/>
+                    <a:pt x="9" y="374"/>
+                    <a:pt x="9" y="374"/>
+                  </a:cubicBezTo>
+                  <a:cubicBezTo>
+                    <a:pt x="0" y="358"/>
+                    <a:pt x="0" y="334"/>
+                    <a:pt x="9" y="318"/>
+                  </a:cubicBezTo>
+                  <a:cubicBezTo>
+                    <a:pt x="177" y="27"/>
+                    <a:pt x="177" y="27"/>
+                    <a:pt x="177" y="27"/>
+                  </a:cubicBezTo>
+                  <a:cubicBezTo>
+                    <a:pt x="185" y="12"/>
+                    <a:pt x="207" y="0"/>
+                    <a:pt x="225" y="0"/>
+                  </a:cubicBezTo>
+                  <a:cubicBezTo>
+                    <a:pt x="561" y="0"/>
+                    <a:pt x="561" y="0"/>
+                    <a:pt x="561" y="0"/>
+                  </a:cubicBezTo>
+                  <a:cubicBezTo>
+                    <a:pt x="578" y="0"/>
+                    <a:pt x="600" y="12"/>
+                    <a:pt x="609" y="27"/>
+                  </a:cubicBezTo>
+                  <a:cubicBezTo>
+                    <a:pt x="777" y="318"/>
+                    <a:pt x="777" y="318"/>
+                    <a:pt x="777" y="318"/>
+                  </a:cubicBezTo>
+                  <a:cubicBezTo>
+                    <a:pt x="785" y="334"/>
+                    <a:pt x="785" y="358"/>
+                    <a:pt x="777" y="374"/>
+                  </a:cubicBezTo>
+                  <a:cubicBezTo>
+                    <a:pt x="609" y="665"/>
+                    <a:pt x="609" y="665"/>
+                    <a:pt x="609" y="665"/>
+                  </a:cubicBezTo>
+                  <a:cubicBezTo>
+                    <a:pt x="600" y="680"/>
+                    <a:pt x="578" y="692"/>
+                    <a:pt x="561" y="692"/>
+                  </a:cubicBezTo>
+                  <a:lnTo>
+                    <a:pt x="225" y="692"/>
+                  </a:lnTo>
+                  <a:close/>
+                </a:path>
+              </a:pathLst>
+            </a:custGeom>
+            <a:noFill/>
+            <a:ln w="28575" cmpd="sng">
+              <a:solidFill>
+                <a:schemeClr val="tx1"/>
+              </a:solidFill>
+            </a:ln>
+          </p:spPr>
+          <p:txBody>
+            <a:bodyPr vert="horz" wrap="square" lIns="91440" tIns="45720" rIns="91440" bIns="45720" numCol="1" anchor="t" anchorCtr="0" compatLnSpc="1"/>
+            <a:lstStyle/>
+            <a:p>
+              <a:endParaRPr lang="en-US"/>
+            </a:p>
+          </p:txBody>
+        </p:sp>
+      </p:grpSp>
+      <p:grpSp>
+        <p:nvGrpSpPr>
+          <p:cNvPr id="7174" name="Agrupar 7173">
+            <a:extLst>
+              <a:ext uri="{FF2B5EF4-FFF2-40B4-BE49-F238E27FC236}">
+                <a16:creationId xmlns:a16="http://schemas.microsoft.com/office/drawing/2014/main" id="{96CEF808-EB6E-4B8A-979D-3B4E4956E640}"/>
+              </a:ext>
+            </a:extLst>
+          </p:cNvPr>
+          <p:cNvGrpSpPr/>
+          <p:nvPr/>
+        </p:nvGrpSpPr>
+        <p:grpSpPr>
+          <a:xfrm>
+            <a:off x="540673" y="1326707"/>
+            <a:ext cx="11054382" cy="4000113"/>
+            <a:chOff x="314177" y="1153991"/>
+            <a:chExt cx="11054382" cy="4000113"/>
+          </a:xfrm>
+        </p:grpSpPr>
+        <p:sp>
+          <p:nvSpPr>
+            <p:cNvPr id="17" name="CaixaDeTexto 16">
+              <a:extLst>
+                <a:ext uri="{FF2B5EF4-FFF2-40B4-BE49-F238E27FC236}">
+                  <a16:creationId xmlns:a16="http://schemas.microsoft.com/office/drawing/2014/main" id="{F7374B40-D7D8-4146-9028-B7AE3FA19233}"/>
+                </a:ext>
+              </a:extLst>
+            </p:cNvPr>
+            <p:cNvSpPr txBox="1"/>
+            <p:nvPr/>
+          </p:nvSpPr>
+          <p:spPr>
+            <a:xfrm>
+              <a:off x="3338899" y="1467384"/>
+              <a:ext cx="1321542" cy="338554"/>
+            </a:xfrm>
+            <a:prstGeom prst="rect">
+              <a:avLst/>
+            </a:prstGeom>
+            <a:noFill/>
+          </p:spPr>
+          <p:txBody>
+            <a:bodyPr wrap="square" rtlCol="0">
+              <a:spAutoFit/>
+            </a:bodyPr>
+            <a:lstStyle/>
+            <a:p>
+              <a:r>
+                <a:rPr lang="pt-BR" sz="1600" dirty="0">
+                  <a:solidFill>
+                    <a:schemeClr val="bg1"/>
+                  </a:solidFill>
+                </a:rPr>
+                <a:t>StoryBoard</a:t>
+              </a:r>
+              <a:endParaRPr lang="pt-BR" dirty="0">
+                <a:solidFill>
+                  <a:schemeClr val="bg1"/>
+                </a:solidFill>
+              </a:endParaRPr>
+            </a:p>
+          </p:txBody>
+        </p:sp>
+        <p:sp>
+          <p:nvSpPr>
+            <p:cNvPr id="3" name="Seta: Divisa 2">
+              <a:extLst>
+                <a:ext uri="{FF2B5EF4-FFF2-40B4-BE49-F238E27FC236}">
+                  <a16:creationId xmlns:a16="http://schemas.microsoft.com/office/drawing/2014/main" id="{CED53B77-56AD-4C64-8490-0F754678B737}"/>
+                </a:ext>
+              </a:extLst>
+            </p:cNvPr>
+            <p:cNvSpPr/>
+            <p:nvPr/>
+          </p:nvSpPr>
+          <p:spPr>
+            <a:xfrm>
+              <a:off x="314177" y="3108705"/>
+              <a:ext cx="1656922" cy="469230"/>
+            </a:xfrm>
+            <a:prstGeom prst="chevron">
+              <a:avLst/>
+            </a:prstGeom>
+            <a:solidFill>
+              <a:srgbClr val="70AD47"/>
+            </a:solidFill>
+            <a:ln>
+              <a:noFill/>
+            </a:ln>
+            <a:effectLst/>
+          </p:spPr>
+          <p:txBody>
+            <a:bodyPr rtlCol="0" anchor="ctr"/>
+            <a:lstStyle/>
+            <a:p>
+              <a:pPr algn="ctr"/>
+              <a:endParaRPr lang="pt-BR">
+                <a:solidFill>
+                  <a:schemeClr val="tx1"/>
+                </a:solidFill>
+              </a:endParaRPr>
+            </a:p>
+          </p:txBody>
+        </p:sp>
+        <p:sp>
+          <p:nvSpPr>
+            <p:cNvPr id="4" name="Fluxograma: Conector 3">
+              <a:extLst>
+                <a:ext uri="{FF2B5EF4-FFF2-40B4-BE49-F238E27FC236}">
+                  <a16:creationId xmlns:a16="http://schemas.microsoft.com/office/drawing/2014/main" id="{ADEC9DDE-AED3-4091-93AC-8A7011C23AE8}"/>
+                </a:ext>
+              </a:extLst>
+            </p:cNvPr>
+            <p:cNvSpPr/>
+            <p:nvPr/>
+          </p:nvSpPr>
+          <p:spPr>
+            <a:xfrm>
+              <a:off x="1076212" y="3273611"/>
+              <a:ext cx="132852" cy="135417"/>
+            </a:xfrm>
+            <a:prstGeom prst="flowChartConnector">
+              <a:avLst/>
+            </a:prstGeom>
+            <a:solidFill>
+              <a:schemeClr val="bg1"/>
+            </a:solidFill>
+            <a:ln>
+              <a:solidFill>
+                <a:schemeClr val="bg1"/>
+              </a:solidFill>
+            </a:ln>
+          </p:spPr>
+          <p:style>
+            <a:lnRef idx="2">
+              <a:schemeClr val="accent1">
+                <a:shade val="50000"/>
+              </a:schemeClr>
+            </a:lnRef>
+            <a:fillRef idx="1">
+              <a:schemeClr val="accent1"/>
+            </a:fillRef>
+            <a:effectRef idx="0">
+              <a:schemeClr val="accent1"/>
+            </a:effectRef>
+            <a:fontRef idx="minor">
+              <a:schemeClr val="lt1"/>
+            </a:fontRef>
+          </p:style>
+          <p:txBody>
+            <a:bodyPr rtlCol="0" anchor="ctr"/>
+            <a:lstStyle/>
+            <a:p>
+              <a:pPr algn="ctr"/>
+              <a:endParaRPr lang="pt-BR" dirty="0"/>
+            </a:p>
+          </p:txBody>
+        </p:sp>
+        <p:sp>
+          <p:nvSpPr>
+            <p:cNvPr id="7" name="Seta: Divisa 6">
+              <a:extLst>
+                <a:ext uri="{FF2B5EF4-FFF2-40B4-BE49-F238E27FC236}">
+                  <a16:creationId xmlns:a16="http://schemas.microsoft.com/office/drawing/2014/main" id="{55D738AF-A1B1-4A42-90BE-9116375C1DA8}"/>
+                </a:ext>
+              </a:extLst>
+            </p:cNvPr>
+            <p:cNvSpPr/>
+            <p:nvPr/>
+          </p:nvSpPr>
+          <p:spPr>
+            <a:xfrm>
+              <a:off x="4034077" y="3104653"/>
+              <a:ext cx="1700573" cy="469230"/>
+            </a:xfrm>
+            <a:prstGeom prst="chevron">
+              <a:avLst/>
+            </a:prstGeom>
+            <a:solidFill>
+              <a:srgbClr val="70AD47"/>
+            </a:solidFill>
+            <a:ln>
+              <a:noFill/>
+            </a:ln>
+            <a:effectLst/>
+          </p:spPr>
+          <p:txBody>
+            <a:bodyPr rtlCol="0" anchor="ctr"/>
+            <a:lstStyle/>
+            <a:p>
+              <a:pPr algn="ctr"/>
+              <a:endParaRPr lang="pt-BR">
+                <a:solidFill>
+                  <a:schemeClr val="tx1"/>
+                </a:solidFill>
+              </a:endParaRPr>
+            </a:p>
+          </p:txBody>
+        </p:sp>
+        <p:sp>
+          <p:nvSpPr>
+            <p:cNvPr id="8" name="Fluxograma: Conector 7">
+              <a:extLst>
+                <a:ext uri="{FF2B5EF4-FFF2-40B4-BE49-F238E27FC236}">
+                  <a16:creationId xmlns:a16="http://schemas.microsoft.com/office/drawing/2014/main" id="{CFA53C1E-C90C-4D1F-8F0E-B07D73B3DF0F}"/>
+                </a:ext>
+              </a:extLst>
+            </p:cNvPr>
+            <p:cNvSpPr/>
+            <p:nvPr/>
+          </p:nvSpPr>
+          <p:spPr>
+            <a:xfrm>
+              <a:off x="4817937" y="3289244"/>
+              <a:ext cx="132852" cy="135417"/>
+            </a:xfrm>
+            <a:prstGeom prst="flowChartConnector">
+              <a:avLst/>
+            </a:prstGeom>
+            <a:solidFill>
+              <a:schemeClr val="bg1"/>
+            </a:solidFill>
+            <a:ln>
+              <a:solidFill>
+                <a:schemeClr val="bg1"/>
+              </a:solidFill>
+            </a:ln>
+          </p:spPr>
+          <p:style>
+            <a:lnRef idx="2">
+              <a:schemeClr val="accent1">
+                <a:shade val="50000"/>
+              </a:schemeClr>
+            </a:lnRef>
+            <a:fillRef idx="1">
+              <a:schemeClr val="accent1"/>
+            </a:fillRef>
+            <a:effectRef idx="0">
+              <a:schemeClr val="accent1"/>
+            </a:effectRef>
+            <a:fontRef idx="minor">
+              <a:schemeClr val="lt1"/>
+            </a:fontRef>
+          </p:style>
+          <p:txBody>
+            <a:bodyPr rtlCol="0" anchor="ctr"/>
+            <a:lstStyle/>
+            <a:p>
+              <a:pPr algn="ctr"/>
+              <a:endParaRPr lang="pt-BR"/>
+            </a:p>
+          </p:txBody>
+        </p:sp>
+        <p:sp>
+          <p:nvSpPr>
+            <p:cNvPr id="9" name="Seta: Divisa 8">
+              <a:extLst>
+                <a:ext uri="{FF2B5EF4-FFF2-40B4-BE49-F238E27FC236}">
+                  <a16:creationId xmlns:a16="http://schemas.microsoft.com/office/drawing/2014/main" id="{A7FB240F-A0C1-4419-98A2-48806BAF26FF}"/>
+                </a:ext>
+              </a:extLst>
+            </p:cNvPr>
+            <p:cNvSpPr/>
+            <p:nvPr/>
+          </p:nvSpPr>
+          <p:spPr>
+            <a:xfrm>
+              <a:off x="5829315" y="3104653"/>
+              <a:ext cx="1656922" cy="469230"/>
+            </a:xfrm>
+            <a:prstGeom prst="chevron">
+              <a:avLst/>
+            </a:prstGeom>
+            <a:solidFill>
+              <a:srgbClr val="70AD47"/>
+            </a:solidFill>
+            <a:ln>
+              <a:noFill/>
+            </a:ln>
+            <a:effectLst/>
+          </p:spPr>
+          <p:txBody>
+            <a:bodyPr rtlCol="0" anchor="ctr"/>
+            <a:lstStyle/>
+            <a:p>
+              <a:pPr algn="ctr"/>
+              <a:endParaRPr lang="pt-BR">
+                <a:solidFill>
+                  <a:schemeClr val="tx1"/>
+                </a:solidFill>
+              </a:endParaRPr>
+            </a:p>
+          </p:txBody>
+        </p:sp>
+        <p:sp>
+          <p:nvSpPr>
+            <p:cNvPr id="10" name="Fluxograma: Conector 9">
+              <a:extLst>
+                <a:ext uri="{FF2B5EF4-FFF2-40B4-BE49-F238E27FC236}">
+                  <a16:creationId xmlns:a16="http://schemas.microsoft.com/office/drawing/2014/main" id="{6CB1BB23-6361-4565-B8BE-D10C08D1B81B}"/>
+                </a:ext>
+              </a:extLst>
+            </p:cNvPr>
+            <p:cNvSpPr/>
+            <p:nvPr/>
+          </p:nvSpPr>
+          <p:spPr>
+            <a:xfrm>
+              <a:off x="6591350" y="3289244"/>
+              <a:ext cx="132852" cy="135417"/>
+            </a:xfrm>
+            <a:prstGeom prst="flowChartConnector">
+              <a:avLst/>
+            </a:prstGeom>
+            <a:solidFill>
+              <a:schemeClr val="bg1"/>
+            </a:solidFill>
+            <a:ln>
+              <a:solidFill>
+                <a:schemeClr val="bg1"/>
+              </a:solidFill>
+            </a:ln>
+          </p:spPr>
+          <p:style>
+            <a:lnRef idx="2">
+              <a:schemeClr val="accent1">
+                <a:shade val="50000"/>
+              </a:schemeClr>
+            </a:lnRef>
+            <a:fillRef idx="1">
+              <a:schemeClr val="accent1"/>
+            </a:fillRef>
+            <a:effectRef idx="0">
+              <a:schemeClr val="accent1"/>
+            </a:effectRef>
+            <a:fontRef idx="minor">
+              <a:schemeClr val="lt1"/>
+            </a:fontRef>
+          </p:style>
+          <p:txBody>
+            <a:bodyPr rtlCol="0" anchor="ctr"/>
+            <a:lstStyle/>
+            <a:p>
+              <a:pPr algn="ctr"/>
+              <a:endParaRPr lang="pt-BR"/>
+            </a:p>
+          </p:txBody>
+        </p:sp>
+        <p:sp>
+          <p:nvSpPr>
+            <p:cNvPr id="11" name="Seta: Divisa 10">
+              <a:extLst>
+                <a:ext uri="{FF2B5EF4-FFF2-40B4-BE49-F238E27FC236}">
+                  <a16:creationId xmlns:a16="http://schemas.microsoft.com/office/drawing/2014/main" id="{427354E3-7F11-4DD2-9170-A8E8B1D4C92E}"/>
+                </a:ext>
+              </a:extLst>
+            </p:cNvPr>
+            <p:cNvSpPr/>
+            <p:nvPr/>
+          </p:nvSpPr>
+          <p:spPr>
+            <a:xfrm>
+              <a:off x="7593769" y="3120177"/>
+              <a:ext cx="1656922" cy="469230"/>
+            </a:xfrm>
+            <a:prstGeom prst="chevron">
+              <a:avLst/>
+            </a:prstGeom>
+            <a:solidFill>
+              <a:srgbClr val="70AD47"/>
+            </a:solidFill>
+            <a:ln>
+              <a:noFill/>
+            </a:ln>
+            <a:effectLst/>
+          </p:spPr>
+          <p:txBody>
+            <a:bodyPr rtlCol="0" anchor="ctr"/>
+            <a:lstStyle/>
+            <a:p>
+              <a:pPr algn="ctr"/>
+              <a:endParaRPr lang="pt-BR">
+                <a:solidFill>
+                  <a:schemeClr val="tx1"/>
+                </a:solidFill>
+              </a:endParaRPr>
+            </a:p>
+          </p:txBody>
+        </p:sp>
+        <p:sp>
+          <p:nvSpPr>
+            <p:cNvPr id="74" name="Fluxograma: Conector 73">
+              <a:extLst>
+                <a:ext uri="{FF2B5EF4-FFF2-40B4-BE49-F238E27FC236}">
+                  <a16:creationId xmlns:a16="http://schemas.microsoft.com/office/drawing/2014/main" id="{32FF19E8-C580-4817-8428-F3BD437CA451}"/>
+                </a:ext>
+              </a:extLst>
+            </p:cNvPr>
+            <p:cNvSpPr/>
+            <p:nvPr/>
+          </p:nvSpPr>
+          <p:spPr>
+            <a:xfrm>
+              <a:off x="8355804" y="3289244"/>
+              <a:ext cx="132852" cy="135417"/>
+            </a:xfrm>
+            <a:prstGeom prst="flowChartConnector">
+              <a:avLst/>
+            </a:prstGeom>
+            <a:solidFill>
+              <a:schemeClr val="bg1"/>
+            </a:solidFill>
+            <a:ln>
+              <a:solidFill>
+                <a:schemeClr val="bg1"/>
+              </a:solidFill>
+            </a:ln>
+          </p:spPr>
+          <p:style>
+            <a:lnRef idx="2">
+              <a:schemeClr val="accent1">
+                <a:shade val="50000"/>
+              </a:schemeClr>
+            </a:lnRef>
+            <a:fillRef idx="1">
+              <a:schemeClr val="accent1"/>
+            </a:fillRef>
+            <a:effectRef idx="0">
+              <a:schemeClr val="accent1"/>
+            </a:effectRef>
+            <a:fontRef idx="minor">
+              <a:schemeClr val="lt1"/>
+            </a:fontRef>
+          </p:style>
+          <p:txBody>
+            <a:bodyPr rtlCol="0" anchor="ctr"/>
+            <a:lstStyle/>
+            <a:p>
+              <a:pPr algn="ctr"/>
+              <a:endParaRPr lang="pt-BR"/>
+            </a:p>
+          </p:txBody>
+        </p:sp>
+        <p:pic>
+          <p:nvPicPr>
+            <p:cNvPr id="1026" name="Picture 2" descr="Pesquisar ícone de círculo - Baixar PNG/SVG Transparente">
+              <a:extLst>
+                <a:ext uri="{FF2B5EF4-FFF2-40B4-BE49-F238E27FC236}">
+                  <a16:creationId xmlns:a16="http://schemas.microsoft.com/office/drawing/2014/main" id="{77ADA266-DFF6-4C83-B7A3-0EE340D31D60}"/>
+                </a:ext>
+              </a:extLst>
+            </p:cNvPr>
+            <p:cNvPicPr>
+              <a:picLocks noChangeAspect="1" noChangeArrowheads="1"/>
+            </p:cNvPicPr>
+            <p:nvPr/>
+          </p:nvPicPr>
+          <p:blipFill>
+            <a:blip r:embed="rId2">
+              <a:extLst>
+                <a:ext uri="{28A0092B-C50C-407E-A947-70E740481C1C}">
+                  <a14:useLocalDpi xmlns:a14="http://schemas.microsoft.com/office/drawing/2010/main" val="0"/>
+                </a:ext>
+              </a:extLst>
+            </a:blip>
+            <a:srcRect/>
+            <a:stretch>
+              <a:fillRect/>
+            </a:stretch>
+          </p:blipFill>
+          <p:spPr bwMode="auto">
+            <a:xfrm>
+              <a:off x="802375" y="1604910"/>
+              <a:ext cx="727999" cy="727999"/>
+            </a:xfrm>
+            <a:prstGeom prst="rect">
+              <a:avLst/>
+            </a:prstGeom>
+            <a:solidFill>
+              <a:srgbClr val="70AD47"/>
+            </a:solidFill>
+          </p:spPr>
+        </p:pic>
+        <p:sp>
+          <p:nvSpPr>
+            <p:cNvPr id="15" name="CaixaDeTexto 14">
+              <a:extLst>
+                <a:ext uri="{FF2B5EF4-FFF2-40B4-BE49-F238E27FC236}">
+                  <a16:creationId xmlns:a16="http://schemas.microsoft.com/office/drawing/2014/main" id="{F1227811-99C8-4195-9C15-D825BD5EBC5C}"/>
+                </a:ext>
+              </a:extLst>
+            </p:cNvPr>
+            <p:cNvSpPr txBox="1"/>
+            <p:nvPr/>
+          </p:nvSpPr>
+          <p:spPr>
+            <a:xfrm>
+              <a:off x="325166" y="3930543"/>
+              <a:ext cx="1914826" cy="461665"/>
+            </a:xfrm>
+            <a:prstGeom prst="rect">
+              <a:avLst/>
+            </a:prstGeom>
+            <a:noFill/>
+          </p:spPr>
+          <p:txBody>
+            <a:bodyPr wrap="square" rtlCol="0">
+              <a:spAutoFit/>
+            </a:bodyPr>
+            <a:lstStyle/>
+            <a:p>
+              <a:r>
+                <a:rPr lang="pt-BR" sz="1200" dirty="0"/>
+                <a:t>Procura plataforma de jogos em equipes</a:t>
+              </a:r>
+            </a:p>
+          </p:txBody>
+        </p:sp>
+        <p:sp>
+          <p:nvSpPr>
+            <p:cNvPr id="16" name="CaixaDeTexto 15">
+              <a:extLst>
+                <a:ext uri="{FF2B5EF4-FFF2-40B4-BE49-F238E27FC236}">
+                  <a16:creationId xmlns:a16="http://schemas.microsoft.com/office/drawing/2014/main" id="{3AE35AB6-F9F6-4AD5-85B8-60242A1AF721}"/>
+                </a:ext>
+              </a:extLst>
+            </p:cNvPr>
+            <p:cNvSpPr txBox="1"/>
+            <p:nvPr/>
+          </p:nvSpPr>
+          <p:spPr>
+            <a:xfrm>
+              <a:off x="2575009" y="2272254"/>
+              <a:ext cx="1554023" cy="461665"/>
+            </a:xfrm>
+            <a:prstGeom prst="rect">
+              <a:avLst/>
+            </a:prstGeom>
+            <a:noFill/>
+          </p:spPr>
+          <p:txBody>
+            <a:bodyPr wrap="square" rtlCol="0">
+              <a:spAutoFit/>
+            </a:bodyPr>
+            <a:lstStyle>
+              <a:defPPr>
+                <a:defRPr lang="pt-BR"/>
+              </a:defPPr>
+              <a:lvl1pPr>
+                <a:defRPr sz="1200"/>
+              </a:lvl1pPr>
+            </a:lstStyle>
+            <a:p>
+              <a:r>
+                <a:rPr lang="pt-BR" dirty="0"/>
+                <a:t>Acessa nossa plataforma</a:t>
+              </a:r>
+            </a:p>
+          </p:txBody>
+        </p:sp>
+        <p:sp>
+          <p:nvSpPr>
+            <p:cNvPr id="22" name="CaixaDeTexto 21">
+              <a:extLst>
+                <a:ext uri="{FF2B5EF4-FFF2-40B4-BE49-F238E27FC236}">
+                  <a16:creationId xmlns:a16="http://schemas.microsoft.com/office/drawing/2014/main" id="{1A7C2DA4-C445-4AAD-919F-F12F63A96B3B}"/>
+                </a:ext>
+              </a:extLst>
+            </p:cNvPr>
+            <p:cNvSpPr txBox="1"/>
+            <p:nvPr/>
+          </p:nvSpPr>
+          <p:spPr>
+            <a:xfrm>
+              <a:off x="4256819" y="3913036"/>
+              <a:ext cx="1477831" cy="646331"/>
+            </a:xfrm>
+            <a:prstGeom prst="rect">
+              <a:avLst/>
+            </a:prstGeom>
+            <a:noFill/>
+          </p:spPr>
+          <p:txBody>
+            <a:bodyPr wrap="square" rtlCol="0">
+              <a:spAutoFit/>
+            </a:bodyPr>
+            <a:lstStyle>
+              <a:defPPr>
+                <a:defRPr lang="pt-BR"/>
+              </a:defPPr>
+              <a:lvl1pPr>
+                <a:defRPr sz="1200"/>
+              </a:lvl1pPr>
+            </a:lstStyle>
+            <a:p>
+              <a:r>
+                <a:rPr lang="pt-BR" dirty="0"/>
+                <a:t>Primeira utilização inserido em uma equipe</a:t>
+              </a:r>
+            </a:p>
+          </p:txBody>
+        </p:sp>
+        <p:sp>
+          <p:nvSpPr>
+            <p:cNvPr id="23" name="CaixaDeTexto 22">
+              <a:extLst>
+                <a:ext uri="{FF2B5EF4-FFF2-40B4-BE49-F238E27FC236}">
+                  <a16:creationId xmlns:a16="http://schemas.microsoft.com/office/drawing/2014/main" id="{E2789D45-E782-443F-A9FE-A2E2C5D8BB8B}"/>
+                </a:ext>
+              </a:extLst>
+            </p:cNvPr>
+            <p:cNvSpPr txBox="1"/>
+            <p:nvPr/>
+          </p:nvSpPr>
+          <p:spPr>
+            <a:xfrm>
+              <a:off x="5980385" y="2274914"/>
+              <a:ext cx="1405391" cy="461665"/>
+            </a:xfrm>
+            <a:prstGeom prst="rect">
+              <a:avLst/>
+            </a:prstGeom>
+            <a:noFill/>
+          </p:spPr>
+          <p:txBody>
+            <a:bodyPr wrap="square" rtlCol="0">
+              <a:spAutoFit/>
+            </a:bodyPr>
+            <a:lstStyle>
+              <a:defPPr>
+                <a:defRPr lang="pt-BR"/>
+              </a:defPPr>
+              <a:lvl1pPr>
+                <a:defRPr sz="1200"/>
+              </a:lvl1pPr>
+            </a:lstStyle>
+            <a:p>
+              <a:r>
+                <a:rPr lang="pt-BR" dirty="0"/>
+                <a:t>Descobre mais sobre a plataforma</a:t>
+              </a:r>
+            </a:p>
+          </p:txBody>
+        </p:sp>
+        <p:sp>
+          <p:nvSpPr>
+            <p:cNvPr id="24" name="CaixaDeTexto 23">
+              <a:extLst>
+                <a:ext uri="{FF2B5EF4-FFF2-40B4-BE49-F238E27FC236}">
+                  <a16:creationId xmlns:a16="http://schemas.microsoft.com/office/drawing/2014/main" id="{D1A42427-6C0E-4F30-9DB3-663B16C7DD7D}"/>
+                </a:ext>
+              </a:extLst>
+            </p:cNvPr>
+            <p:cNvSpPr txBox="1"/>
+            <p:nvPr/>
+          </p:nvSpPr>
+          <p:spPr>
+            <a:xfrm>
+              <a:off x="7712822" y="3930542"/>
+              <a:ext cx="1846466" cy="461665"/>
+            </a:xfrm>
+            <a:prstGeom prst="rect">
+              <a:avLst/>
+            </a:prstGeom>
+            <a:noFill/>
+          </p:spPr>
+          <p:txBody>
+            <a:bodyPr wrap="square" rtlCol="0">
+              <a:spAutoFit/>
+            </a:bodyPr>
+            <a:lstStyle>
+              <a:defPPr>
+                <a:defRPr lang="pt-BR"/>
+              </a:defPPr>
+              <a:lvl1pPr>
+                <a:defRPr sz="1200"/>
+              </a:lvl1pPr>
+            </a:lstStyle>
+            <a:p>
+              <a:r>
+                <a:rPr lang="pt-BR" dirty="0"/>
+                <a:t>Inicia suas próprias equipes</a:t>
+              </a:r>
+            </a:p>
+          </p:txBody>
+        </p:sp>
+        <p:sp>
+          <p:nvSpPr>
+            <p:cNvPr id="25" name="Seta: Divisa 24">
+              <a:extLst>
+                <a:ext uri="{FF2B5EF4-FFF2-40B4-BE49-F238E27FC236}">
+                  <a16:creationId xmlns:a16="http://schemas.microsoft.com/office/drawing/2014/main" id="{D6E4BBEE-55BA-4CB3-B662-BFC224A690D1}"/>
+                </a:ext>
+              </a:extLst>
+            </p:cNvPr>
+            <p:cNvSpPr/>
+            <p:nvPr/>
+          </p:nvSpPr>
+          <p:spPr>
+            <a:xfrm>
+              <a:off x="9522093" y="3120177"/>
+              <a:ext cx="1656922" cy="469230"/>
+            </a:xfrm>
+            <a:prstGeom prst="chevron">
+              <a:avLst/>
+            </a:prstGeom>
+            <a:solidFill>
+              <a:srgbClr val="70AD47"/>
+            </a:solidFill>
+            <a:ln>
+              <a:noFill/>
+            </a:ln>
+            <a:effectLst/>
+          </p:spPr>
+          <p:txBody>
+            <a:bodyPr rtlCol="0" anchor="ctr"/>
+            <a:lstStyle/>
+            <a:p>
+              <a:pPr algn="ctr"/>
+              <a:endParaRPr lang="pt-BR">
+                <a:solidFill>
+                  <a:schemeClr val="tx1"/>
+                </a:solidFill>
+              </a:endParaRPr>
+            </a:p>
+          </p:txBody>
+        </p:sp>
+        <p:sp>
+          <p:nvSpPr>
+            <p:cNvPr id="27" name="Fluxograma: Conector 26">
+              <a:extLst>
+                <a:ext uri="{FF2B5EF4-FFF2-40B4-BE49-F238E27FC236}">
+                  <a16:creationId xmlns:a16="http://schemas.microsoft.com/office/drawing/2014/main" id="{07D4A557-E56B-490A-A454-34D19C02DDAB}"/>
+                </a:ext>
+              </a:extLst>
+            </p:cNvPr>
+            <p:cNvSpPr/>
+            <p:nvPr/>
+          </p:nvSpPr>
+          <p:spPr>
+            <a:xfrm>
+              <a:off x="10284128" y="3289244"/>
+              <a:ext cx="132852" cy="135417"/>
+            </a:xfrm>
+            <a:prstGeom prst="flowChartConnector">
+              <a:avLst/>
+            </a:prstGeom>
+            <a:solidFill>
+              <a:schemeClr val="bg1"/>
+            </a:solidFill>
+            <a:ln>
+              <a:solidFill>
+                <a:schemeClr val="bg1"/>
+              </a:solidFill>
+            </a:ln>
+          </p:spPr>
+          <p:style>
+            <a:lnRef idx="2">
+              <a:schemeClr val="accent1">
+                <a:shade val="50000"/>
+              </a:schemeClr>
+            </a:lnRef>
+            <a:fillRef idx="1">
+              <a:schemeClr val="accent1"/>
+            </a:fillRef>
+            <a:effectRef idx="0">
+              <a:schemeClr val="accent1"/>
+            </a:effectRef>
+            <a:fontRef idx="minor">
+              <a:schemeClr val="lt1"/>
+            </a:fontRef>
+          </p:style>
+          <p:txBody>
+            <a:bodyPr rtlCol="0" anchor="ctr"/>
+            <a:lstStyle/>
+            <a:p>
+              <a:pPr algn="ctr"/>
+              <a:endParaRPr lang="pt-BR"/>
+            </a:p>
+          </p:txBody>
+        </p:sp>
+        <p:sp>
+          <p:nvSpPr>
+            <p:cNvPr id="29" name="CaixaDeTexto 28">
+              <a:extLst>
+                <a:ext uri="{FF2B5EF4-FFF2-40B4-BE49-F238E27FC236}">
+                  <a16:creationId xmlns:a16="http://schemas.microsoft.com/office/drawing/2014/main" id="{0EF0F0EC-EA4D-4DFF-AFE7-F6932DE74418}"/>
+                </a:ext>
+              </a:extLst>
+            </p:cNvPr>
+            <p:cNvSpPr txBox="1"/>
+            <p:nvPr/>
+          </p:nvSpPr>
+          <p:spPr>
+            <a:xfrm>
+              <a:off x="9522093" y="2345402"/>
+              <a:ext cx="1846466" cy="276999"/>
+            </a:xfrm>
+            <a:prstGeom prst="rect">
+              <a:avLst/>
+            </a:prstGeom>
+            <a:noFill/>
+          </p:spPr>
+          <p:txBody>
+            <a:bodyPr wrap="square" rtlCol="0">
+              <a:spAutoFit/>
+            </a:bodyPr>
+            <a:lstStyle>
+              <a:defPPr>
+                <a:defRPr lang="pt-BR"/>
+              </a:defPPr>
+              <a:lvl1pPr>
+                <a:defRPr sz="1200"/>
+              </a:lvl1pPr>
+            </a:lstStyle>
+            <a:p>
+              <a:r>
+                <a:rPr lang="pt-BR" dirty="0"/>
+                <a:t>Divulga nossa plataforma</a:t>
+              </a:r>
+            </a:p>
+          </p:txBody>
+        </p:sp>
+        <p:sp>
+          <p:nvSpPr>
+            <p:cNvPr id="5" name="Seta: Divisa 4">
+              <a:extLst>
+                <a:ext uri="{FF2B5EF4-FFF2-40B4-BE49-F238E27FC236}">
+                  <a16:creationId xmlns:a16="http://schemas.microsoft.com/office/drawing/2014/main" id="{24FA62E5-4524-4159-8D18-B2D7DD0E77CE}"/>
+                </a:ext>
+              </a:extLst>
+            </p:cNvPr>
+            <p:cNvSpPr/>
+            <p:nvPr/>
+          </p:nvSpPr>
+          <p:spPr>
+            <a:xfrm>
+              <a:off x="2254670" y="3120177"/>
+              <a:ext cx="1656922" cy="469230"/>
+            </a:xfrm>
+            <a:prstGeom prst="chevron">
+              <a:avLst/>
+            </a:prstGeom>
+            <a:solidFill>
+              <a:srgbClr val="70AD47"/>
+            </a:solidFill>
+            <a:ln>
+              <a:noFill/>
+            </a:ln>
+            <a:effectLst/>
+          </p:spPr>
+          <p:txBody>
+            <a:bodyPr rtlCol="0" anchor="ctr"/>
+            <a:lstStyle/>
+            <a:p>
+              <a:pPr algn="ctr"/>
+              <a:endParaRPr lang="pt-BR">
+                <a:solidFill>
+                  <a:schemeClr val="tx1"/>
+                </a:solidFill>
+              </a:endParaRPr>
+            </a:p>
+          </p:txBody>
+        </p:sp>
+        <p:sp>
+          <p:nvSpPr>
+            <p:cNvPr id="6" name="Fluxograma: Conector 5">
+              <a:extLst>
+                <a:ext uri="{FF2B5EF4-FFF2-40B4-BE49-F238E27FC236}">
+                  <a16:creationId xmlns:a16="http://schemas.microsoft.com/office/drawing/2014/main" id="{CDD3821E-CC9B-40D2-A0A0-2868D09A5952}"/>
+                </a:ext>
+              </a:extLst>
+            </p:cNvPr>
+            <p:cNvSpPr/>
+            <p:nvPr/>
+          </p:nvSpPr>
+          <p:spPr>
+            <a:xfrm>
+              <a:off x="3016705" y="3289244"/>
+              <a:ext cx="132852" cy="135417"/>
+            </a:xfrm>
+            <a:prstGeom prst="flowChartConnector">
+              <a:avLst/>
+            </a:prstGeom>
+            <a:solidFill>
+              <a:schemeClr val="bg1"/>
+            </a:solidFill>
+            <a:ln>
+              <a:solidFill>
+                <a:schemeClr val="bg1"/>
+              </a:solidFill>
+            </a:ln>
+          </p:spPr>
+          <p:style>
+            <a:lnRef idx="2">
+              <a:schemeClr val="accent1">
+                <a:shade val="50000"/>
+              </a:schemeClr>
+            </a:lnRef>
+            <a:fillRef idx="1">
+              <a:schemeClr val="accent1"/>
+            </a:fillRef>
+            <a:effectRef idx="0">
+              <a:schemeClr val="accent1"/>
+            </a:effectRef>
+            <a:fontRef idx="minor">
+              <a:schemeClr val="lt1"/>
+            </a:fontRef>
+          </p:style>
+          <p:txBody>
+            <a:bodyPr rtlCol="0" anchor="ctr"/>
+            <a:lstStyle/>
+            <a:p>
+              <a:pPr algn="ctr"/>
+              <a:endParaRPr lang="pt-BR"/>
+            </a:p>
+          </p:txBody>
+        </p:sp>
+        <p:grpSp>
+          <p:nvGrpSpPr>
+            <p:cNvPr id="34" name="Agrupar 33">
+              <a:extLst>
+                <a:ext uri="{FF2B5EF4-FFF2-40B4-BE49-F238E27FC236}">
+                  <a16:creationId xmlns:a16="http://schemas.microsoft.com/office/drawing/2014/main" id="{38F4471F-EA3A-4799-9F1D-67A7E8BE61B0}"/>
+                </a:ext>
+              </a:extLst>
+            </p:cNvPr>
+            <p:cNvGrpSpPr/>
+            <p:nvPr/>
+          </p:nvGrpSpPr>
+          <p:grpSpPr>
+            <a:xfrm>
+              <a:off x="2740092" y="4043114"/>
+              <a:ext cx="723471" cy="1110990"/>
+              <a:chOff x="2734193" y="3602472"/>
+              <a:chExt cx="723471" cy="1110990"/>
+            </a:xfrm>
+          </p:grpSpPr>
+          <p:pic>
+            <p:nvPicPr>
+              <p:cNvPr id="2050" name="Picture 2" descr="Ícone do gamepad - Baixar PNG/SVG Transparente">
+                <a:extLst>
+                  <a:ext uri="{FF2B5EF4-FFF2-40B4-BE49-F238E27FC236}">
+                    <a16:creationId xmlns:a16="http://schemas.microsoft.com/office/drawing/2014/main" id="{E9FB1CE6-5F17-424F-8339-1CD1528014AF}"/>
+                  </a:ext>
+                </a:extLst>
+              </p:cNvPr>
+              <p:cNvPicPr>
+                <a:picLocks noChangeAspect="1" noChangeArrowheads="1"/>
+              </p:cNvPicPr>
+              <p:nvPr/>
+            </p:nvPicPr>
+            <p:blipFill>
+              <a:blip r:embed="rId3">
+                <a:extLst>
+                  <a:ext uri="{28A0092B-C50C-407E-A947-70E740481C1C}">
+                    <a14:useLocalDpi xmlns:a14="http://schemas.microsoft.com/office/drawing/2010/main" val="0"/>
+                  </a:ext>
+                </a:extLst>
+              </a:blip>
+              <a:srcRect/>
+              <a:stretch>
+                <a:fillRect/>
+              </a:stretch>
+            </p:blipFill>
+            <p:spPr bwMode="auto">
+              <a:xfrm>
+                <a:off x="2734193" y="3985463"/>
+                <a:ext cx="723471" cy="727999"/>
+              </a:xfrm>
+              <a:prstGeom prst="rect">
+                <a:avLst/>
+              </a:prstGeom>
+              <a:solidFill>
+                <a:schemeClr val="accent6"/>
+              </a:solidFill>
+            </p:spPr>
+          </p:pic>
+          <p:pic>
+            <p:nvPicPr>
+              <p:cNvPr id="31" name="Imagem 30" descr="Uma imagem contendo Logotipo&#10;&#10;Descrição gerada automaticamente">
+                <a:extLst>
+                  <a:ext uri="{FF2B5EF4-FFF2-40B4-BE49-F238E27FC236}">
+                    <a16:creationId xmlns:a16="http://schemas.microsoft.com/office/drawing/2014/main" id="{7B413F85-C21F-43CC-9261-C1CAD8929637}"/>
+                  </a:ext>
+                </a:extLst>
+              </p:cNvPr>
+              <p:cNvPicPr>
+                <a:picLocks noChangeAspect="1"/>
+              </p:cNvPicPr>
+              <p:nvPr/>
+            </p:nvPicPr>
+            <p:blipFill>
+              <a:blip r:embed="rId4">
+                <a:extLst>
+                  <a:ext uri="{28A0092B-C50C-407E-A947-70E740481C1C}">
+                    <a14:useLocalDpi xmlns:a14="http://schemas.microsoft.com/office/drawing/2010/main" val="0"/>
+                  </a:ext>
+                </a:extLst>
+              </a:blip>
+              <a:stretch>
+                <a:fillRect/>
+              </a:stretch>
+            </p:blipFill>
+            <p:spPr>
+              <a:xfrm>
+                <a:off x="2852459" y="3602472"/>
+                <a:ext cx="486938" cy="469231"/>
+              </a:xfrm>
+              <a:prstGeom prst="rect">
+                <a:avLst/>
+              </a:prstGeom>
+            </p:spPr>
+          </p:pic>
+        </p:grpSp>
+        <p:grpSp>
+          <p:nvGrpSpPr>
+            <p:cNvPr id="28" name="Agrupar 27">
+              <a:extLst>
+                <a:ext uri="{FF2B5EF4-FFF2-40B4-BE49-F238E27FC236}">
+                  <a16:creationId xmlns:a16="http://schemas.microsoft.com/office/drawing/2014/main" id="{2B9F31D5-1201-4FB9-8F8D-CF79B29B9D35}"/>
+                </a:ext>
+              </a:extLst>
+            </p:cNvPr>
+            <p:cNvGrpSpPr/>
+            <p:nvPr/>
+          </p:nvGrpSpPr>
+          <p:grpSpPr>
+            <a:xfrm>
+              <a:off x="8072673" y="1153991"/>
+              <a:ext cx="1426121" cy="1092997"/>
+              <a:chOff x="4550216" y="1467384"/>
+              <a:chExt cx="1426121" cy="1092997"/>
+            </a:xfrm>
+          </p:grpSpPr>
+          <p:sp>
+            <p:nvSpPr>
+              <p:cNvPr id="26" name="Retângulo 25">
+                <a:extLst>
+                  <a:ext uri="{FF2B5EF4-FFF2-40B4-BE49-F238E27FC236}">
+                    <a16:creationId xmlns:a16="http://schemas.microsoft.com/office/drawing/2014/main" id="{29C83B49-23F2-49CF-B377-A9468098F529}"/>
+                  </a:ext>
+                </a:extLst>
+              </p:cNvPr>
+              <p:cNvSpPr/>
+              <p:nvPr/>
+            </p:nvSpPr>
+            <p:spPr>
+              <a:xfrm>
+                <a:off x="4550216" y="1832381"/>
+                <a:ext cx="679080" cy="728000"/>
+              </a:xfrm>
+              <a:prstGeom prst="rect">
+                <a:avLst/>
+              </a:prstGeom>
+              <a:solidFill>
+                <a:schemeClr val="accent6"/>
+              </a:solidFill>
+              <a:ln>
+                <a:solidFill>
+                  <a:srgbClr val="92D050"/>
+                </a:solidFill>
+              </a:ln>
+            </p:spPr>
+            <p:style>
+              <a:lnRef idx="2">
+                <a:schemeClr val="accent1">
+                  <a:shade val="50000"/>
+                </a:schemeClr>
+              </a:lnRef>
+              <a:fillRef idx="1">
+                <a:schemeClr val="accent1"/>
+              </a:fillRef>
+              <a:effectRef idx="0">
+                <a:schemeClr val="accent1"/>
+              </a:effectRef>
+              <a:fontRef idx="minor">
+                <a:schemeClr val="lt1"/>
+              </a:fontRef>
+            </p:style>
+            <p:txBody>
+              <a:bodyPr rtlCol="0" anchor="ctr"/>
+              <a:lstStyle/>
+              <a:p>
+                <a:pPr algn="ctr"/>
+                <a:endParaRPr lang="pt-BR"/>
+              </a:p>
+            </p:txBody>
+          </p:sp>
+          <p:sp>
+            <p:nvSpPr>
+              <p:cNvPr id="18" name="CaixaDeTexto 17">
+                <a:extLst>
+                  <a:ext uri="{FF2B5EF4-FFF2-40B4-BE49-F238E27FC236}">
+                    <a16:creationId xmlns:a16="http://schemas.microsoft.com/office/drawing/2014/main" id="{0579A070-173E-4D8B-98FC-347B77DB9ADE}"/>
+                  </a:ext>
+                </a:extLst>
+              </p:cNvPr>
+              <p:cNvSpPr txBox="1"/>
+              <p:nvPr/>
+            </p:nvSpPr>
+            <p:spPr>
+              <a:xfrm>
+                <a:off x="4776636" y="1467384"/>
+                <a:ext cx="1199701" cy="338554"/>
+              </a:xfrm>
+              <a:prstGeom prst="rect">
+                <a:avLst/>
+              </a:prstGeom>
+              <a:noFill/>
+              <a:effectLst/>
+            </p:spPr>
+            <p:txBody>
+              <a:bodyPr wrap="square" rtlCol="0">
+                <a:spAutoFit/>
+              </a:bodyPr>
+              <a:lstStyle/>
+              <a:p>
+                <a:r>
+                  <a:rPr lang="pt-BR" sz="1600" dirty="0">
+                    <a:solidFill>
+                      <a:schemeClr val="bg1"/>
+                    </a:solidFill>
+                  </a:rPr>
+                  <a:t>Requisitos</a:t>
+                </a:r>
+                <a:endParaRPr lang="pt-BR" dirty="0">
+                  <a:solidFill>
+                    <a:schemeClr val="bg1"/>
+                  </a:solidFill>
+                </a:endParaRPr>
+              </a:p>
+            </p:txBody>
+          </p:sp>
+          <p:pic>
+            <p:nvPicPr>
+              <p:cNvPr id="5122" name="Picture 2" descr="Mundial de LoL 2019: de Flamengo a SKT, saiba tudo sobre os 24 times que  participam do campeonato | lol | Sportv">
+                <a:extLst>
+                  <a:ext uri="{FF2B5EF4-FFF2-40B4-BE49-F238E27FC236}">
+                    <a16:creationId xmlns:a16="http://schemas.microsoft.com/office/drawing/2014/main" id="{92B622EB-51B8-4270-B8F0-9DADA0ABE146}"/>
+                  </a:ext>
+                </a:extLst>
+              </p:cNvPr>
+              <p:cNvPicPr>
+                <a:picLocks noChangeAspect="1" noChangeArrowheads="1"/>
+              </p:cNvPicPr>
+              <p:nvPr/>
+            </p:nvPicPr>
+            <p:blipFill>
+              <a:blip r:embed="rId5">
+                <a:extLst>
+                  <a:ext uri="{28A0092B-C50C-407E-A947-70E740481C1C}">
+                    <a14:useLocalDpi xmlns:a14="http://schemas.microsoft.com/office/drawing/2010/main" val="0"/>
+                  </a:ext>
+                </a:extLst>
+              </a:blip>
+              <a:srcRect/>
+              <a:stretch>
+                <a:fillRect/>
+              </a:stretch>
+            </p:blipFill>
+            <p:spPr bwMode="auto">
+              <a:xfrm>
+                <a:off x="4599213" y="1938509"/>
+                <a:ext cx="580918" cy="515743"/>
+              </a:xfrm>
+              <a:prstGeom prst="rect">
+                <a:avLst/>
+              </a:prstGeom>
+              <a:noFill/>
+              <a:extLst>
+                <a:ext uri="{909E8E84-426E-40DD-AFC4-6F175D3DCCD1}">
+                  <a14:hiddenFill xmlns:a14="http://schemas.microsoft.com/office/drawing/2010/main">
+                    <a:solidFill>
+                      <a:srgbClr val="FFFFFF"/>
+                    </a:solidFill>
+                  </a14:hiddenFill>
+                </a:ext>
+              </a:extLst>
+            </p:spPr>
+          </p:pic>
+        </p:grpSp>
+        <p:pic>
+          <p:nvPicPr>
+            <p:cNvPr id="6146" name="Picture 2" descr="Discovery - Free miscellaneous icons">
+              <a:extLst>
+                <a:ext uri="{FF2B5EF4-FFF2-40B4-BE49-F238E27FC236}">
+                  <a16:creationId xmlns:a16="http://schemas.microsoft.com/office/drawing/2014/main" id="{BDE8C2D7-AC91-45A8-97BC-6ADF3618C494}"/>
+                </a:ext>
+              </a:extLst>
+            </p:cNvPr>
+            <p:cNvPicPr>
+              <a:picLocks noChangeAspect="1" noChangeArrowheads="1"/>
+            </p:cNvPicPr>
+            <p:nvPr/>
+          </p:nvPicPr>
+          <p:blipFill>
+            <a:blip r:embed="rId6">
+              <a:extLst>
+                <a:ext uri="{28A0092B-C50C-407E-A947-70E740481C1C}">
+                  <a14:useLocalDpi xmlns:a14="http://schemas.microsoft.com/office/drawing/2010/main" val="0"/>
+                </a:ext>
+              </a:extLst>
+            </a:blip>
+            <a:srcRect/>
+            <a:stretch>
+              <a:fillRect/>
+            </a:stretch>
+          </p:blipFill>
+          <p:spPr bwMode="auto">
+            <a:xfrm>
+              <a:off x="6293777" y="4426105"/>
+              <a:ext cx="727999" cy="697097"/>
+            </a:xfrm>
+            <a:prstGeom prst="rect">
+              <a:avLst/>
+            </a:prstGeom>
+            <a:solidFill>
+              <a:schemeClr val="accent6"/>
+            </a:solidFill>
+          </p:spPr>
+        </p:pic>
+        <p:pic>
+          <p:nvPicPr>
+            <p:cNvPr id="7170" name="Picture 2" descr="Quer fazer uma equipe amadora ? [Leia] - Riot Games">
+              <a:extLst>
+                <a:ext uri="{FF2B5EF4-FFF2-40B4-BE49-F238E27FC236}">
+                  <a16:creationId xmlns:a16="http://schemas.microsoft.com/office/drawing/2014/main" id="{E128C1FB-2A35-403E-BA10-E4027229234D}"/>
+                </a:ext>
+              </a:extLst>
+            </p:cNvPr>
+            <p:cNvPicPr>
+              <a:picLocks noChangeAspect="1" noChangeArrowheads="1"/>
+            </p:cNvPicPr>
+            <p:nvPr/>
+          </p:nvPicPr>
+          <p:blipFill>
+            <a:blip r:embed="rId7">
+              <a:extLst>
+                <a:ext uri="{28A0092B-C50C-407E-A947-70E740481C1C}">
+                  <a14:useLocalDpi xmlns:a14="http://schemas.microsoft.com/office/drawing/2010/main" val="0"/>
+                </a:ext>
+              </a:extLst>
+            </a:blip>
+            <a:srcRect/>
+            <a:stretch>
+              <a:fillRect/>
+            </a:stretch>
+          </p:blipFill>
+          <p:spPr bwMode="auto">
+            <a:xfrm>
+              <a:off x="4474817" y="1604910"/>
+              <a:ext cx="794093" cy="740492"/>
+            </a:xfrm>
+            <a:prstGeom prst="rect">
+              <a:avLst/>
+            </a:prstGeom>
+            <a:solidFill>
+              <a:schemeClr val="accent6"/>
+            </a:solidFill>
+          </p:spPr>
+        </p:pic>
+        <p:grpSp>
+          <p:nvGrpSpPr>
+            <p:cNvPr id="53" name="Agrupar 52">
+              <a:extLst>
+                <a:ext uri="{FF2B5EF4-FFF2-40B4-BE49-F238E27FC236}">
+                  <a16:creationId xmlns:a16="http://schemas.microsoft.com/office/drawing/2014/main" id="{3827E9E3-E91C-488A-AA95-4413B8BCA945}"/>
+                </a:ext>
+              </a:extLst>
+            </p:cNvPr>
+            <p:cNvGrpSpPr/>
+            <p:nvPr/>
+          </p:nvGrpSpPr>
+          <p:grpSpPr>
+            <a:xfrm>
+              <a:off x="9988818" y="4077841"/>
+              <a:ext cx="723471" cy="1062195"/>
+              <a:chOff x="10055244" y="3505562"/>
+              <a:chExt cx="723471" cy="1062195"/>
+            </a:xfrm>
+          </p:grpSpPr>
+          <p:pic>
+            <p:nvPicPr>
+              <p:cNvPr id="8194" name="Picture 2" descr="crescimento icone">
+                <a:extLst>
+                  <a:ext uri="{FF2B5EF4-FFF2-40B4-BE49-F238E27FC236}">
+                    <a16:creationId xmlns:a16="http://schemas.microsoft.com/office/drawing/2014/main" id="{D47B6416-6B04-46B3-9B9E-D7D2C357E3F0}"/>
+                  </a:ext>
+                </a:extLst>
+              </p:cNvPr>
+              <p:cNvPicPr>
+                <a:picLocks noChangeAspect="1" noChangeArrowheads="1"/>
+              </p:cNvPicPr>
+              <p:nvPr/>
+            </p:nvPicPr>
+            <p:blipFill>
+              <a:blip r:embed="rId8">
+                <a:extLst>
+                  <a:ext uri="{28A0092B-C50C-407E-A947-70E740481C1C}">
+                    <a14:useLocalDpi xmlns:a14="http://schemas.microsoft.com/office/drawing/2010/main" val="0"/>
+                  </a:ext>
+                </a:extLst>
+              </a:blip>
+              <a:srcRect/>
+              <a:stretch>
+                <a:fillRect/>
+              </a:stretch>
+            </p:blipFill>
+            <p:spPr bwMode="auto">
+              <a:xfrm>
+                <a:off x="10055244" y="3878948"/>
+                <a:ext cx="723471" cy="688809"/>
+              </a:xfrm>
+              <a:prstGeom prst="rect">
+                <a:avLst/>
+              </a:prstGeom>
+              <a:solidFill>
+                <a:schemeClr val="accent6"/>
+              </a:solidFill>
+            </p:spPr>
+          </p:pic>
+          <p:pic>
+            <p:nvPicPr>
+              <p:cNvPr id="19" name="Imagem 18" descr="Uma imagem contendo Logotipo&#10;&#10;Descrição gerada automaticamente">
+                <a:extLst>
+                  <a:ext uri="{FF2B5EF4-FFF2-40B4-BE49-F238E27FC236}">
+                    <a16:creationId xmlns:a16="http://schemas.microsoft.com/office/drawing/2014/main" id="{942377C0-DA38-4348-B871-730A11CC891A}"/>
+                  </a:ext>
+                </a:extLst>
+              </p:cNvPr>
+              <p:cNvPicPr>
+                <a:picLocks noChangeAspect="1"/>
+              </p:cNvPicPr>
+              <p:nvPr/>
+            </p:nvPicPr>
+            <p:blipFill>
+              <a:blip r:embed="rId4">
+                <a:extLst>
+                  <a:ext uri="{28A0092B-C50C-407E-A947-70E740481C1C}">
+                    <a14:useLocalDpi xmlns:a14="http://schemas.microsoft.com/office/drawing/2010/main" val="0"/>
+                  </a:ext>
+                </a:extLst>
+              </a:blip>
+              <a:stretch>
+                <a:fillRect/>
+              </a:stretch>
+            </p:blipFill>
+            <p:spPr>
+              <a:xfrm>
+                <a:off x="10185039" y="3505562"/>
+                <a:ext cx="486938" cy="469231"/>
+              </a:xfrm>
+              <a:prstGeom prst="rect">
+                <a:avLst/>
+              </a:prstGeom>
+            </p:spPr>
+          </p:pic>
+        </p:grpSp>
+        <p:cxnSp>
+          <p:nvCxnSpPr>
+            <p:cNvPr id="32" name="Conector reto 31">
+              <a:extLst>
+                <a:ext uri="{FF2B5EF4-FFF2-40B4-BE49-F238E27FC236}">
+                  <a16:creationId xmlns:a16="http://schemas.microsoft.com/office/drawing/2014/main" id="{BD527B4F-0E07-4368-A6AB-69464EAF5B3A}"/>
+                </a:ext>
+              </a:extLst>
+            </p:cNvPr>
+            <p:cNvCxnSpPr>
+              <a:cxnSpLocks/>
+            </p:cNvCxnSpPr>
+            <p:nvPr/>
+          </p:nvCxnSpPr>
+          <p:spPr>
+            <a:xfrm flipH="1">
+              <a:off x="1164322" y="2332909"/>
+              <a:ext cx="4104" cy="759251"/>
+            </a:xfrm>
+            <a:prstGeom prst="line">
+              <a:avLst/>
+            </a:prstGeom>
+            <a:ln>
+              <a:solidFill>
+                <a:srgbClr val="92D050"/>
+              </a:solidFill>
+            </a:ln>
+          </p:spPr>
+          <p:style>
+            <a:lnRef idx="1">
+              <a:schemeClr val="accent1"/>
+            </a:lnRef>
+            <a:fillRef idx="0">
+              <a:schemeClr val="accent1"/>
+            </a:fillRef>
+            <a:effectRef idx="0">
+              <a:schemeClr val="accent1"/>
+            </a:effectRef>
+            <a:fontRef idx="minor">
+              <a:schemeClr val="tx1"/>
+            </a:fontRef>
+          </p:style>
+        </p:cxnSp>
+        <p:cxnSp>
+          <p:nvCxnSpPr>
+            <p:cNvPr id="35" name="Conector reto 34">
+              <a:extLst>
+                <a:ext uri="{FF2B5EF4-FFF2-40B4-BE49-F238E27FC236}">
+                  <a16:creationId xmlns:a16="http://schemas.microsoft.com/office/drawing/2014/main" id="{D46D12B5-6CDB-4E78-BCA3-BA21FC264239}"/>
+                </a:ext>
+              </a:extLst>
+            </p:cNvPr>
+            <p:cNvCxnSpPr>
+              <a:cxnSpLocks/>
+              <a:endCxn id="31" idx="0"/>
+            </p:cNvCxnSpPr>
+            <p:nvPr/>
+          </p:nvCxnSpPr>
+          <p:spPr>
+            <a:xfrm>
+              <a:off x="3095929" y="3559815"/>
+              <a:ext cx="5898" cy="483299"/>
+            </a:xfrm>
+            <a:prstGeom prst="line">
+              <a:avLst/>
+            </a:prstGeom>
+            <a:ln>
+              <a:solidFill>
+                <a:srgbClr val="92D050"/>
+              </a:solidFill>
+            </a:ln>
+          </p:spPr>
+          <p:style>
+            <a:lnRef idx="1">
+              <a:schemeClr val="accent1"/>
+            </a:lnRef>
+            <a:fillRef idx="0">
+              <a:schemeClr val="accent1"/>
+            </a:fillRef>
+            <a:effectRef idx="0">
+              <a:schemeClr val="accent1"/>
+            </a:effectRef>
+            <a:fontRef idx="minor">
+              <a:schemeClr val="tx1"/>
+            </a:fontRef>
+          </p:style>
+        </p:cxnSp>
+        <p:cxnSp>
+          <p:nvCxnSpPr>
+            <p:cNvPr id="41" name="Conector reto 40">
+              <a:extLst>
+                <a:ext uri="{FF2B5EF4-FFF2-40B4-BE49-F238E27FC236}">
+                  <a16:creationId xmlns:a16="http://schemas.microsoft.com/office/drawing/2014/main" id="{0A7E7D23-07A0-445F-91DF-B5EC2A78FAA0}"/>
+                </a:ext>
+              </a:extLst>
+            </p:cNvPr>
+            <p:cNvCxnSpPr>
+              <a:cxnSpLocks/>
+              <a:stCxn id="7170" idx="2"/>
+            </p:cNvCxnSpPr>
+            <p:nvPr/>
+          </p:nvCxnSpPr>
+          <p:spPr>
+            <a:xfrm>
+              <a:off x="4871864" y="2345402"/>
+              <a:ext cx="0" cy="759250"/>
+            </a:xfrm>
+            <a:prstGeom prst="line">
+              <a:avLst/>
+            </a:prstGeom>
+            <a:ln>
+              <a:solidFill>
+                <a:srgbClr val="92D050"/>
+              </a:solidFill>
+            </a:ln>
+          </p:spPr>
+          <p:style>
+            <a:lnRef idx="1">
+              <a:schemeClr val="accent1"/>
+            </a:lnRef>
+            <a:fillRef idx="0">
+              <a:schemeClr val="accent1"/>
+            </a:fillRef>
+            <a:effectRef idx="0">
+              <a:schemeClr val="accent1"/>
+            </a:effectRef>
+            <a:fontRef idx="minor">
+              <a:schemeClr val="tx1"/>
+            </a:fontRef>
+          </p:style>
+        </p:cxnSp>
+        <p:cxnSp>
+          <p:nvCxnSpPr>
+            <p:cNvPr id="47" name="Conector reto 46">
+              <a:extLst>
+                <a:ext uri="{FF2B5EF4-FFF2-40B4-BE49-F238E27FC236}">
+                  <a16:creationId xmlns:a16="http://schemas.microsoft.com/office/drawing/2014/main" id="{D6B92290-BE3C-455F-9BA3-1A69FACAD3A6}"/>
+                </a:ext>
+              </a:extLst>
+            </p:cNvPr>
+            <p:cNvCxnSpPr>
+              <a:cxnSpLocks/>
+              <a:endCxn id="6146" idx="0"/>
+            </p:cNvCxnSpPr>
+            <p:nvPr/>
+          </p:nvCxnSpPr>
+          <p:spPr>
+            <a:xfrm>
+              <a:off x="6657776" y="3573883"/>
+              <a:ext cx="1" cy="852222"/>
+            </a:xfrm>
+            <a:prstGeom prst="line">
+              <a:avLst/>
+            </a:prstGeom>
+            <a:ln>
+              <a:solidFill>
+                <a:srgbClr val="92D050"/>
+              </a:solidFill>
+            </a:ln>
+          </p:spPr>
+          <p:style>
+            <a:lnRef idx="1">
+              <a:schemeClr val="accent1"/>
+            </a:lnRef>
+            <a:fillRef idx="0">
+              <a:schemeClr val="accent1"/>
+            </a:fillRef>
+            <a:effectRef idx="0">
+              <a:schemeClr val="accent1"/>
+            </a:effectRef>
+            <a:fontRef idx="minor">
+              <a:schemeClr val="tx1"/>
+            </a:fontRef>
+          </p:style>
+        </p:cxnSp>
+        <p:cxnSp>
+          <p:nvCxnSpPr>
+            <p:cNvPr id="52" name="Conector reto 51">
+              <a:extLst>
+                <a:ext uri="{FF2B5EF4-FFF2-40B4-BE49-F238E27FC236}">
+                  <a16:creationId xmlns:a16="http://schemas.microsoft.com/office/drawing/2014/main" id="{6CFD0B12-0B83-441D-AAFF-DCA6B6697568}"/>
+                </a:ext>
+              </a:extLst>
+            </p:cNvPr>
+            <p:cNvCxnSpPr>
+              <a:cxnSpLocks/>
+            </p:cNvCxnSpPr>
+            <p:nvPr/>
+          </p:nvCxnSpPr>
+          <p:spPr>
+            <a:xfrm>
+              <a:off x="8416358" y="2259301"/>
+              <a:ext cx="1" cy="852222"/>
+            </a:xfrm>
+            <a:prstGeom prst="line">
+              <a:avLst/>
+            </a:prstGeom>
+            <a:ln>
+              <a:solidFill>
+                <a:srgbClr val="92D050"/>
+              </a:solidFill>
+            </a:ln>
+          </p:spPr>
+          <p:style>
+            <a:lnRef idx="1">
+              <a:schemeClr val="accent1"/>
+            </a:lnRef>
+            <a:fillRef idx="0">
+              <a:schemeClr val="accent1"/>
+            </a:fillRef>
+            <a:effectRef idx="0">
+              <a:schemeClr val="accent1"/>
+            </a:effectRef>
+            <a:fontRef idx="minor">
+              <a:schemeClr val="tx1"/>
+            </a:fontRef>
+          </p:style>
+        </p:cxnSp>
+        <p:cxnSp>
+          <p:nvCxnSpPr>
+            <p:cNvPr id="7173" name="Conector reto 7172">
+              <a:extLst>
+                <a:ext uri="{FF2B5EF4-FFF2-40B4-BE49-F238E27FC236}">
+                  <a16:creationId xmlns:a16="http://schemas.microsoft.com/office/drawing/2014/main" id="{00FA3049-508C-4A20-ACA5-29EC12003271}"/>
+                </a:ext>
+              </a:extLst>
+            </p:cNvPr>
+            <p:cNvCxnSpPr>
+              <a:cxnSpLocks/>
+            </p:cNvCxnSpPr>
+            <p:nvPr/>
+          </p:nvCxnSpPr>
+          <p:spPr>
+            <a:xfrm>
+              <a:off x="10353593" y="3588977"/>
+              <a:ext cx="5898" cy="483299"/>
+            </a:xfrm>
+            <a:prstGeom prst="line">
+              <a:avLst/>
+            </a:prstGeom>
+            <a:ln>
+              <a:solidFill>
+                <a:srgbClr val="92D050"/>
+              </a:solidFill>
+            </a:ln>
+          </p:spPr>
+          <p:style>
+            <a:lnRef idx="1">
+              <a:schemeClr val="accent1"/>
+            </a:lnRef>
+            <a:fillRef idx="0">
+              <a:schemeClr val="accent1"/>
+            </a:fillRef>
+            <a:effectRef idx="0">
+              <a:schemeClr val="accent1"/>
+            </a:effectRef>
+            <a:fontRef idx="minor">
+              <a:schemeClr val="tx1"/>
+            </a:fontRef>
+          </p:style>
+        </p:cxnSp>
+      </p:grpSp>
+    </p:spTree>
+    <p:extLst>
+      <p:ext uri="{BB962C8B-B14F-4D97-AF65-F5344CB8AC3E}">
+        <p14:creationId xmlns:p14="http://schemas.microsoft.com/office/powerpoint/2010/main" val="2556591824"/>
+      </p:ext>
+    </p:extLst>
+  </p:cSld>
+  <p:clrMapOvr>
+    <a:masterClrMapping/>
+  </p:clrMapOvr>
+</p:sld>
+</file>
+
+<file path=ppt/slides/slide11.xml><?xml version="1.0" encoding="utf-8"?>
+<p:sld xmlns:a="http://schemas.openxmlformats.org/drawingml/2006/main" xmlns:r="http://schemas.openxmlformats.org/officeDocument/2006/relationships" xmlns:p="http://schemas.openxmlformats.org/presentationml/2006/main">
+  <p:cSld>
+    <p:spTree>
+      <p:nvGrpSpPr>
+        <p:cNvPr id="1" name=""/>
+        <p:cNvGrpSpPr/>
+        <p:nvPr/>
+      </p:nvGrpSpPr>
+      <p:grpSpPr>
+        <a:xfrm>
+          <a:off x="0" y="0"/>
+          <a:ext cx="0" cy="0"/>
+          <a:chOff x="0" y="0"/>
+          <a:chExt cx="0" cy="0"/>
+        </a:xfrm>
+      </p:grpSpPr>
+      <p:sp>
+        <p:nvSpPr>
+          <p:cNvPr id="2" name="Título 1"/>
+          <p:cNvSpPr>
+            <a:spLocks noGrp="1"/>
+          </p:cNvSpPr>
+          <p:nvPr>
+            <p:ph type="title"/>
+          </p:nvPr>
+        </p:nvSpPr>
+        <p:spPr>
+          <a:xfrm>
+            <a:off x="1876329" y="7247"/>
+            <a:ext cx="9882278" cy="1067634"/>
+          </a:xfrm>
+        </p:spPr>
+        <p:txBody>
+          <a:bodyPr anchor="ctr">
+            <a:normAutofit/>
+          </a:bodyPr>
+          <a:lstStyle/>
+          <a:p>
+            <a:r>
+              <a:rPr lang="pt-BR" dirty="0"/>
+              <a:t>Matriz de Concorrência</a:t>
+            </a:r>
+          </a:p>
+        </p:txBody>
+      </p:sp>
+      <p:grpSp>
+        <p:nvGrpSpPr>
+          <p:cNvPr id="12" name="Group 11"/>
+          <p:cNvGrpSpPr>
+            <a:grpSpLocks noGrp="1" noUngrp="1" noRot="1" noChangeAspect="1" noMove="1" noResize="1"/>
+          </p:cNvGrpSpPr>
+          <p:nvPr/>
+        </p:nvGrpSpPr>
+        <p:grpSpPr>
+          <a:xfrm>
+            <a:off x="444125" y="66801"/>
+            <a:ext cx="1128378" cy="847206"/>
+            <a:chOff x="8145259" y="221938"/>
+            <a:chExt cx="1562262" cy="1172973"/>
+          </a:xfrm>
+        </p:grpSpPr>
+        <p:sp>
+          <p:nvSpPr>
+            <p:cNvPr id="13" name="Freeform 5"/>
+            <p:cNvSpPr/>
+            <p:nvPr/>
+          </p:nvSpPr>
+          <p:spPr bwMode="auto">
+            <a:xfrm>
+              <a:off x="8145259" y="570596"/>
+              <a:ext cx="935036" cy="824315"/>
+            </a:xfrm>
+            <a:custGeom>
+              <a:avLst/>
+              <a:gdLst>
+                <a:gd name="T0" fmla="*/ 225 w 785"/>
+                <a:gd name="T1" fmla="*/ 692 h 692"/>
+                <a:gd name="T2" fmla="*/ 177 w 785"/>
+                <a:gd name="T3" fmla="*/ 665 h 692"/>
+                <a:gd name="T4" fmla="*/ 9 w 785"/>
+                <a:gd name="T5" fmla="*/ 374 h 692"/>
+                <a:gd name="T6" fmla="*/ 9 w 785"/>
+                <a:gd name="T7" fmla="*/ 318 h 692"/>
+                <a:gd name="T8" fmla="*/ 177 w 785"/>
+                <a:gd name="T9" fmla="*/ 27 h 692"/>
+                <a:gd name="T10" fmla="*/ 225 w 785"/>
+                <a:gd name="T11" fmla="*/ 0 h 692"/>
+                <a:gd name="T12" fmla="*/ 561 w 785"/>
+                <a:gd name="T13" fmla="*/ 0 h 692"/>
+                <a:gd name="T14" fmla="*/ 609 w 785"/>
+                <a:gd name="T15" fmla="*/ 27 h 692"/>
+                <a:gd name="T16" fmla="*/ 777 w 785"/>
+                <a:gd name="T17" fmla="*/ 318 h 692"/>
+                <a:gd name="T18" fmla="*/ 777 w 785"/>
+                <a:gd name="T19" fmla="*/ 374 h 692"/>
+                <a:gd name="T20" fmla="*/ 609 w 785"/>
+                <a:gd name="T21" fmla="*/ 665 h 692"/>
+                <a:gd name="T22" fmla="*/ 561 w 785"/>
+                <a:gd name="T23" fmla="*/ 692 h 692"/>
+                <a:gd name="T24" fmla="*/ 225 w 785"/>
+                <a:gd name="T25" fmla="*/ 692 h 692"/>
+              </a:gdLst>
+              <a:ahLst/>
+              <a:cxnLst>
+                <a:cxn ang="0">
+                  <a:pos x="T0" y="T1"/>
+                </a:cxn>
+                <a:cxn ang="0">
+                  <a:pos x="T2" y="T3"/>
+                </a:cxn>
+                <a:cxn ang="0">
+                  <a:pos x="T4" y="T5"/>
+                </a:cxn>
+                <a:cxn ang="0">
+                  <a:pos x="T6" y="T7"/>
+                </a:cxn>
+                <a:cxn ang="0">
+                  <a:pos x="T8" y="T9"/>
+                </a:cxn>
+                <a:cxn ang="0">
+                  <a:pos x="T10" y="T11"/>
+                </a:cxn>
+                <a:cxn ang="0">
+                  <a:pos x="T12" y="T13"/>
+                </a:cxn>
+                <a:cxn ang="0">
+                  <a:pos x="T14" y="T15"/>
+                </a:cxn>
+                <a:cxn ang="0">
+                  <a:pos x="T16" y="T17"/>
+                </a:cxn>
+                <a:cxn ang="0">
+                  <a:pos x="T18" y="T19"/>
+                </a:cxn>
+                <a:cxn ang="0">
+                  <a:pos x="T20" y="T21"/>
+                </a:cxn>
+                <a:cxn ang="0">
+                  <a:pos x="T22" y="T23"/>
+                </a:cxn>
+                <a:cxn ang="0">
+                  <a:pos x="T24" y="T25"/>
+                </a:cxn>
+              </a:cxnLst>
+              <a:rect l="0" t="0" r="r" b="b"/>
+              <a:pathLst>
+                <a:path w="785" h="692">
+                  <a:moveTo>
+                    <a:pt x="225" y="692"/>
+                  </a:moveTo>
+                  <a:cubicBezTo>
+                    <a:pt x="207" y="692"/>
+                    <a:pt x="185" y="680"/>
+                    <a:pt x="177" y="665"/>
+                  </a:cubicBezTo>
+                  <a:cubicBezTo>
+                    <a:pt x="9" y="374"/>
+                    <a:pt x="9" y="374"/>
+                    <a:pt x="9" y="374"/>
+                  </a:cubicBezTo>
+                  <a:cubicBezTo>
+                    <a:pt x="0" y="358"/>
+                    <a:pt x="0" y="334"/>
+                    <a:pt x="9" y="318"/>
+                  </a:cubicBezTo>
+                  <a:cubicBezTo>
+                    <a:pt x="177" y="27"/>
+                    <a:pt x="177" y="27"/>
+                    <a:pt x="177" y="27"/>
+                  </a:cubicBezTo>
+                  <a:cubicBezTo>
+                    <a:pt x="185" y="12"/>
+                    <a:pt x="207" y="0"/>
+                    <a:pt x="225" y="0"/>
+                  </a:cubicBezTo>
+                  <a:cubicBezTo>
+                    <a:pt x="561" y="0"/>
+                    <a:pt x="561" y="0"/>
+                    <a:pt x="561" y="0"/>
+                  </a:cubicBezTo>
+                  <a:cubicBezTo>
+                    <a:pt x="578" y="0"/>
+                    <a:pt x="600" y="12"/>
+                    <a:pt x="609" y="27"/>
+                  </a:cubicBezTo>
+                  <a:cubicBezTo>
+                    <a:pt x="777" y="318"/>
+                    <a:pt x="777" y="318"/>
+                    <a:pt x="777" y="318"/>
+                  </a:cubicBezTo>
+                  <a:cubicBezTo>
+                    <a:pt x="785" y="334"/>
+                    <a:pt x="785" y="358"/>
+                    <a:pt x="777" y="374"/>
+                  </a:cubicBezTo>
+                  <a:cubicBezTo>
+                    <a:pt x="609" y="665"/>
+                    <a:pt x="609" y="665"/>
+                    <a:pt x="609" y="665"/>
+                  </a:cubicBezTo>
+                  <a:cubicBezTo>
+                    <a:pt x="600" y="680"/>
+                    <a:pt x="578" y="692"/>
+                    <a:pt x="561" y="692"/>
+                  </a:cubicBezTo>
+                  <a:lnTo>
+                    <a:pt x="225" y="692"/>
+                  </a:lnTo>
+                  <a:close/>
+                </a:path>
+              </a:pathLst>
+            </a:custGeom>
+            <a:noFill/>
+            <a:ln w="28575" cmpd="sng">
+              <a:solidFill>
+                <a:schemeClr val="tx1"/>
+              </a:solidFill>
+            </a:ln>
+          </p:spPr>
+          <p:txBody>
+            <a:bodyPr vert="horz" wrap="square" lIns="91440" tIns="45720" rIns="91440" bIns="45720" numCol="1" anchor="t" anchorCtr="0" compatLnSpc="1"/>
+            <a:lstStyle/>
+            <a:p>
+              <a:endParaRPr lang="en-US"/>
+            </a:p>
+          </p:txBody>
+        </p:sp>
+        <p:sp>
+          <p:nvSpPr>
+            <p:cNvPr id="14" name="Freeform 5"/>
+            <p:cNvSpPr/>
+            <p:nvPr/>
+          </p:nvSpPr>
+          <p:spPr bwMode="auto">
+            <a:xfrm>
+              <a:off x="8945354" y="221938"/>
+              <a:ext cx="762167" cy="671915"/>
+            </a:xfrm>
+            <a:custGeom>
+              <a:avLst/>
+              <a:gdLst>
+                <a:gd name="T0" fmla="*/ 225 w 785"/>
+                <a:gd name="T1" fmla="*/ 692 h 692"/>
+                <a:gd name="T2" fmla="*/ 177 w 785"/>
+                <a:gd name="T3" fmla="*/ 665 h 692"/>
+                <a:gd name="T4" fmla="*/ 9 w 785"/>
+                <a:gd name="T5" fmla="*/ 374 h 692"/>
+                <a:gd name="T6" fmla="*/ 9 w 785"/>
+                <a:gd name="T7" fmla="*/ 318 h 692"/>
+                <a:gd name="T8" fmla="*/ 177 w 785"/>
+                <a:gd name="T9" fmla="*/ 27 h 692"/>
+                <a:gd name="T10" fmla="*/ 225 w 785"/>
+                <a:gd name="T11" fmla="*/ 0 h 692"/>
+                <a:gd name="T12" fmla="*/ 561 w 785"/>
+                <a:gd name="T13" fmla="*/ 0 h 692"/>
+                <a:gd name="T14" fmla="*/ 609 w 785"/>
+                <a:gd name="T15" fmla="*/ 27 h 692"/>
+                <a:gd name="T16" fmla="*/ 777 w 785"/>
+                <a:gd name="T17" fmla="*/ 318 h 692"/>
+                <a:gd name="T18" fmla="*/ 777 w 785"/>
+                <a:gd name="T19" fmla="*/ 374 h 692"/>
+                <a:gd name="T20" fmla="*/ 609 w 785"/>
+                <a:gd name="T21" fmla="*/ 665 h 692"/>
+                <a:gd name="T22" fmla="*/ 561 w 785"/>
+                <a:gd name="T23" fmla="*/ 692 h 692"/>
+                <a:gd name="T24" fmla="*/ 225 w 785"/>
+                <a:gd name="T25" fmla="*/ 692 h 692"/>
+              </a:gdLst>
+              <a:ahLst/>
+              <a:cxnLst>
+                <a:cxn ang="0">
+                  <a:pos x="T0" y="T1"/>
+                </a:cxn>
+                <a:cxn ang="0">
+                  <a:pos x="T2" y="T3"/>
+                </a:cxn>
+                <a:cxn ang="0">
+                  <a:pos x="T4" y="T5"/>
+                </a:cxn>
+                <a:cxn ang="0">
+                  <a:pos x="T6" y="T7"/>
+                </a:cxn>
+                <a:cxn ang="0">
+                  <a:pos x="T8" y="T9"/>
+                </a:cxn>
+                <a:cxn ang="0">
+                  <a:pos x="T10" y="T11"/>
+                </a:cxn>
+                <a:cxn ang="0">
+                  <a:pos x="T12" y="T13"/>
+                </a:cxn>
+                <a:cxn ang="0">
+                  <a:pos x="T14" y="T15"/>
+                </a:cxn>
+                <a:cxn ang="0">
+                  <a:pos x="T16" y="T17"/>
+                </a:cxn>
+                <a:cxn ang="0">
+                  <a:pos x="T18" y="T19"/>
+                </a:cxn>
+                <a:cxn ang="0">
+                  <a:pos x="T20" y="T21"/>
+                </a:cxn>
+                <a:cxn ang="0">
+                  <a:pos x="T22" y="T23"/>
+                </a:cxn>
+                <a:cxn ang="0">
+                  <a:pos x="T24" y="T25"/>
+                </a:cxn>
+              </a:cxnLst>
+              <a:rect l="0" t="0" r="r" b="b"/>
+              <a:pathLst>
+                <a:path w="785" h="692">
+                  <a:moveTo>
+                    <a:pt x="225" y="692"/>
+                  </a:moveTo>
+                  <a:cubicBezTo>
+                    <a:pt x="207" y="692"/>
+                    <a:pt x="185" y="680"/>
+                    <a:pt x="177" y="665"/>
+                  </a:cubicBezTo>
+                  <a:cubicBezTo>
+                    <a:pt x="9" y="374"/>
+                    <a:pt x="9" y="374"/>
+                    <a:pt x="9" y="374"/>
+                  </a:cubicBezTo>
+                  <a:cubicBezTo>
+                    <a:pt x="0" y="358"/>
+                    <a:pt x="0" y="334"/>
+                    <a:pt x="9" y="318"/>
+                  </a:cubicBezTo>
+                  <a:cubicBezTo>
+                    <a:pt x="177" y="27"/>
+                    <a:pt x="177" y="27"/>
+                    <a:pt x="177" y="27"/>
+                  </a:cubicBezTo>
+                  <a:cubicBezTo>
+                    <a:pt x="185" y="12"/>
+                    <a:pt x="207" y="0"/>
+                    <a:pt x="225" y="0"/>
+                  </a:cubicBezTo>
+                  <a:cubicBezTo>
+                    <a:pt x="561" y="0"/>
+                    <a:pt x="561" y="0"/>
+                    <a:pt x="561" y="0"/>
+                  </a:cubicBezTo>
+                  <a:cubicBezTo>
+                    <a:pt x="578" y="0"/>
+                    <a:pt x="600" y="12"/>
+                    <a:pt x="609" y="27"/>
+                  </a:cubicBezTo>
+                  <a:cubicBezTo>
+                    <a:pt x="777" y="318"/>
+                    <a:pt x="777" y="318"/>
+                    <a:pt x="777" y="318"/>
+                  </a:cubicBezTo>
+                  <a:cubicBezTo>
+                    <a:pt x="785" y="334"/>
+                    <a:pt x="785" y="358"/>
+                    <a:pt x="777" y="374"/>
+                  </a:cubicBezTo>
+                  <a:cubicBezTo>
+                    <a:pt x="609" y="665"/>
+                    <a:pt x="609" y="665"/>
+                    <a:pt x="609" y="665"/>
+                  </a:cubicBezTo>
+                  <a:cubicBezTo>
+                    <a:pt x="600" y="680"/>
+                    <a:pt x="578" y="692"/>
+                    <a:pt x="561" y="692"/>
+                  </a:cubicBezTo>
+                  <a:lnTo>
+                    <a:pt x="225" y="692"/>
+                  </a:lnTo>
+                  <a:close/>
+                </a:path>
+              </a:pathLst>
+            </a:custGeom>
+            <a:noFill/>
+            <a:ln w="28575" cmpd="sng">
+              <a:solidFill>
+                <a:schemeClr val="tx1"/>
+              </a:solidFill>
+            </a:ln>
+          </p:spPr>
+          <p:txBody>
+            <a:bodyPr vert="horz" wrap="square" lIns="91440" tIns="45720" rIns="91440" bIns="45720" numCol="1" anchor="t" anchorCtr="0" compatLnSpc="1"/>
+            <a:lstStyle/>
+            <a:p>
+              <a:endParaRPr lang="en-US"/>
+            </a:p>
+          </p:txBody>
+        </p:sp>
+      </p:grpSp>
+      <p:pic>
+        <p:nvPicPr>
+          <p:cNvPr id="16" name="Imagem 15">
+            <a:extLst>
+              <a:ext uri="{FF2B5EF4-FFF2-40B4-BE49-F238E27FC236}">
+                <a16:creationId xmlns:a16="http://schemas.microsoft.com/office/drawing/2014/main" id="{FFDEB8E4-D264-4E9D-9149-3647F1E7D722}"/>
+              </a:ext>
+            </a:extLst>
+          </p:cNvPr>
+          <p:cNvPicPr>
+            <a:picLocks noChangeAspect="1"/>
+          </p:cNvPicPr>
+          <p:nvPr/>
+        </p:nvPicPr>
+        <p:blipFill>
+          <a:blip r:embed="rId2"/>
+          <a:stretch>
+            <a:fillRect/>
+          </a:stretch>
+        </p:blipFill>
+        <p:spPr>
+          <a:xfrm>
+            <a:off x="2794985" y="1429974"/>
+            <a:ext cx="6602030" cy="4528159"/>
+          </a:xfrm>
+          <a:prstGeom prst="rect">
+            <a:avLst/>
+          </a:prstGeom>
+        </p:spPr>
+      </p:pic>
+    </p:spTree>
+    <p:extLst>
+      <p:ext uri="{BB962C8B-B14F-4D97-AF65-F5344CB8AC3E}">
+        <p14:creationId xmlns:p14="http://schemas.microsoft.com/office/powerpoint/2010/main" val="2259134408"/>
+      </p:ext>
+    </p:extLst>
+  </p:cSld>
+  <p:clrMapOvr>
+    <a:masterClrMapping/>
+  </p:clrMapOvr>
+</p:sld>
+</file>
+
+<file path=ppt/slides/slide12.xml><?xml version="1.0" encoding="utf-8"?>
+<p:sld xmlns:a="http://schemas.openxmlformats.org/drawingml/2006/main" xmlns:r="http://schemas.openxmlformats.org/officeDocument/2006/relationships" xmlns:p="http://schemas.openxmlformats.org/presentationml/2006/main">
+  <p:cSld>
+    <p:spTree>
+      <p:nvGrpSpPr>
+        <p:cNvPr id="1" name=""/>
+        <p:cNvGrpSpPr/>
+        <p:nvPr/>
+      </p:nvGrpSpPr>
+      <p:grpSpPr>
+        <a:xfrm>
+          <a:off x="0" y="0"/>
+          <a:ext cx="0" cy="0"/>
+          <a:chOff x="0" y="0"/>
+          <a:chExt cx="0" cy="0"/>
+        </a:xfrm>
+      </p:grpSpPr>
+      <p:sp>
+        <p:nvSpPr>
+          <p:cNvPr id="2" name="Título 1"/>
+          <p:cNvSpPr>
+            <a:spLocks noGrp="1"/>
+          </p:cNvSpPr>
+          <p:nvPr>
+            <p:ph type="title"/>
+          </p:nvPr>
+        </p:nvSpPr>
+        <p:spPr>
+          <a:xfrm>
+            <a:off x="1812897" y="518649"/>
+            <a:ext cx="9882278" cy="1067634"/>
+          </a:xfrm>
+        </p:spPr>
+        <p:txBody>
+          <a:bodyPr anchor="ctr">
+            <a:normAutofit/>
+          </a:bodyPr>
+          <a:lstStyle/>
+          <a:p>
+            <a:r>
+              <a:rPr lang="pt-BR" dirty="0"/>
+              <a:t>Planejamento</a:t>
+            </a:r>
+          </a:p>
+        </p:txBody>
+      </p:sp>
+      <p:grpSp>
+        <p:nvGrpSpPr>
+          <p:cNvPr id="12" name="Group 11"/>
+          <p:cNvGrpSpPr>
+            <a:grpSpLocks noGrp="1" noUngrp="1" noRot="1" noChangeAspect="1" noMove="1" noResize="1"/>
+          </p:cNvGrpSpPr>
+          <p:nvPr/>
+        </p:nvGrpSpPr>
+        <p:grpSpPr>
+          <a:xfrm>
+            <a:off x="472021" y="628863"/>
+            <a:ext cx="1128382" cy="847206"/>
+            <a:chOff x="8183879" y="1000124"/>
+            <a:chExt cx="1562267" cy="1172973"/>
+          </a:xfrm>
+        </p:grpSpPr>
+        <p:sp>
+          <p:nvSpPr>
+            <p:cNvPr id="13" name="Freeform 5"/>
+            <p:cNvSpPr/>
+            <p:nvPr/>
+          </p:nvSpPr>
+          <p:spPr bwMode="auto">
+            <a:xfrm>
+              <a:off x="8183879" y="1348782"/>
+              <a:ext cx="935037" cy="824315"/>
+            </a:xfrm>
+            <a:custGeom>
+              <a:avLst/>
+              <a:gdLst>
+                <a:gd name="T0" fmla="*/ 225 w 785"/>
+                <a:gd name="T1" fmla="*/ 692 h 692"/>
+                <a:gd name="T2" fmla="*/ 177 w 785"/>
+                <a:gd name="T3" fmla="*/ 665 h 692"/>
+                <a:gd name="T4" fmla="*/ 9 w 785"/>
+                <a:gd name="T5" fmla="*/ 374 h 692"/>
+                <a:gd name="T6" fmla="*/ 9 w 785"/>
+                <a:gd name="T7" fmla="*/ 318 h 692"/>
+                <a:gd name="T8" fmla="*/ 177 w 785"/>
+                <a:gd name="T9" fmla="*/ 27 h 692"/>
+                <a:gd name="T10" fmla="*/ 225 w 785"/>
+                <a:gd name="T11" fmla="*/ 0 h 692"/>
+                <a:gd name="T12" fmla="*/ 561 w 785"/>
+                <a:gd name="T13" fmla="*/ 0 h 692"/>
+                <a:gd name="T14" fmla="*/ 609 w 785"/>
+                <a:gd name="T15" fmla="*/ 27 h 692"/>
+                <a:gd name="T16" fmla="*/ 777 w 785"/>
+                <a:gd name="T17" fmla="*/ 318 h 692"/>
+                <a:gd name="T18" fmla="*/ 777 w 785"/>
+                <a:gd name="T19" fmla="*/ 374 h 692"/>
+                <a:gd name="T20" fmla="*/ 609 w 785"/>
+                <a:gd name="T21" fmla="*/ 665 h 692"/>
+                <a:gd name="T22" fmla="*/ 561 w 785"/>
+                <a:gd name="T23" fmla="*/ 692 h 692"/>
+                <a:gd name="T24" fmla="*/ 225 w 785"/>
+                <a:gd name="T25" fmla="*/ 692 h 692"/>
+              </a:gdLst>
+              <a:ahLst/>
+              <a:cxnLst>
+                <a:cxn ang="0">
+                  <a:pos x="T0" y="T1"/>
+                </a:cxn>
+                <a:cxn ang="0">
+                  <a:pos x="T2" y="T3"/>
+                </a:cxn>
+                <a:cxn ang="0">
+                  <a:pos x="T4" y="T5"/>
+                </a:cxn>
+                <a:cxn ang="0">
+                  <a:pos x="T6" y="T7"/>
+                </a:cxn>
+                <a:cxn ang="0">
+                  <a:pos x="T8" y="T9"/>
+                </a:cxn>
+                <a:cxn ang="0">
+                  <a:pos x="T10" y="T11"/>
+                </a:cxn>
+                <a:cxn ang="0">
+                  <a:pos x="T12" y="T13"/>
+                </a:cxn>
+                <a:cxn ang="0">
+                  <a:pos x="T14" y="T15"/>
+                </a:cxn>
+                <a:cxn ang="0">
+                  <a:pos x="T16" y="T17"/>
+                </a:cxn>
+                <a:cxn ang="0">
+                  <a:pos x="T18" y="T19"/>
+                </a:cxn>
+                <a:cxn ang="0">
+                  <a:pos x="T20" y="T21"/>
+                </a:cxn>
+                <a:cxn ang="0">
+                  <a:pos x="T22" y="T23"/>
+                </a:cxn>
+                <a:cxn ang="0">
+                  <a:pos x="T24" y="T25"/>
+                </a:cxn>
+              </a:cxnLst>
+              <a:rect l="0" t="0" r="r" b="b"/>
+              <a:pathLst>
+                <a:path w="785" h="692">
+                  <a:moveTo>
+                    <a:pt x="225" y="692"/>
+                  </a:moveTo>
+                  <a:cubicBezTo>
+                    <a:pt x="207" y="692"/>
+                    <a:pt x="185" y="680"/>
+                    <a:pt x="177" y="665"/>
+                  </a:cubicBezTo>
+                  <a:cubicBezTo>
+                    <a:pt x="9" y="374"/>
+                    <a:pt x="9" y="374"/>
+                    <a:pt x="9" y="374"/>
+                  </a:cubicBezTo>
+                  <a:cubicBezTo>
+                    <a:pt x="0" y="358"/>
+                    <a:pt x="0" y="334"/>
+                    <a:pt x="9" y="318"/>
+                  </a:cubicBezTo>
+                  <a:cubicBezTo>
+                    <a:pt x="177" y="27"/>
+                    <a:pt x="177" y="27"/>
+                    <a:pt x="177" y="27"/>
+                  </a:cubicBezTo>
+                  <a:cubicBezTo>
+                    <a:pt x="185" y="12"/>
+                    <a:pt x="207" y="0"/>
+                    <a:pt x="225" y="0"/>
+                  </a:cubicBezTo>
+                  <a:cubicBezTo>
+                    <a:pt x="561" y="0"/>
+                    <a:pt x="561" y="0"/>
+                    <a:pt x="561" y="0"/>
+                  </a:cubicBezTo>
+                  <a:cubicBezTo>
+                    <a:pt x="578" y="0"/>
+                    <a:pt x="600" y="12"/>
+                    <a:pt x="609" y="27"/>
+                  </a:cubicBezTo>
+                  <a:cubicBezTo>
+                    <a:pt x="777" y="318"/>
+                    <a:pt x="777" y="318"/>
+                    <a:pt x="777" y="318"/>
+                  </a:cubicBezTo>
+                  <a:cubicBezTo>
+                    <a:pt x="785" y="334"/>
+                    <a:pt x="785" y="358"/>
+                    <a:pt x="777" y="374"/>
+                  </a:cubicBezTo>
+                  <a:cubicBezTo>
+                    <a:pt x="609" y="665"/>
+                    <a:pt x="609" y="665"/>
+                    <a:pt x="609" y="665"/>
+                  </a:cubicBezTo>
+                  <a:cubicBezTo>
+                    <a:pt x="600" y="680"/>
+                    <a:pt x="578" y="692"/>
+                    <a:pt x="561" y="692"/>
+                  </a:cubicBezTo>
+                  <a:lnTo>
+                    <a:pt x="225" y="692"/>
+                  </a:lnTo>
+                  <a:close/>
+                </a:path>
+              </a:pathLst>
+            </a:custGeom>
+            <a:noFill/>
+            <a:ln w="28575" cmpd="sng">
+              <a:solidFill>
+                <a:schemeClr val="tx1"/>
+              </a:solidFill>
+            </a:ln>
+          </p:spPr>
+          <p:txBody>
+            <a:bodyPr vert="horz" wrap="square" lIns="91440" tIns="45720" rIns="91440" bIns="45720" numCol="1" anchor="t" anchorCtr="0" compatLnSpc="1"/>
+            <a:lstStyle/>
+            <a:p>
+              <a:endParaRPr lang="en-US"/>
+            </a:p>
+          </p:txBody>
+        </p:sp>
+        <p:sp>
+          <p:nvSpPr>
+            <p:cNvPr id="14" name="Freeform 5"/>
+            <p:cNvSpPr/>
+            <p:nvPr/>
+          </p:nvSpPr>
+          <p:spPr bwMode="auto">
+            <a:xfrm>
+              <a:off x="8983979" y="1000124"/>
+              <a:ext cx="762167" cy="671915"/>
+            </a:xfrm>
+            <a:custGeom>
+              <a:avLst/>
+              <a:gdLst>
+                <a:gd name="T0" fmla="*/ 225 w 785"/>
+                <a:gd name="T1" fmla="*/ 692 h 692"/>
+                <a:gd name="T2" fmla="*/ 177 w 785"/>
+                <a:gd name="T3" fmla="*/ 665 h 692"/>
+                <a:gd name="T4" fmla="*/ 9 w 785"/>
+                <a:gd name="T5" fmla="*/ 374 h 692"/>
+                <a:gd name="T6" fmla="*/ 9 w 785"/>
+                <a:gd name="T7" fmla="*/ 318 h 692"/>
+                <a:gd name="T8" fmla="*/ 177 w 785"/>
+                <a:gd name="T9" fmla="*/ 27 h 692"/>
+                <a:gd name="T10" fmla="*/ 225 w 785"/>
+                <a:gd name="T11" fmla="*/ 0 h 692"/>
+                <a:gd name="T12" fmla="*/ 561 w 785"/>
+                <a:gd name="T13" fmla="*/ 0 h 692"/>
+                <a:gd name="T14" fmla="*/ 609 w 785"/>
+                <a:gd name="T15" fmla="*/ 27 h 692"/>
+                <a:gd name="T16" fmla="*/ 777 w 785"/>
+                <a:gd name="T17" fmla="*/ 318 h 692"/>
+                <a:gd name="T18" fmla="*/ 777 w 785"/>
+                <a:gd name="T19" fmla="*/ 374 h 692"/>
+                <a:gd name="T20" fmla="*/ 609 w 785"/>
+                <a:gd name="T21" fmla="*/ 665 h 692"/>
+                <a:gd name="T22" fmla="*/ 561 w 785"/>
+                <a:gd name="T23" fmla="*/ 692 h 692"/>
+                <a:gd name="T24" fmla="*/ 225 w 785"/>
+                <a:gd name="T25" fmla="*/ 692 h 692"/>
+              </a:gdLst>
+              <a:ahLst/>
+              <a:cxnLst>
+                <a:cxn ang="0">
+                  <a:pos x="T0" y="T1"/>
+                </a:cxn>
+                <a:cxn ang="0">
+                  <a:pos x="T2" y="T3"/>
+                </a:cxn>
+                <a:cxn ang="0">
+                  <a:pos x="T4" y="T5"/>
+                </a:cxn>
+                <a:cxn ang="0">
+                  <a:pos x="T6" y="T7"/>
+                </a:cxn>
+                <a:cxn ang="0">
+                  <a:pos x="T8" y="T9"/>
+                </a:cxn>
+                <a:cxn ang="0">
+                  <a:pos x="T10" y="T11"/>
+                </a:cxn>
+                <a:cxn ang="0">
+                  <a:pos x="T12" y="T13"/>
+                </a:cxn>
+                <a:cxn ang="0">
+                  <a:pos x="T14" y="T15"/>
+                </a:cxn>
+                <a:cxn ang="0">
+                  <a:pos x="T16" y="T17"/>
+                </a:cxn>
+                <a:cxn ang="0">
+                  <a:pos x="T18" y="T19"/>
+                </a:cxn>
+                <a:cxn ang="0">
+                  <a:pos x="T20" y="T21"/>
+                </a:cxn>
+                <a:cxn ang="0">
+                  <a:pos x="T22" y="T23"/>
+                </a:cxn>
+                <a:cxn ang="0">
+                  <a:pos x="T24" y="T25"/>
+                </a:cxn>
+              </a:cxnLst>
+              <a:rect l="0" t="0" r="r" b="b"/>
+              <a:pathLst>
+                <a:path w="785" h="692">
+                  <a:moveTo>
+                    <a:pt x="225" y="692"/>
+                  </a:moveTo>
+                  <a:cubicBezTo>
+                    <a:pt x="207" y="692"/>
+                    <a:pt x="185" y="680"/>
+                    <a:pt x="177" y="665"/>
+                  </a:cubicBezTo>
+                  <a:cubicBezTo>
+                    <a:pt x="9" y="374"/>
+                    <a:pt x="9" y="374"/>
+                    <a:pt x="9" y="374"/>
+                  </a:cubicBezTo>
+                  <a:cubicBezTo>
+                    <a:pt x="0" y="358"/>
+                    <a:pt x="0" y="334"/>
+                    <a:pt x="9" y="318"/>
+                  </a:cubicBezTo>
+                  <a:cubicBezTo>
+                    <a:pt x="177" y="27"/>
+                    <a:pt x="177" y="27"/>
+                    <a:pt x="177" y="27"/>
+                  </a:cubicBezTo>
+                  <a:cubicBezTo>
+                    <a:pt x="185" y="12"/>
+                    <a:pt x="207" y="0"/>
+                    <a:pt x="225" y="0"/>
+                  </a:cubicBezTo>
+                  <a:cubicBezTo>
+                    <a:pt x="561" y="0"/>
+                    <a:pt x="561" y="0"/>
+                    <a:pt x="561" y="0"/>
+                  </a:cubicBezTo>
+                  <a:cubicBezTo>
+                    <a:pt x="578" y="0"/>
+                    <a:pt x="600" y="12"/>
+                    <a:pt x="609" y="27"/>
+                  </a:cubicBezTo>
+                  <a:cubicBezTo>
+                    <a:pt x="777" y="318"/>
+                    <a:pt x="777" y="318"/>
+                    <a:pt x="777" y="318"/>
+                  </a:cubicBezTo>
+                  <a:cubicBezTo>
+                    <a:pt x="785" y="334"/>
+                    <a:pt x="785" y="358"/>
+                    <a:pt x="777" y="374"/>
+                  </a:cubicBezTo>
+                  <a:cubicBezTo>
+                    <a:pt x="609" y="665"/>
+                    <a:pt x="609" y="665"/>
+                    <a:pt x="609" y="665"/>
+                  </a:cubicBezTo>
+                  <a:cubicBezTo>
+                    <a:pt x="600" y="680"/>
+                    <a:pt x="578" y="692"/>
+                    <a:pt x="561" y="692"/>
+                  </a:cubicBezTo>
+                  <a:lnTo>
+                    <a:pt x="225" y="692"/>
+                  </a:lnTo>
+                  <a:close/>
+                </a:path>
+              </a:pathLst>
+            </a:custGeom>
+            <a:noFill/>
+            <a:ln w="28575" cmpd="sng">
+              <a:solidFill>
+                <a:schemeClr val="tx1"/>
+              </a:solidFill>
+            </a:ln>
+          </p:spPr>
+          <p:txBody>
+            <a:bodyPr vert="horz" wrap="square" lIns="91440" tIns="45720" rIns="91440" bIns="45720" numCol="1" anchor="t" anchorCtr="0" compatLnSpc="1"/>
+            <a:lstStyle/>
+            <a:p>
+              <a:endParaRPr lang="en-US"/>
+            </a:p>
+          </p:txBody>
+        </p:sp>
+      </p:grpSp>
+      <p:sp>
+        <p:nvSpPr>
+          <p:cNvPr id="3" name="CaixaDeTexto 2">
+            <a:extLst>
+              <a:ext uri="{FF2B5EF4-FFF2-40B4-BE49-F238E27FC236}">
+                <a16:creationId xmlns:a16="http://schemas.microsoft.com/office/drawing/2014/main" id="{0A469168-9659-4B5B-9B7B-D50FEC1E813C}"/>
+              </a:ext>
+            </a:extLst>
+          </p:cNvPr>
+          <p:cNvSpPr txBox="1"/>
+          <p:nvPr/>
+        </p:nvSpPr>
+        <p:spPr>
+          <a:xfrm>
+            <a:off x="3653792" y="2224760"/>
+            <a:ext cx="5273548" cy="2308324"/>
+          </a:xfrm>
+          <a:prstGeom prst="rect">
+            <a:avLst/>
+          </a:prstGeom>
+          <a:noFill/>
+        </p:spPr>
+        <p:txBody>
+          <a:bodyPr wrap="square" rtlCol="0">
+            <a:spAutoFit/>
+          </a:bodyPr>
+          <a:lstStyle/>
+          <a:p>
+            <a:r>
+              <a:rPr lang="pt-BR" dirty="0"/>
+              <a:t>PLANNER</a:t>
+            </a:r>
+          </a:p>
+          <a:p>
+            <a:pPr marL="285750" indent="-285750">
+              <a:buFontTx/>
+              <a:buChar char="-"/>
+            </a:pPr>
+            <a:endParaRPr lang="pt-BR" dirty="0"/>
+          </a:p>
+          <a:p>
+            <a:pPr marL="285750" indent="-285750">
+              <a:buFontTx/>
+              <a:buChar char="-"/>
+            </a:pPr>
+            <a:r>
+              <a:rPr lang="pt-BR" dirty="0"/>
+              <a:t>Gestão de tempo</a:t>
+            </a:r>
+          </a:p>
+          <a:p>
+            <a:pPr marL="285750" indent="-285750">
+              <a:buFontTx/>
+              <a:buChar char="-"/>
+            </a:pPr>
+            <a:r>
+              <a:rPr lang="pt-BR" dirty="0"/>
+              <a:t>Análise de entregas</a:t>
+            </a:r>
+          </a:p>
+          <a:p>
+            <a:pPr marL="285750" indent="-285750">
+              <a:buFontTx/>
+              <a:buChar char="-"/>
+            </a:pPr>
+            <a:r>
+              <a:rPr lang="pt-BR" dirty="0"/>
+              <a:t>Acompanhamento de entregas</a:t>
+            </a:r>
+          </a:p>
+          <a:p>
+            <a:pPr marL="285750" indent="-285750">
+              <a:buFontTx/>
+              <a:buChar char="-"/>
+            </a:pPr>
+            <a:r>
+              <a:rPr lang="pt-BR" dirty="0"/>
+              <a:t>Diversas funcionalidades</a:t>
+            </a:r>
+          </a:p>
+          <a:p>
+            <a:pPr marL="285750" indent="-285750">
+              <a:buFontTx/>
+              <a:buChar char="-"/>
+            </a:pPr>
+            <a:endParaRPr lang="pt-BR" dirty="0"/>
+          </a:p>
+          <a:p>
+            <a:pPr marL="285750" indent="-285750">
+              <a:buFontTx/>
+              <a:buChar char="-"/>
+            </a:pPr>
+            <a:endParaRPr lang="pt-BR" dirty="0"/>
+          </a:p>
+        </p:txBody>
+      </p:sp>
+      <p:sp>
+        <p:nvSpPr>
+          <p:cNvPr id="11" name="CaixaDeTexto 10">
+            <a:extLst>
+              <a:ext uri="{FF2B5EF4-FFF2-40B4-BE49-F238E27FC236}">
+                <a16:creationId xmlns:a16="http://schemas.microsoft.com/office/drawing/2014/main" id="{FB2E8868-434F-4638-9E06-D8C315433624}"/>
+              </a:ext>
+            </a:extLst>
+          </p:cNvPr>
+          <p:cNvSpPr txBox="1"/>
+          <p:nvPr/>
+        </p:nvSpPr>
+        <p:spPr>
+          <a:xfrm>
+            <a:off x="3653792" y="4256085"/>
+            <a:ext cx="5273548" cy="1477328"/>
+          </a:xfrm>
+          <a:prstGeom prst="rect">
+            <a:avLst/>
+          </a:prstGeom>
+          <a:noFill/>
+        </p:spPr>
+        <p:txBody>
+          <a:bodyPr wrap="square" rtlCol="0">
+            <a:spAutoFit/>
+          </a:bodyPr>
+          <a:lstStyle/>
+          <a:p>
+            <a:r>
+              <a:rPr lang="pt-BR" dirty="0"/>
+              <a:t>DISCORD</a:t>
+            </a:r>
+          </a:p>
+          <a:p>
+            <a:pPr marL="285750" indent="-285750">
+              <a:buFontTx/>
+              <a:buChar char="-"/>
+            </a:pPr>
+            <a:endParaRPr lang="pt-BR" dirty="0"/>
+          </a:p>
+          <a:p>
+            <a:pPr marL="285750" indent="-285750">
+              <a:buFontTx/>
+              <a:buChar char="-"/>
+            </a:pPr>
+            <a:r>
+              <a:rPr lang="pt-BR" dirty="0"/>
+              <a:t>Comunicação a distância</a:t>
+            </a:r>
+          </a:p>
+          <a:p>
+            <a:pPr marL="285750" indent="-285750">
+              <a:buFontTx/>
+              <a:buChar char="-"/>
+            </a:pPr>
+            <a:r>
+              <a:rPr lang="pt-BR" dirty="0"/>
+              <a:t>Trabalho simultâneo</a:t>
+            </a:r>
+          </a:p>
+          <a:p>
+            <a:pPr marL="285750" indent="-285750">
+              <a:buFontTx/>
+              <a:buChar char="-"/>
+            </a:pPr>
+            <a:r>
+              <a:rPr lang="pt-BR" dirty="0"/>
+              <a:t>Compartilhamento de arquivos</a:t>
+            </a:r>
+          </a:p>
+        </p:txBody>
+      </p:sp>
+      <p:pic>
+        <p:nvPicPr>
+          <p:cNvPr id="4" name="Picture 4" descr="Discord Free Icon of Social Media Set - Flat Design">
+            <a:extLst>
+              <a:ext uri="{FF2B5EF4-FFF2-40B4-BE49-F238E27FC236}">
+                <a16:creationId xmlns:a16="http://schemas.microsoft.com/office/drawing/2014/main" id="{DC48B066-7753-45E3-BCE0-FF0376C71B93}"/>
+              </a:ext>
+            </a:extLst>
+          </p:cNvPr>
+          <p:cNvPicPr>
+            <a:picLocks noChangeAspect="1" noChangeArrowheads="1"/>
+          </p:cNvPicPr>
+          <p:nvPr/>
+        </p:nvPicPr>
+        <p:blipFill>
+          <a:blip r:embed="rId2">
+            <a:extLst>
+              <a:ext uri="{28A0092B-C50C-407E-A947-70E740481C1C}">
+                <a14:useLocalDpi xmlns:a14="http://schemas.microsoft.com/office/drawing/2010/main" val="0"/>
+              </a:ext>
+            </a:extLst>
+          </a:blip>
+          <a:srcRect/>
+          <a:stretch>
+            <a:fillRect/>
+          </a:stretch>
+        </p:blipFill>
+        <p:spPr bwMode="auto">
+          <a:xfrm>
+            <a:off x="1548440" y="4249706"/>
+            <a:ext cx="1477329" cy="1477329"/>
+          </a:xfrm>
+          <a:prstGeom prst="rect">
+            <a:avLst/>
+          </a:prstGeom>
+          <a:noFill/>
+          <a:extLst>
+            <a:ext uri="{909E8E84-426E-40DD-AFC4-6F175D3DCCD1}">
+              <a14:hiddenFill xmlns:a14="http://schemas.microsoft.com/office/drawing/2010/main">
+                <a:solidFill>
+                  <a:srgbClr val="FFFFFF"/>
+                </a:solidFill>
+              </a14:hiddenFill>
+            </a:ext>
+          </a:extLst>
+        </p:spPr>
+      </p:pic>
+      <p:pic>
+        <p:nvPicPr>
+          <p:cNvPr id="1030" name="Picture 6" descr="Planner - Free logo icons">
+            <a:extLst>
+              <a:ext uri="{FF2B5EF4-FFF2-40B4-BE49-F238E27FC236}">
+                <a16:creationId xmlns:a16="http://schemas.microsoft.com/office/drawing/2014/main" id="{5FA43E33-8005-4382-9B8C-63CBEE494F0D}"/>
+              </a:ext>
+            </a:extLst>
+          </p:cNvPr>
+          <p:cNvPicPr>
+            <a:picLocks noChangeAspect="1" noChangeArrowheads="1"/>
+          </p:cNvPicPr>
+          <p:nvPr/>
+        </p:nvPicPr>
+        <p:blipFill>
+          <a:blip r:embed="rId3">
+            <a:extLst>
+              <a:ext uri="{28A0092B-C50C-407E-A947-70E740481C1C}">
+                <a14:useLocalDpi xmlns:a14="http://schemas.microsoft.com/office/drawing/2010/main" val="0"/>
+              </a:ext>
+            </a:extLst>
+          </a:blip>
+          <a:srcRect/>
+          <a:stretch>
+            <a:fillRect/>
+          </a:stretch>
+        </p:blipFill>
+        <p:spPr bwMode="auto">
+          <a:xfrm>
+            <a:off x="1600403" y="2224760"/>
+            <a:ext cx="1373404" cy="1373404"/>
+          </a:xfrm>
+          <a:prstGeom prst="rect">
+            <a:avLst/>
+          </a:prstGeom>
+          <a:noFill/>
+          <a:extLst>
+            <a:ext uri="{909E8E84-426E-40DD-AFC4-6F175D3DCCD1}">
+              <a14:hiddenFill xmlns:a14="http://schemas.microsoft.com/office/drawing/2010/main">
+                <a:solidFill>
+                  <a:srgbClr val="FFFFFF"/>
+                </a:solidFill>
+              </a14:hiddenFill>
+            </a:ext>
+          </a:extLst>
+        </p:spPr>
+      </p:pic>
+    </p:spTree>
+    <p:extLst>
+      <p:ext uri="{BB962C8B-B14F-4D97-AF65-F5344CB8AC3E}">
+        <p14:creationId xmlns:p14="http://schemas.microsoft.com/office/powerpoint/2010/main" val="2462845540"/>
+      </p:ext>
+    </p:extLst>
+  </p:cSld>
+  <p:clrMapOvr>
+    <a:masterClrMapping/>
+  </p:clrMapOvr>
+  <p:timing>
+    <p:tnLst>
+      <p:par>
+        <p:cTn id="1" dur="indefinite" restart="never" nodeType="tmRoot">
+          <p:childTnLst>
+            <p:seq concurrent="1" nextAc="seek">
+              <p:cTn id="2" dur="indefinite" nodeType="mainSeq">
+                <p:childTnLst>
+                  <p:par>
+                    <p:cTn id="3" fill="hold">
+                      <p:stCondLst>
+                        <p:cond delay="indefinite"/>
+                      </p:stCondLst>
+                      <p:childTnLst>
+                        <p:par>
+                          <p:cTn id="4" fill="hold">
+                            <p:stCondLst>
+                              <p:cond delay="0"/>
+                            </p:stCondLst>
+                            <p:childTnLst>
+                              <p:par>
+                                <p:cTn id="5" presetID="1" presetClass="entr" presetSubtype="0" fill="hold" nodeType="clickEffect">
+                                  <p:stCondLst>
+                                    <p:cond delay="0"/>
+                                  </p:stCondLst>
+                                  <p:childTnLst>
+                                    <p:set>
+                                      <p:cBhvr>
+                                        <p:cTn id="6" dur="1" fill="hold">
+                                          <p:stCondLst>
+                                            <p:cond delay="0"/>
+                                          </p:stCondLst>
+                                        </p:cTn>
+                                        <p:tgtEl>
+                                          <p:spTgt spid="4"/>
+                                        </p:tgtEl>
+                                        <p:attrNameLst>
+                                          <p:attrName>style.visibility</p:attrName>
+                                        </p:attrNameLst>
+                                      </p:cBhvr>
+                                      <p:to>
+                                        <p:strVal val="visible"/>
+                                      </p:to>
+                                    </p:set>
+                                  </p:childTnLst>
+                                </p:cTn>
+                              </p:par>
+                              <p:par>
+                                <p:cTn id="7" presetID="1" presetClass="entr" presetSubtype="0" fill="hold" grpId="0" nodeType="withEffect">
+                                  <p:stCondLst>
+                                    <p:cond delay="0"/>
+                                  </p:stCondLst>
+                                  <p:childTnLst>
+                                    <p:set>
+                                      <p:cBhvr>
+                                        <p:cTn id="8" dur="1" fill="hold">
+                                          <p:stCondLst>
+                                            <p:cond delay="0"/>
+                                          </p:stCondLst>
+                                        </p:cTn>
+                                        <p:tgtEl>
+                                          <p:spTgt spid="11"/>
+                                        </p:tgtEl>
+                                        <p:attrNameLst>
+                                          <p:attrName>style.visibility</p:attrName>
+                                        </p:attrNameLst>
+                                      </p:cBhvr>
+                                      <p:to>
+                                        <p:strVal val="visible"/>
+                                      </p:to>
+                                    </p:set>
+                                  </p:childTnLst>
+                                </p:cTn>
+                              </p:par>
+                            </p:childTnLst>
+                          </p:cTn>
+                        </p:par>
+                      </p:childTnLst>
+                    </p:cTn>
+                  </p:par>
+                </p:childTnLst>
+              </p:cTn>
+              <p:prevCondLst>
+                <p:cond evt="onPrev" delay="0">
+                  <p:tgtEl>
+                    <p:sldTgt/>
+                  </p:tgtEl>
+                </p:cond>
+              </p:prevCondLst>
+              <p:nextCondLst>
+                <p:cond evt="onNext" delay="0">
+                  <p:tgtEl>
+                    <p:sldTgt/>
+                  </p:tgtEl>
+                </p:cond>
+              </p:nextCondLst>
+            </p:seq>
+          </p:childTnLst>
+        </p:cTn>
+      </p:par>
+    </p:tnLst>
+    <p:bldLst>
+      <p:bldP spid="11" grpId="0"/>
+    </p:bldLst>
+  </p:timing>
+</p:sld>
+</file>
+
+<file path=ppt/slides/slide13.xml><?xml version="1.0" encoding="utf-8"?>
 <p:sld xmlns:a="http://schemas.openxmlformats.org/drawingml/2006/main" xmlns:r="http://schemas.openxmlformats.org/officeDocument/2006/relationships" xmlns:p="http://schemas.openxmlformats.org/presentationml/2006/main">
   <p:cSld>
     <p:spTree>
@@ -28784,7 +32030,7 @@
 </p:sld>
 </file>
 
-<file path=ppt/slides/slide11.xml><?xml version="1.0" encoding="utf-8"?>
+<file path=ppt/slides/slide14.xml><?xml version="1.0" encoding="utf-8"?>
 <p:sld xmlns:a="http://schemas.openxmlformats.org/drawingml/2006/main" xmlns:r="http://schemas.openxmlformats.org/officeDocument/2006/relationships" xmlns:p="http://schemas.openxmlformats.org/presentationml/2006/main">
   <p:cSld>
     <p:spTree>
@@ -29537,7 +32783,7 @@
 </p:sld>
 </file>
 
-<file path=ppt/slides/slide12.xml><?xml version="1.0" encoding="utf-8"?>
+<file path=ppt/slides/slide15.xml><?xml version="1.0" encoding="utf-8"?>
 <p:sld xmlns:a="http://schemas.openxmlformats.org/drawingml/2006/main" xmlns:r="http://schemas.openxmlformats.org/officeDocument/2006/relationships" xmlns:p="http://schemas.openxmlformats.org/presentationml/2006/main">
   <p:cSld>
     <p:spTree>
@@ -30630,7 +33876,13 @@
             </a:extLst>
           </p:cNvPr>
           <p:cNvGraphicFramePr/>
-          <p:nvPr/>
+          <p:nvPr>
+            <p:extLst>
+              <p:ext uri="{D42A27DB-BD31-4B8C-83A1-F6EECF244321}">
+                <p14:modId xmlns:p14="http://schemas.microsoft.com/office/powerpoint/2010/main" val="79244577"/>
+              </p:ext>
+            </p:extLst>
+          </p:nvPr>
         </p:nvGraphicFramePr>
         <p:xfrm>
           <a:off x="2134143" y="2968216"/>
@@ -38482,7 +41734,7 @@
         </p:nvSpPr>
         <p:spPr>
           <a:xfrm>
-            <a:off x="1812897" y="518649"/>
+            <a:off x="1876329" y="7247"/>
             <a:ext cx="9882278" cy="1067634"/>
           </a:xfrm>
         </p:spPr>
@@ -38494,7 +41746,7 @@
           <a:p>
             <a:r>
               <a:rPr lang="pt-BR" dirty="0"/>
-              <a:t>Planejamento</a:t>
+              <a:t>Jornada do Usuário</a:t>
             </a:r>
           </a:p>
         </p:txBody>
@@ -38509,10 +41761,10 @@
         </p:nvGrpSpPr>
         <p:grpSpPr>
           <a:xfrm>
-            <a:off x="472021" y="628863"/>
-            <a:ext cx="1128382" cy="847206"/>
-            <a:chOff x="8183879" y="1000124"/>
-            <a:chExt cx="1562267" cy="1172973"/>
+            <a:off x="444125" y="66801"/>
+            <a:ext cx="1128378" cy="847206"/>
+            <a:chOff x="8145259" y="221938"/>
+            <a:chExt cx="1562262" cy="1172973"/>
           </a:xfrm>
         </p:grpSpPr>
         <p:sp>
@@ -38523,8 +41775,8 @@
           </p:nvSpPr>
           <p:spPr bwMode="auto">
             <a:xfrm>
-              <a:off x="8183879" y="1348782"/>
-              <a:ext cx="935037" cy="824315"/>
+              <a:off x="8145259" y="570596"/>
+              <a:ext cx="935036" cy="824315"/>
             </a:xfrm>
             <a:custGeom>
               <a:avLst/>
@@ -38689,7 +41941,7 @@
           </p:nvSpPr>
           <p:spPr bwMode="auto">
             <a:xfrm>
-              <a:off x="8983979" y="1000124"/>
+              <a:off x="8945354" y="221938"/>
               <a:ext cx="762167" cy="671915"/>
             </a:xfrm>
             <a:custGeom>
@@ -38850,381 +42102,94 @@
       </p:grpSp>
       <p:sp>
         <p:nvSpPr>
-          <p:cNvPr id="3" name="CaixaDeTexto 2">
+          <p:cNvPr id="34" name="Retângulo 33">
             <a:extLst>
               <a:ext uri="{FF2B5EF4-FFF2-40B4-BE49-F238E27FC236}">
-                <a16:creationId xmlns:a16="http://schemas.microsoft.com/office/drawing/2014/main" id="{0A469168-9659-4B5B-9B7B-D50FEC1E813C}"/>
+                <a16:creationId xmlns:a16="http://schemas.microsoft.com/office/drawing/2014/main" id="{803C6A0D-ED56-4E0E-91E5-FDB66BE2ACFB}"/>
               </a:ext>
             </a:extLst>
           </p:cNvPr>
-          <p:cNvSpPr txBox="1"/>
+          <p:cNvSpPr/>
           <p:nvPr/>
         </p:nvSpPr>
         <p:spPr>
-          <a:xfrm>
-            <a:off x="3653792" y="2224760"/>
-            <a:ext cx="5273548" cy="2308324"/>
+          <a:xfrm rot="16200000">
+            <a:off x="6001431" y="579932"/>
+            <a:ext cx="196053" cy="11318298"/>
           </a:xfrm>
           <a:prstGeom prst="rect">
             <a:avLst/>
           </a:prstGeom>
-          <a:noFill/>
+          <a:solidFill>
+            <a:schemeClr val="bg1"/>
+          </a:solidFill>
+          <a:ln>
+            <a:noFill/>
+          </a:ln>
         </p:spPr>
+        <p:style>
+          <a:lnRef idx="0">
+            <a:scrgbClr r="0" g="0" b="0"/>
+          </a:lnRef>
+          <a:fillRef idx="0">
+            <a:scrgbClr r="0" g="0" b="0"/>
+          </a:fillRef>
+          <a:effectRef idx="0">
+            <a:scrgbClr r="0" g="0" b="0"/>
+          </a:effectRef>
+          <a:fontRef idx="minor">
+            <a:schemeClr val="dk1"/>
+          </a:fontRef>
+        </p:style>
         <p:txBody>
-          <a:bodyPr wrap="square" rtlCol="0">
-            <a:spAutoFit/>
-          </a:bodyPr>
+          <a:bodyPr rtlCol="0" anchor="ctr"/>
           <a:lstStyle/>
           <a:p>
-            <a:r>
-              <a:rPr lang="pt-BR" dirty="0"/>
-              <a:t>PLANNER</a:t>
-            </a:r>
-          </a:p>
-          <a:p>
-            <a:pPr marL="285750" indent="-285750">
-              <a:buFontTx/>
-              <a:buChar char="-"/>
-            </a:pPr>
-            <a:endParaRPr lang="pt-BR" dirty="0"/>
-          </a:p>
-          <a:p>
-            <a:pPr marL="285750" indent="-285750">
-              <a:buFontTx/>
-              <a:buChar char="-"/>
-            </a:pPr>
-            <a:r>
-              <a:rPr lang="pt-BR" dirty="0"/>
-              <a:t>Gestão de tempo</a:t>
-            </a:r>
-          </a:p>
-          <a:p>
-            <a:pPr marL="285750" indent="-285750">
-              <a:buFontTx/>
-              <a:buChar char="-"/>
-            </a:pPr>
-            <a:r>
-              <a:rPr lang="pt-BR" dirty="0"/>
-              <a:t>Análise de entregas</a:t>
-            </a:r>
-          </a:p>
-          <a:p>
-            <a:pPr marL="285750" indent="-285750">
-              <a:buFontTx/>
-              <a:buChar char="-"/>
-            </a:pPr>
-            <a:r>
-              <a:rPr lang="pt-BR" dirty="0"/>
-              <a:t>Acompanhamento de entregas</a:t>
-            </a:r>
-          </a:p>
-          <a:p>
-            <a:pPr marL="285750" indent="-285750">
-              <a:buFontTx/>
-              <a:buChar char="-"/>
-            </a:pPr>
-            <a:r>
-              <a:rPr lang="pt-BR" dirty="0"/>
-              <a:t>Diversas funcionalidades</a:t>
-            </a:r>
-          </a:p>
-          <a:p>
-            <a:pPr marL="285750" indent="-285750">
-              <a:buFontTx/>
-              <a:buChar char="-"/>
-            </a:pPr>
-            <a:endParaRPr lang="pt-BR" dirty="0"/>
-          </a:p>
-          <a:p>
-            <a:pPr marL="285750" indent="-285750">
-              <a:buFontTx/>
-              <a:buChar char="-"/>
-            </a:pPr>
-            <a:endParaRPr lang="pt-BR" dirty="0"/>
-          </a:p>
-        </p:txBody>
-      </p:sp>
-      <p:sp>
-        <p:nvSpPr>
-          <p:cNvPr id="11" name="CaixaDeTexto 10">
-            <a:extLst>
-              <a:ext uri="{FF2B5EF4-FFF2-40B4-BE49-F238E27FC236}">
-                <a16:creationId xmlns:a16="http://schemas.microsoft.com/office/drawing/2014/main" id="{FB2E8868-434F-4638-9E06-D8C315433624}"/>
-              </a:ext>
-            </a:extLst>
-          </p:cNvPr>
-          <p:cNvSpPr txBox="1"/>
-          <p:nvPr/>
-        </p:nvSpPr>
-        <p:spPr>
-          <a:xfrm>
-            <a:off x="3653792" y="4256085"/>
-            <a:ext cx="5273548" cy="1477328"/>
-          </a:xfrm>
-          <a:prstGeom prst="rect">
-            <a:avLst/>
-          </a:prstGeom>
-          <a:noFill/>
-        </p:spPr>
-        <p:txBody>
-          <a:bodyPr wrap="square" rtlCol="0">
-            <a:spAutoFit/>
-          </a:bodyPr>
-          <a:lstStyle/>
-          <a:p>
-            <a:r>
-              <a:rPr lang="pt-BR" dirty="0"/>
-              <a:t>DISCORD</a:t>
-            </a:r>
-          </a:p>
-          <a:p>
-            <a:pPr marL="285750" indent="-285750">
-              <a:buFontTx/>
-              <a:buChar char="-"/>
-            </a:pPr>
-            <a:endParaRPr lang="pt-BR" dirty="0"/>
-          </a:p>
-          <a:p>
-            <a:pPr marL="285750" indent="-285750">
-              <a:buFontTx/>
-              <a:buChar char="-"/>
-            </a:pPr>
-            <a:r>
-              <a:rPr lang="pt-BR" dirty="0"/>
-              <a:t>Comunicação a distância</a:t>
-            </a:r>
-          </a:p>
-          <a:p>
-            <a:pPr marL="285750" indent="-285750">
-              <a:buFontTx/>
-              <a:buChar char="-"/>
-            </a:pPr>
-            <a:r>
-              <a:rPr lang="pt-BR" dirty="0"/>
-              <a:t>Trabalho simultâneo</a:t>
-            </a:r>
-          </a:p>
-          <a:p>
-            <a:pPr marL="285750" indent="-285750">
-              <a:buFontTx/>
-              <a:buChar char="-"/>
-            </a:pPr>
-            <a:r>
-              <a:rPr lang="pt-BR" dirty="0"/>
-              <a:t>Compartilhamento de arquivos</a:t>
-            </a:r>
+            <a:pPr algn="ctr"/>
+            <a:endParaRPr lang="pt-BR"/>
           </a:p>
         </p:txBody>
       </p:sp>
       <p:pic>
         <p:nvPicPr>
-          <p:cNvPr id="4" name="Picture 4" descr="Discord Free Icon of Social Media Set - Flat Design">
+          <p:cNvPr id="31" name="Imagem 30">
             <a:extLst>
               <a:ext uri="{FF2B5EF4-FFF2-40B4-BE49-F238E27FC236}">
-                <a16:creationId xmlns:a16="http://schemas.microsoft.com/office/drawing/2014/main" id="{DC48B066-7753-45E3-BCE0-FF0376C71B93}"/>
+                <a16:creationId xmlns:a16="http://schemas.microsoft.com/office/drawing/2014/main" id="{F4C96F85-DA9C-4EC1-A6F8-550957588480}"/>
               </a:ext>
             </a:extLst>
           </p:cNvPr>
           <p:cNvPicPr>
-            <a:picLocks noChangeAspect="1" noChangeArrowheads="1"/>
+            <a:picLocks noChangeAspect="1"/>
           </p:cNvPicPr>
           <p:nvPr/>
         </p:nvPicPr>
         <p:blipFill>
-          <a:blip r:embed="rId2">
-            <a:extLst>
-              <a:ext uri="{28A0092B-C50C-407E-A947-70E740481C1C}">
-                <a14:useLocalDpi xmlns:a14="http://schemas.microsoft.com/office/drawing/2010/main" val="0"/>
-              </a:ext>
-            </a:extLst>
-          </a:blip>
-          <a:srcRect/>
+          <a:blip r:embed="rId2"/>
           <a:stretch>
             <a:fillRect/>
           </a:stretch>
         </p:blipFill>
-        <p:spPr bwMode="auto">
+        <p:spPr>
           <a:xfrm>
-            <a:off x="1548440" y="4249706"/>
-            <a:ext cx="1477329" cy="1477329"/>
+            <a:off x="889190" y="1831128"/>
+            <a:ext cx="10413620" cy="3252015"/>
           </a:xfrm>
           <a:prstGeom prst="rect">
             <a:avLst/>
           </a:prstGeom>
-          <a:noFill/>
-          <a:extLst>
-            <a:ext uri="{909E8E84-426E-40DD-AFC4-6F175D3DCCD1}">
-              <a14:hiddenFill xmlns:a14="http://schemas.microsoft.com/office/drawing/2010/main">
-                <a:solidFill>
-                  <a:srgbClr val="FFFFFF"/>
-                </a:solidFill>
-              </a14:hiddenFill>
-            </a:ext>
-          </a:extLst>
-        </p:spPr>
-      </p:pic>
-      <p:pic>
-        <p:nvPicPr>
-          <p:cNvPr id="1030" name="Picture 6" descr="Planner - Free logo icons">
-            <a:extLst>
-              <a:ext uri="{FF2B5EF4-FFF2-40B4-BE49-F238E27FC236}">
-                <a16:creationId xmlns:a16="http://schemas.microsoft.com/office/drawing/2014/main" id="{5FA43E33-8005-4382-9B8C-63CBEE494F0D}"/>
-              </a:ext>
-            </a:extLst>
-          </p:cNvPr>
-          <p:cNvPicPr>
-            <a:picLocks noChangeAspect="1" noChangeArrowheads="1"/>
-          </p:cNvPicPr>
-          <p:nvPr/>
-        </p:nvPicPr>
-        <p:blipFill>
-          <a:blip r:embed="rId3">
-            <a:extLst>
-              <a:ext uri="{28A0092B-C50C-407E-A947-70E740481C1C}">
-                <a14:useLocalDpi xmlns:a14="http://schemas.microsoft.com/office/drawing/2010/main" val="0"/>
-              </a:ext>
-            </a:extLst>
-          </a:blip>
-          <a:srcRect/>
-          <a:stretch>
-            <a:fillRect/>
-          </a:stretch>
-        </p:blipFill>
-        <p:spPr bwMode="auto">
-          <a:xfrm>
-            <a:off x="1600403" y="2224760"/>
-            <a:ext cx="1373404" cy="1373404"/>
-          </a:xfrm>
-          <a:prstGeom prst="rect">
-            <a:avLst/>
-          </a:prstGeom>
-          <a:noFill/>
-          <a:extLst>
-            <a:ext uri="{909E8E84-426E-40DD-AFC4-6F175D3DCCD1}">
-              <a14:hiddenFill xmlns:a14="http://schemas.microsoft.com/office/drawing/2010/main">
-                <a:solidFill>
-                  <a:srgbClr val="FFFFFF"/>
-                </a:solidFill>
-              </a14:hiddenFill>
-            </a:ext>
-          </a:extLst>
         </p:spPr>
       </p:pic>
     </p:spTree>
     <p:extLst>
       <p:ext uri="{BB962C8B-B14F-4D97-AF65-F5344CB8AC3E}">
-        <p14:creationId xmlns:p14="http://schemas.microsoft.com/office/powerpoint/2010/main" val="2462845540"/>
+        <p14:creationId xmlns:p14="http://schemas.microsoft.com/office/powerpoint/2010/main" val="3766808452"/>
       </p:ext>
     </p:extLst>
   </p:cSld>
   <p:clrMapOvr>
     <a:masterClrMapping/>
   </p:clrMapOvr>
-  <p:timing>
-    <p:tnLst>
-      <p:par>
-        <p:cTn id="1" dur="indefinite" restart="never" nodeType="tmRoot">
-          <p:childTnLst>
-            <p:seq concurrent="1" nextAc="seek">
-              <p:cTn id="2" dur="indefinite" nodeType="mainSeq">
-                <p:childTnLst>
-                  <p:par>
-                    <p:cTn id="3" fill="hold">
-                      <p:stCondLst>
-                        <p:cond delay="indefinite"/>
-                      </p:stCondLst>
-                      <p:childTnLst>
-                        <p:par>
-                          <p:cTn id="4" fill="hold">
-                            <p:stCondLst>
-                              <p:cond delay="0"/>
-                            </p:stCondLst>
-                            <p:childTnLst>
-                              <p:par>
-                                <p:cTn id="5" presetID="1" presetClass="entr" presetSubtype="0" fill="hold" nodeType="clickEffect">
-                                  <p:stCondLst>
-                                    <p:cond delay="0"/>
-                                  </p:stCondLst>
-                                  <p:childTnLst>
-                                    <p:set>
-                                      <p:cBhvr>
-                                        <p:cTn id="6" dur="1" fill="hold">
-                                          <p:stCondLst>
-                                            <p:cond delay="0"/>
-                                          </p:stCondLst>
-                                        </p:cTn>
-                                        <p:tgtEl>
-                                          <p:spTgt spid="4"/>
-                                        </p:tgtEl>
-                                        <p:attrNameLst>
-                                          <p:attrName>style.visibility</p:attrName>
-                                        </p:attrNameLst>
-                                      </p:cBhvr>
-                                      <p:to>
-                                        <p:strVal val="visible"/>
-                                      </p:to>
-                                    </p:set>
-                                  </p:childTnLst>
-                                </p:cTn>
-                              </p:par>
-                              <p:par>
-                                <p:cTn id="7" presetID="1" presetClass="entr" presetSubtype="0" fill="hold" grpId="0" nodeType="withEffect">
-                                  <p:stCondLst>
-                                    <p:cond delay="0"/>
-                                  </p:stCondLst>
-                                  <p:childTnLst>
-                                    <p:set>
-                                      <p:cBhvr>
-                                        <p:cTn id="8" dur="1" fill="hold">
-                                          <p:stCondLst>
-                                            <p:cond delay="0"/>
-                                          </p:stCondLst>
-                                        </p:cTn>
-                                        <p:tgtEl>
-                                          <p:spTgt spid="11"/>
-                                        </p:tgtEl>
-                                        <p:attrNameLst>
-                                          <p:attrName>style.visibility</p:attrName>
-                                        </p:attrNameLst>
-                                      </p:cBhvr>
-                                      <p:to>
-                                        <p:strVal val="visible"/>
-                                      </p:to>
-                                    </p:set>
-                                  </p:childTnLst>
-                                </p:cTn>
-                              </p:par>
-                            </p:childTnLst>
-                          </p:cTn>
-                        </p:par>
-                      </p:childTnLst>
-                    </p:cTn>
-                  </p:par>
-                </p:childTnLst>
-              </p:cTn>
-              <p:prevCondLst>
-                <p:cond evt="onPrev" delay="0">
-                  <p:tgtEl>
-                    <p:sldTgt/>
-                  </p:tgtEl>
-                </p:cond>
-              </p:prevCondLst>
-              <p:nextCondLst>
-                <p:cond evt="onNext" delay="0">
-                  <p:tgtEl>
-                    <p:sldTgt/>
-                  </p:tgtEl>
-                </p:cond>
-              </p:nextCondLst>
-            </p:seq>
-          </p:childTnLst>
-        </p:cTn>
-      </p:par>
-    </p:tnLst>
-    <p:bldLst>
-      <p:bldP spid="11" grpId="0"/>
-    </p:bldLst>
-  </p:timing>
 </p:sld>
 </file>
 

</xml_diff>

<commit_message>
adicionando o build.xml e .classpath
</commit_message>
<xml_diff>
--- a/Documentação/Apresentação - Sprint 1 - 4 sem.pptx
+++ b/Documentação/Apresentação - Sprint 1 - 4 sem.pptx
@@ -29380,6 +29380,150 @@
           </a:prstGeom>
         </p:spPr>
       </p:pic>
+      <p:sp>
+        <p:nvSpPr>
+          <p:cNvPr id="3" name="CaixaDeTexto 2">
+            <a:extLst>
+              <a:ext uri="{FF2B5EF4-FFF2-40B4-BE49-F238E27FC236}">
+                <a16:creationId xmlns:a16="http://schemas.microsoft.com/office/drawing/2014/main" id="{3AF4CF63-C664-4112-B2EC-9B7A3C7C5E20}"/>
+              </a:ext>
+            </a:extLst>
+          </p:cNvPr>
+          <p:cNvSpPr txBox="1"/>
+          <p:nvPr/>
+        </p:nvSpPr>
+        <p:spPr>
+          <a:xfrm>
+            <a:off x="5293613" y="3765505"/>
+            <a:ext cx="1702967" cy="276999"/>
+          </a:xfrm>
+          <a:prstGeom prst="rect">
+            <a:avLst/>
+          </a:prstGeom>
+          <a:noFill/>
+        </p:spPr>
+        <p:txBody>
+          <a:bodyPr wrap="square" rtlCol="0">
+            <a:spAutoFit/>
+          </a:bodyPr>
+          <a:lstStyle/>
+          <a:p>
+            <a:r>
+              <a:rPr lang="pt-BR" sz="1200" dirty="0"/>
+              <a:t>Web-server1</a:t>
+            </a:r>
+          </a:p>
+        </p:txBody>
+      </p:sp>
+      <p:sp>
+        <p:nvSpPr>
+          <p:cNvPr id="5" name="CaixaDeTexto 4">
+            <a:extLst>
+              <a:ext uri="{FF2B5EF4-FFF2-40B4-BE49-F238E27FC236}">
+                <a16:creationId xmlns:a16="http://schemas.microsoft.com/office/drawing/2014/main" id="{C9077748-D5D4-4C6C-BBD9-69BCDA45DF9B}"/>
+              </a:ext>
+            </a:extLst>
+          </p:cNvPr>
+          <p:cNvSpPr txBox="1"/>
+          <p:nvPr/>
+        </p:nvSpPr>
+        <p:spPr>
+          <a:xfrm>
+            <a:off x="7624437" y="3765505"/>
+            <a:ext cx="1024614" cy="276999"/>
+          </a:xfrm>
+          <a:prstGeom prst="rect">
+            <a:avLst/>
+          </a:prstGeom>
+          <a:noFill/>
+        </p:spPr>
+        <p:txBody>
+          <a:bodyPr wrap="square" rtlCol="0">
+            <a:spAutoFit/>
+          </a:bodyPr>
+          <a:lstStyle/>
+          <a:p>
+            <a:r>
+              <a:rPr lang="pt-BR" sz="1200" dirty="0"/>
+              <a:t>Web-server2</a:t>
+            </a:r>
+          </a:p>
+        </p:txBody>
+      </p:sp>
+      <p:sp>
+        <p:nvSpPr>
+          <p:cNvPr id="6" name="CaixaDeTexto 5">
+            <a:extLst>
+              <a:ext uri="{FF2B5EF4-FFF2-40B4-BE49-F238E27FC236}">
+                <a16:creationId xmlns:a16="http://schemas.microsoft.com/office/drawing/2014/main" id="{125273C2-3F96-49ED-B451-8289CFA63FC9}"/>
+              </a:ext>
+            </a:extLst>
+          </p:cNvPr>
+          <p:cNvSpPr txBox="1"/>
+          <p:nvPr/>
+        </p:nvSpPr>
+        <p:spPr>
+          <a:xfrm>
+            <a:off x="6547315" y="4962171"/>
+            <a:ext cx="898530" cy="276999"/>
+          </a:xfrm>
+          <a:prstGeom prst="rect">
+            <a:avLst/>
+          </a:prstGeom>
+          <a:noFill/>
+        </p:spPr>
+        <p:txBody>
+          <a:bodyPr wrap="square" rtlCol="0">
+            <a:spAutoFit/>
+          </a:bodyPr>
+          <a:lstStyle/>
+          <a:p>
+            <a:r>
+              <a:rPr lang="pt-BR" sz="1200" dirty="0"/>
+              <a:t>File-server</a:t>
+            </a:r>
+          </a:p>
+        </p:txBody>
+      </p:sp>
+      <p:sp>
+        <p:nvSpPr>
+          <p:cNvPr id="7" name="CaixaDeTexto 6">
+            <a:extLst>
+              <a:ext uri="{FF2B5EF4-FFF2-40B4-BE49-F238E27FC236}">
+                <a16:creationId xmlns:a16="http://schemas.microsoft.com/office/drawing/2014/main" id="{47F2AE7B-5DD6-4D15-AE01-7BF90A3AFFAE}"/>
+              </a:ext>
+            </a:extLst>
+          </p:cNvPr>
+          <p:cNvSpPr txBox="1"/>
+          <p:nvPr/>
+        </p:nvSpPr>
+        <p:spPr>
+          <a:xfrm>
+            <a:off x="6484851" y="3657783"/>
+            <a:ext cx="1077122" cy="276999"/>
+          </a:xfrm>
+          <a:prstGeom prst="rect">
+            <a:avLst/>
+          </a:prstGeom>
+          <a:noFill/>
+        </p:spPr>
+        <p:txBody>
+          <a:bodyPr wrap="square" rtlCol="0">
+            <a:spAutoFit/>
+          </a:bodyPr>
+          <a:lstStyle/>
+          <a:p>
+            <a:r>
+              <a:rPr lang="pt-BR" sz="1200" dirty="0" err="1"/>
+              <a:t>Load</a:t>
+            </a:r>
+            <a:r>
+              <a:rPr lang="pt-BR" sz="1200" dirty="0"/>
+              <a:t> balance</a:t>
+            </a:r>
+          </a:p>
+        </p:txBody>
+      </p:sp>
     </p:spTree>
     <p:extLst>
       <p:ext uri="{BB962C8B-B14F-4D97-AF65-F5344CB8AC3E}">
@@ -29433,12 +29577,8 @@
           <a:lstStyle/>
           <a:p>
             <a:r>
-              <a:rPr lang="pt-BR" dirty="0" err="1"/>
-              <a:t>Load</a:t>
-            </a:r>
-            <a:r>
               <a:rPr lang="pt-BR" dirty="0"/>
-              <a:t> Balance</a:t>
+              <a:t>Certificado SSL</a:t>
             </a:r>
           </a:p>
         </p:txBody>
@@ -30141,6 +30281,78 @@
               </a14:hiddenFill>
             </a:ext>
           </a:extLst>
+        </p:spPr>
+      </p:pic>
+      <p:pic>
+        <p:nvPicPr>
+          <p:cNvPr id="4" name="Imagem 3">
+            <a:extLst>
+              <a:ext uri="{FF2B5EF4-FFF2-40B4-BE49-F238E27FC236}">
+                <a16:creationId xmlns:a16="http://schemas.microsoft.com/office/drawing/2014/main" id="{AFF874F8-D635-48BB-9DD4-7135942A79B0}"/>
+              </a:ext>
+            </a:extLst>
+          </p:cNvPr>
+          <p:cNvPicPr>
+            <a:picLocks noChangeAspect="1"/>
+          </p:cNvPicPr>
+          <p:nvPr/>
+        </p:nvPicPr>
+        <p:blipFill>
+          <a:blip r:embed="rId3">
+            <a:extLst>
+              <a:ext uri="{28A0092B-C50C-407E-A947-70E740481C1C}">
+                <a14:useLocalDpi xmlns:a14="http://schemas.microsoft.com/office/drawing/2010/main" val="0"/>
+              </a:ext>
+            </a:extLst>
+          </a:blip>
+          <a:stretch>
+            <a:fillRect/>
+          </a:stretch>
+        </p:blipFill>
+        <p:spPr>
+          <a:xfrm>
+            <a:off x="5417495" y="77845"/>
+            <a:ext cx="2487409" cy="997036"/>
+          </a:xfrm>
+          <a:prstGeom prst="rect">
+            <a:avLst/>
+          </a:prstGeom>
+        </p:spPr>
+      </p:pic>
+      <p:pic>
+        <p:nvPicPr>
+          <p:cNvPr id="6" name="Imagem 5">
+            <a:extLst>
+              <a:ext uri="{FF2B5EF4-FFF2-40B4-BE49-F238E27FC236}">
+                <a16:creationId xmlns:a16="http://schemas.microsoft.com/office/drawing/2014/main" id="{85103222-2524-4E08-A59C-34E11D50B69F}"/>
+              </a:ext>
+            </a:extLst>
+          </p:cNvPr>
+          <p:cNvPicPr>
+            <a:picLocks noChangeAspect="1"/>
+          </p:cNvPicPr>
+          <p:nvPr/>
+        </p:nvPicPr>
+        <p:blipFill>
+          <a:blip r:embed="rId4">
+            <a:extLst>
+              <a:ext uri="{28A0092B-C50C-407E-A947-70E740481C1C}">
+                <a14:useLocalDpi xmlns:a14="http://schemas.microsoft.com/office/drawing/2010/main" val="0"/>
+              </a:ext>
+            </a:extLst>
+          </a:blip>
+          <a:stretch>
+            <a:fillRect/>
+          </a:stretch>
+        </p:blipFill>
+        <p:spPr>
+          <a:xfrm>
+            <a:off x="8139337" y="19393"/>
+            <a:ext cx="1069221" cy="1069221"/>
+          </a:xfrm>
+          <a:prstGeom prst="rect">
+            <a:avLst/>
+          </a:prstGeom>
         </p:spPr>
       </p:pic>
     </p:spTree>

</xml_diff>